<commit_message>
ValidationAspect impl, naming changes, logger additions
</commit_message>
<xml_diff>
--- a/src/Final Project Presentation.pptx
+++ b/src/Final Project Presentation.pptx
@@ -22,18 +22,24 @@
     <p:sldId id="262" r:id="rId16"/>
     <p:sldId id="275" r:id="rId17"/>
     <p:sldId id="280" r:id="rId18"/>
-    <p:sldId id="279" r:id="rId19"/>
-    <p:sldId id="281" r:id="rId20"/>
-    <p:sldId id="282" r:id="rId21"/>
-    <p:sldId id="276" r:id="rId22"/>
-    <p:sldId id="278" r:id="rId23"/>
-    <p:sldId id="287" r:id="rId24"/>
-    <p:sldId id="286" r:id="rId25"/>
-    <p:sldId id="277" r:id="rId26"/>
-    <p:sldId id="284" r:id="rId27"/>
-    <p:sldId id="263" r:id="rId28"/>
-    <p:sldId id="264" r:id="rId29"/>
-    <p:sldId id="273" r:id="rId30"/>
+    <p:sldId id="290" r:id="rId19"/>
+    <p:sldId id="289" r:id="rId20"/>
+    <p:sldId id="291" r:id="rId21"/>
+    <p:sldId id="281" r:id="rId22"/>
+    <p:sldId id="282" r:id="rId23"/>
+    <p:sldId id="276" r:id="rId24"/>
+    <p:sldId id="278" r:id="rId25"/>
+    <p:sldId id="287" r:id="rId26"/>
+    <p:sldId id="286" r:id="rId27"/>
+    <p:sldId id="288" r:id="rId28"/>
+    <p:sldId id="277" r:id="rId29"/>
+    <p:sldId id="284" r:id="rId30"/>
+    <p:sldId id="292" r:id="rId31"/>
+    <p:sldId id="294" r:id="rId32"/>
+    <p:sldId id="295" r:id="rId33"/>
+    <p:sldId id="296" r:id="rId34"/>
+    <p:sldId id="293" r:id="rId35"/>
+    <p:sldId id="273" r:id="rId36"/>
   </p:sldIdLst>
   <p:sldSz cx="12192000" cy="6858000"/>
   <p:notesSz cx="6858000" cy="9144000"/>
@@ -287,7 +293,7 @@
           <a:p>
             <a:fld id="{2D0B15E7-0F5E-4AF9-8FAD-4329F98176F1}" type="datetimeFigureOut">
               <a:rPr lang="en-US" smtClean="0"/>
-              <a:t>6/9/2019</a:t>
+              <a:t>6/11/2019</a:t>
             </a:fld>
             <a:endParaRPr lang="en-US"/>
           </a:p>
@@ -485,7 +491,7 @@
           <a:p>
             <a:fld id="{2D0B15E7-0F5E-4AF9-8FAD-4329F98176F1}" type="datetimeFigureOut">
               <a:rPr lang="en-US" smtClean="0"/>
-              <a:t>6/9/2019</a:t>
+              <a:t>6/11/2019</a:t>
             </a:fld>
             <a:endParaRPr lang="en-US"/>
           </a:p>
@@ -693,7 +699,7 @@
           <a:p>
             <a:fld id="{2D0B15E7-0F5E-4AF9-8FAD-4329F98176F1}" type="datetimeFigureOut">
               <a:rPr lang="en-US" smtClean="0"/>
-              <a:t>6/9/2019</a:t>
+              <a:t>6/11/2019</a:t>
             </a:fld>
             <a:endParaRPr lang="en-US"/>
           </a:p>
@@ -891,7 +897,7 @@
           <a:p>
             <a:fld id="{2D0B15E7-0F5E-4AF9-8FAD-4329F98176F1}" type="datetimeFigureOut">
               <a:rPr lang="en-US" smtClean="0"/>
-              <a:t>6/9/2019</a:t>
+              <a:t>6/11/2019</a:t>
             </a:fld>
             <a:endParaRPr lang="en-US"/>
           </a:p>
@@ -1166,7 +1172,7 @@
           <a:p>
             <a:fld id="{2D0B15E7-0F5E-4AF9-8FAD-4329F98176F1}" type="datetimeFigureOut">
               <a:rPr lang="en-US" smtClean="0"/>
-              <a:t>6/9/2019</a:t>
+              <a:t>6/11/2019</a:t>
             </a:fld>
             <a:endParaRPr lang="en-US"/>
           </a:p>
@@ -1431,7 +1437,7 @@
           <a:p>
             <a:fld id="{2D0B15E7-0F5E-4AF9-8FAD-4329F98176F1}" type="datetimeFigureOut">
               <a:rPr lang="en-US" smtClean="0"/>
-              <a:t>6/9/2019</a:t>
+              <a:t>6/11/2019</a:t>
             </a:fld>
             <a:endParaRPr lang="en-US"/>
           </a:p>
@@ -1843,7 +1849,7 @@
           <a:p>
             <a:fld id="{2D0B15E7-0F5E-4AF9-8FAD-4329F98176F1}" type="datetimeFigureOut">
               <a:rPr lang="en-US" smtClean="0"/>
-              <a:t>6/9/2019</a:t>
+              <a:t>6/11/2019</a:t>
             </a:fld>
             <a:endParaRPr lang="en-US"/>
           </a:p>
@@ -1984,7 +1990,7 @@
           <a:p>
             <a:fld id="{2D0B15E7-0F5E-4AF9-8FAD-4329F98176F1}" type="datetimeFigureOut">
               <a:rPr lang="en-US" smtClean="0"/>
-              <a:t>6/9/2019</a:t>
+              <a:t>6/11/2019</a:t>
             </a:fld>
             <a:endParaRPr lang="en-US"/>
           </a:p>
@@ -2097,7 +2103,7 @@
           <a:p>
             <a:fld id="{2D0B15E7-0F5E-4AF9-8FAD-4329F98176F1}" type="datetimeFigureOut">
               <a:rPr lang="en-US" smtClean="0"/>
-              <a:t>6/9/2019</a:t>
+              <a:t>6/11/2019</a:t>
             </a:fld>
             <a:endParaRPr lang="en-US"/>
           </a:p>
@@ -2408,7 +2414,7 @@
           <a:p>
             <a:fld id="{2D0B15E7-0F5E-4AF9-8FAD-4329F98176F1}" type="datetimeFigureOut">
               <a:rPr lang="en-US" smtClean="0"/>
-              <a:t>6/9/2019</a:t>
+              <a:t>6/11/2019</a:t>
             </a:fld>
             <a:endParaRPr lang="en-US"/>
           </a:p>
@@ -2696,7 +2702,7 @@
           <a:p>
             <a:fld id="{2D0B15E7-0F5E-4AF9-8FAD-4329F98176F1}" type="datetimeFigureOut">
               <a:rPr lang="en-US" smtClean="0"/>
-              <a:t>6/9/2019</a:t>
+              <a:t>6/11/2019</a:t>
             </a:fld>
             <a:endParaRPr lang="en-US"/>
           </a:p>
@@ -2937,7 +2943,7 @@
           <a:p>
             <a:fld id="{2D0B15E7-0F5E-4AF9-8FAD-4329F98176F1}" type="datetimeFigureOut">
               <a:rPr lang="en-US" smtClean="0"/>
-              <a:t>6/9/2019</a:t>
+              <a:t>6/11/2019</a:t>
             </a:fld>
             <a:endParaRPr lang="en-US"/>
           </a:p>
@@ -5001,14 +5007,14 @@
         </p:nvSpPr>
         <p:spPr>
           <a:xfrm>
-            <a:off x="2431608" y="3275901"/>
+            <a:off x="6296117" y="3110111"/>
             <a:ext cx="1602138" cy="1536585"/>
           </a:xfrm>
           <a:prstGeom prst="ellipse">
             <a:avLst/>
           </a:prstGeom>
           <a:solidFill>
-            <a:schemeClr val="tx1"/>
+            <a:srgbClr val="002060"/>
           </a:solidFill>
           <a:ln>
             <a:solidFill>
@@ -5058,14 +5064,14 @@
         </p:nvSpPr>
         <p:spPr>
           <a:xfrm>
-            <a:off x="5050172" y="3275901"/>
-            <a:ext cx="1930986" cy="1536585"/>
+            <a:off x="3537160" y="3178624"/>
+            <a:ext cx="1661139" cy="1468072"/>
           </a:xfrm>
           <a:prstGeom prst="ellipse">
             <a:avLst/>
           </a:prstGeom>
           <a:solidFill>
-            <a:schemeClr val="tx1"/>
+            <a:srgbClr val="002060"/>
           </a:solidFill>
           <a:ln>
             <a:solidFill>
@@ -5095,8 +5101,12 @@
           <a:p>
             <a:pPr algn="ctr"/>
             <a:r>
+              <a:rPr lang="en-US" sz="1600" b="1" dirty="0" err="1"/>
+              <a:t>Auth</a:t>
+            </a:r>
+            <a:r>
               <a:rPr lang="en-US" sz="1600" b="1" dirty="0"/>
-              <a:t>Authorization Aspect</a:t>
+              <a:t> Aspect</a:t>
             </a:r>
           </a:p>
         </p:txBody>
@@ -5115,14 +5125,14 @@
         </p:nvSpPr>
         <p:spPr>
           <a:xfrm>
-            <a:off x="7855170" y="3275901"/>
+            <a:off x="8996073" y="3110111"/>
             <a:ext cx="1602138" cy="1536585"/>
           </a:xfrm>
           <a:prstGeom prst="ellipse">
             <a:avLst/>
           </a:prstGeom>
           <a:solidFill>
-            <a:schemeClr val="tx1"/>
+            <a:srgbClr val="002060"/>
           </a:solidFill>
           <a:ln>
             <a:solidFill>
@@ -5154,6 +5164,63 @@
             <a:r>
               <a:rPr lang="en-US" sz="1600" b="1" dirty="0"/>
               <a:t>UI Aspect</a:t>
+            </a:r>
+          </a:p>
+        </p:txBody>
+      </p:sp>
+      <p:sp>
+        <p:nvSpPr>
+          <p:cNvPr id="8" name="Oval 7">
+            <a:extLst>
+              <a:ext uri="{FF2B5EF4-FFF2-40B4-BE49-F238E27FC236}">
+                <a16:creationId xmlns:a16="http://schemas.microsoft.com/office/drawing/2014/main" id="{CC419827-DC1D-439B-B4BE-78D59E3D3872}"/>
+              </a:ext>
+            </a:extLst>
+          </p:cNvPr>
+          <p:cNvSpPr/>
+          <p:nvPr/>
+        </p:nvSpPr>
+        <p:spPr>
+          <a:xfrm>
+            <a:off x="1090568" y="3158453"/>
+            <a:ext cx="1484573" cy="1468073"/>
+          </a:xfrm>
+          <a:prstGeom prst="ellipse">
+            <a:avLst/>
+          </a:prstGeom>
+          <a:solidFill>
+            <a:srgbClr val="002060"/>
+          </a:solidFill>
+          <a:ln>
+            <a:solidFill>
+              <a:schemeClr val="bg1"/>
+            </a:solidFill>
+          </a:ln>
+        </p:spPr>
+        <p:style>
+          <a:lnRef idx="2">
+            <a:schemeClr val="accent1">
+              <a:shade val="50000"/>
+            </a:schemeClr>
+          </a:lnRef>
+          <a:fillRef idx="1">
+            <a:schemeClr val="accent1"/>
+          </a:fillRef>
+          <a:effectRef idx="0">
+            <a:schemeClr val="accent1"/>
+          </a:effectRef>
+          <a:fontRef idx="minor">
+            <a:schemeClr val="lt1"/>
+          </a:fontRef>
+        </p:style>
+        <p:txBody>
+          <a:bodyPr rtlCol="0" anchor="ctr"/>
+          <a:lstStyle/>
+          <a:p>
+            <a:pPr algn="ctr"/>
+            <a:r>
+              <a:rPr lang="en-US" sz="1600" b="1" dirty="0"/>
+              <a:t>Validator Aspect</a:t>
             </a:r>
           </a:p>
         </p:txBody>
@@ -5218,7 +5285,7 @@
               <a:rPr lang="en-US" b="1" dirty="0">
                 <a:latin typeface="+mn-lt"/>
               </a:rPr>
-              <a:t>Lock Aspect:</a:t>
+              <a:t>Validator Aspect, the concern:</a:t>
             </a:r>
           </a:p>
         </p:txBody>
@@ -5241,13 +5308,13 @@
         </p:nvSpPr>
         <p:spPr>
           <a:xfrm>
-            <a:off x="400594" y="1201783"/>
-            <a:ext cx="11495315" cy="5468983"/>
+            <a:off x="100669" y="1644289"/>
+            <a:ext cx="6724548" cy="4848790"/>
           </a:xfrm>
         </p:spPr>
         <p:txBody>
           <a:bodyPr>
-            <a:normAutofit/>
+            <a:normAutofit fontScale="92500"/>
           </a:bodyPr>
           <a:lstStyle/>
           <a:p>
@@ -5257,41 +5324,28 @@
               </a:lnSpc>
             </a:pPr>
             <a:r>
+              <a:rPr lang="en-US" b="1" dirty="0">
+                <a:solidFill>
+                  <a:srgbClr val="FF0000"/>
+                </a:solidFill>
+              </a:rPr>
+              <a:t>One way </a:t>
+            </a:r>
+            <a:r>
               <a:rPr lang="en-US" b="1" dirty="0"/>
-              <a:t>Locks game features of the game:</a:t>
-            </a:r>
-          </a:p>
-          <a:p>
-            <a:pPr lvl="1">
-              <a:lnSpc>
-                <a:spcPct val="150000"/>
-              </a:lnSpc>
-            </a:pPr>
+              <a:t>–</a:t>
+            </a:r>
+            <a:r>
+              <a:rPr lang="en-US" b="1" dirty="0">
+                <a:solidFill>
+                  <a:srgbClr val="FF0000"/>
+                </a:solidFill>
+              </a:rPr>
+              <a:t> </a:t>
+            </a:r>
             <a:r>
               <a:rPr lang="en-US" b="1" dirty="0"/>
-              <a:t>Locks shooting option.</a:t>
-            </a:r>
-          </a:p>
-          <a:p>
-            <a:pPr lvl="1">
-              <a:lnSpc>
-                <a:spcPct val="150000"/>
-              </a:lnSpc>
-            </a:pPr>
-            <a:r>
-              <a:rPr lang="en-US" b="1" dirty="0"/>
-              <a:t>Locks shield option.</a:t>
-            </a:r>
-          </a:p>
-          <a:p>
-            <a:pPr lvl="1">
-              <a:lnSpc>
-                <a:spcPct val="150000"/>
-              </a:lnSpc>
-            </a:pPr>
-            <a:r>
-              <a:rPr lang="en-US" b="1" dirty="0"/>
-              <a:t>Locks moving option.</a:t>
+              <a:t>checking each time</a:t>
             </a:r>
           </a:p>
           <a:p>
@@ -5306,7 +5360,11 @@
                   <a:srgbClr val="FF0000"/>
                 </a:solidFill>
               </a:rPr>
-              <a:t>Pointcut: </a:t>
+              <a:t>Another variant </a:t>
+            </a:r>
+            <a:r>
+              <a:rPr lang="en-US" b="1" dirty="0"/>
+              <a:t>- using annotations with smart packages (Spring validation, Lombok).</a:t>
             </a:r>
           </a:p>
           <a:p>
@@ -5316,20 +5374,210 @@
               </a:lnSpc>
             </a:pPr>
             <a:r>
+              <a:rPr lang="en-US" b="1" dirty="0"/>
+              <a:t>Lots of code unrelated to the main logic of the method (</a:t>
+            </a:r>
+            <a:r>
               <a:rPr lang="en-US" b="1" dirty="0">
                 <a:solidFill>
                   <a:srgbClr val="FF0000"/>
                 </a:solidFill>
               </a:rPr>
-              <a:t>Advice:</a:t>
-            </a:r>
-          </a:p>
-        </p:txBody>
-      </p:sp>
+              <a:t>tangling</a:t>
+            </a:r>
+            <a:r>
+              <a:rPr lang="en-US" b="1" dirty="0"/>
+              <a:t>). Better way to </a:t>
+            </a:r>
+            <a:r>
+              <a:rPr lang="en-US" b="1" dirty="0">
+                <a:solidFill>
+                  <a:srgbClr val="FF0000"/>
+                </a:solidFill>
+              </a:rPr>
+              <a:t>separate whole system validation</a:t>
+            </a:r>
+            <a:r>
+              <a:rPr lang="en-US" b="1" dirty="0"/>
+              <a:t> from the logic.</a:t>
+            </a:r>
+          </a:p>
+          <a:p>
+            <a:pPr>
+              <a:lnSpc>
+                <a:spcPct val="150000"/>
+              </a:lnSpc>
+            </a:pPr>
+            <a:r>
+              <a:rPr lang="en-US" b="1" dirty="0">
+                <a:solidFill>
+                  <a:srgbClr val="FF0000"/>
+                </a:solidFill>
+              </a:rPr>
+              <a:t>Lets do it </a:t>
+            </a:r>
+            <a:r>
+              <a:rPr lang="en-US" b="1" dirty="0"/>
+              <a:t>AspectJ Way!</a:t>
+            </a:r>
+          </a:p>
+          <a:p>
+            <a:pPr>
+              <a:lnSpc>
+                <a:spcPct val="150000"/>
+              </a:lnSpc>
+            </a:pPr>
+            <a:endParaRPr lang="en-US" b="1" dirty="0"/>
+          </a:p>
+        </p:txBody>
+      </p:sp>
+      <p:pic>
+        <p:nvPicPr>
+          <p:cNvPr id="2" name="Picture 1">
+            <a:extLst>
+              <a:ext uri="{FF2B5EF4-FFF2-40B4-BE49-F238E27FC236}">
+                <a16:creationId xmlns:a16="http://schemas.microsoft.com/office/drawing/2014/main" id="{7E30FE84-A722-4B4D-BEB3-4FD3C19078EA}"/>
+              </a:ext>
+            </a:extLst>
+          </p:cNvPr>
+          <p:cNvPicPr>
+            <a:picLocks noChangeAspect="1"/>
+          </p:cNvPicPr>
+          <p:nvPr/>
+        </p:nvPicPr>
+        <p:blipFill>
+          <a:blip r:embed="rId2"/>
+          <a:stretch>
+            <a:fillRect/>
+          </a:stretch>
+        </p:blipFill>
+        <p:spPr>
+          <a:xfrm>
+            <a:off x="6756588" y="1733746"/>
+            <a:ext cx="4965214" cy="1579509"/>
+          </a:xfrm>
+          <a:prstGeom prst="rect">
+            <a:avLst/>
+          </a:prstGeom>
+        </p:spPr>
+      </p:pic>
+      <p:sp>
+        <p:nvSpPr>
+          <p:cNvPr id="3" name="Rectangle 2">
+            <a:extLst>
+              <a:ext uri="{FF2B5EF4-FFF2-40B4-BE49-F238E27FC236}">
+                <a16:creationId xmlns:a16="http://schemas.microsoft.com/office/drawing/2014/main" id="{2F7D9683-6946-4269-8D94-9F86B4389B7F}"/>
+              </a:ext>
+            </a:extLst>
+          </p:cNvPr>
+          <p:cNvSpPr/>
+          <p:nvPr/>
+        </p:nvSpPr>
+        <p:spPr>
+          <a:xfrm>
+            <a:off x="400594" y="1028732"/>
+            <a:ext cx="11520162" cy="589072"/>
+          </a:xfrm>
+          <a:prstGeom prst="rect">
+            <a:avLst/>
+          </a:prstGeom>
+        </p:spPr>
+        <p:txBody>
+          <a:bodyPr wrap="square">
+            <a:spAutoFit/>
+          </a:bodyPr>
+          <a:lstStyle/>
+          <a:p>
+            <a:pPr>
+              <a:lnSpc>
+                <a:spcPct val="150000"/>
+              </a:lnSpc>
+            </a:pPr>
+            <a:r>
+              <a:rPr lang="en-US" sz="2400" b="1" dirty="0"/>
+              <a:t>Assume we want a smart way to validate methods in our code:</a:t>
+            </a:r>
+          </a:p>
+        </p:txBody>
+      </p:sp>
+      <p:pic>
+        <p:nvPicPr>
+          <p:cNvPr id="1026" name="Picture 2" descr="https://www.baeldung.com/wp-content/uploads/2018/11/nonnul-annotation.png">
+            <a:extLst>
+              <a:ext uri="{FF2B5EF4-FFF2-40B4-BE49-F238E27FC236}">
+                <a16:creationId xmlns:a16="http://schemas.microsoft.com/office/drawing/2014/main" id="{90793D5F-59C0-4954-9C2A-08E23A8A110F}"/>
+              </a:ext>
+            </a:extLst>
+          </p:cNvPr>
+          <p:cNvPicPr>
+            <a:picLocks noChangeAspect="1" noChangeArrowheads="1"/>
+          </p:cNvPicPr>
+          <p:nvPr/>
+        </p:nvPicPr>
+        <p:blipFill rotWithShape="1">
+          <a:blip r:embed="rId3">
+            <a:extLst>
+              <a:ext uri="{28A0092B-C50C-407E-A947-70E740481C1C}">
+                <a14:useLocalDpi xmlns:a14="http://schemas.microsoft.com/office/drawing/2010/main" val="0"/>
+              </a:ext>
+            </a:extLst>
+          </a:blip>
+          <a:srcRect l="22153" r="22075"/>
+          <a:stretch/>
+        </p:blipFill>
+        <p:spPr bwMode="auto">
+          <a:xfrm>
+            <a:off x="7626730" y="3402712"/>
+            <a:ext cx="3224929" cy="1312087"/>
+          </a:xfrm>
+          <a:prstGeom prst="rect">
+            <a:avLst/>
+          </a:prstGeom>
+          <a:noFill/>
+          <a:extLst>
+            <a:ext uri="{909E8E84-426E-40DD-AFC4-6F175D3DCCD1}">
+              <a14:hiddenFill xmlns:a14="http://schemas.microsoft.com/office/drawing/2010/main">
+                <a:solidFill>
+                  <a:srgbClr val="FFFFFF"/>
+                </a:solidFill>
+              </a14:hiddenFill>
+            </a:ext>
+          </a:extLst>
+        </p:spPr>
+      </p:pic>
+      <p:pic>
+        <p:nvPicPr>
+          <p:cNvPr id="6" name="Picture 5">
+            <a:extLst>
+              <a:ext uri="{FF2B5EF4-FFF2-40B4-BE49-F238E27FC236}">
+                <a16:creationId xmlns:a16="http://schemas.microsoft.com/office/drawing/2014/main" id="{D02D4438-3E69-49E6-B77B-9896873A74AE}"/>
+              </a:ext>
+            </a:extLst>
+          </p:cNvPr>
+          <p:cNvPicPr>
+            <a:picLocks noChangeAspect="1"/>
+          </p:cNvPicPr>
+          <p:nvPr/>
+        </p:nvPicPr>
+        <p:blipFill rotWithShape="1">
+          <a:blip r:embed="rId4"/>
+          <a:srcRect r="52890"/>
+          <a:stretch/>
+        </p:blipFill>
+        <p:spPr>
+          <a:xfrm>
+            <a:off x="7366553" y="4877063"/>
+            <a:ext cx="3745284" cy="1904409"/>
+          </a:xfrm>
+          <a:prstGeom prst="rect">
+            <a:avLst/>
+          </a:prstGeom>
+        </p:spPr>
+      </p:pic>
     </p:spTree>
     <p:extLst>
       <p:ext uri="{BB962C8B-B14F-4D97-AF65-F5344CB8AC3E}">
-        <p14:creationId xmlns:p14="http://schemas.microsoft.com/office/powerpoint/2010/main" val="3231087132"/>
+        <p14:creationId xmlns:p14="http://schemas.microsoft.com/office/powerpoint/2010/main" val="4052454096"/>
       </p:ext>
     </p:extLst>
   </p:cSld>
@@ -5386,7 +5634,7 @@
               <a:rPr lang="en-US" b="1" dirty="0">
                 <a:latin typeface="+mn-lt"/>
               </a:rPr>
-              <a:t>Authorization Aspect:</a:t>
+              <a:t>Validator Aspect:</a:t>
             </a:r>
           </a:p>
         </p:txBody>
@@ -5426,7 +5674,7 @@
             </a:pPr>
             <a:r>
               <a:rPr lang="en-US" b="1" dirty="0"/>
-              <a:t>Password authorization mechanism – only authorized users can play the game.</a:t>
+              <a:t>Validate all parameters passed to methods in our codebase.</a:t>
             </a:r>
           </a:p>
           <a:p>
@@ -5436,21 +5684,22 @@
               </a:lnSpc>
             </a:pPr>
             <a:r>
-              <a:rPr lang="en-US" b="1" dirty="0"/>
-              <a:t>Enforced using user/password login using </a:t>
-            </a:r>
-            <a:r>
               <a:rPr lang="en-US" b="1" dirty="0">
                 <a:solidFill>
                   <a:srgbClr val="FF0000"/>
                 </a:solidFill>
               </a:rPr>
-              <a:t>STDOUT</a:t>
+              <a:t>Concern: </a:t>
             </a:r>
             <a:r>
               <a:rPr lang="en-US" b="1" dirty="0"/>
-              <a:t>.</a:t>
-            </a:r>
+              <a:t>validation of methods.</a:t>
+            </a:r>
+            <a:endParaRPr lang="en-US" b="1" dirty="0">
+              <a:solidFill>
+                <a:srgbClr val="FF0000"/>
+              </a:solidFill>
+            </a:endParaRPr>
           </a:p>
           <a:p>
             <a:pPr>
@@ -5466,6 +5715,15 @@
               </a:rPr>
               <a:t>Pointcut: </a:t>
             </a:r>
+            <a:r>
+              <a:rPr lang="en-US" b="1" dirty="0"/>
+              <a:t>validate game launch parameters (which player we want to play).</a:t>
+            </a:r>
+            <a:endParaRPr lang="en-US" b="1" dirty="0">
+              <a:solidFill>
+                <a:srgbClr val="FF0000"/>
+              </a:solidFill>
+            </a:endParaRPr>
           </a:p>
           <a:p>
             <a:pPr>
@@ -5479,8 +5737,17 @@
                   <a:srgbClr val="FF0000"/>
                 </a:solidFill>
               </a:rPr>
-              <a:t>Advice:</a:t>
-            </a:r>
+              <a:t>Advice: </a:t>
+            </a:r>
+            <a:r>
+              <a:rPr lang="en-US" b="1" dirty="0"/>
+              <a:t>throw an exception if parameters does not match pattern.</a:t>
+            </a:r>
+            <a:endParaRPr lang="en-US" b="1" dirty="0">
+              <a:solidFill>
+                <a:srgbClr val="FF0000"/>
+              </a:solidFill>
+            </a:endParaRPr>
           </a:p>
           <a:p>
             <a:pPr>
@@ -5495,7 +5762,7 @@
     </p:spTree>
     <p:extLst>
       <p:ext uri="{BB962C8B-B14F-4D97-AF65-F5344CB8AC3E}">
-        <p14:creationId xmlns:p14="http://schemas.microsoft.com/office/powerpoint/2010/main" val="1621691119"/>
+        <p14:creationId xmlns:p14="http://schemas.microsoft.com/office/powerpoint/2010/main" val="1633021332"/>
       </p:ext>
     </p:extLst>
   </p:cSld>
@@ -5684,12 +5951,8 @@
               </a:lnSpc>
             </a:pPr>
             <a:r>
-              <a:rPr lang="en-US" b="1" dirty="0" err="1"/>
-              <a:t>Logg</a:t>
-            </a:r>
-            <a:r>
               <a:rPr lang="en-US" b="1" dirty="0"/>
-              <a:t>, audit and control game behavior.</a:t>
+              <a:t>Use existing java frameworks.</a:t>
             </a:r>
           </a:p>
           <a:p>
@@ -5699,8 +5962,12 @@
               </a:lnSpc>
             </a:pPr>
             <a:r>
+              <a:rPr lang="en-US" b="1" dirty="0" err="1"/>
+              <a:t>Logg</a:t>
+            </a:r>
+            <a:r>
               <a:rPr lang="en-US" b="1" dirty="0"/>
-              <a:t>Analyze game behavior… and more!</a:t>
+              <a:t>, audit, control game behavior… and more!</a:t>
             </a:r>
           </a:p>
         </p:txBody>
@@ -5735,172 +6002,69 @@
           <a:chExt cx="0" cy="0"/>
         </a:xfrm>
       </p:grpSpPr>
-      <p:sp>
-        <p:nvSpPr>
-          <p:cNvPr id="4" name="Title 1">
-            <a:extLst>
-              <a:ext uri="{FF2B5EF4-FFF2-40B4-BE49-F238E27FC236}">
-                <a16:creationId xmlns:a16="http://schemas.microsoft.com/office/drawing/2014/main" id="{CAC17C8E-3677-4E33-AD1C-BB70137513FC}"/>
-              </a:ext>
-            </a:extLst>
-          </p:cNvPr>
-          <p:cNvSpPr>
-            <a:spLocks noGrp="1"/>
-          </p:cNvSpPr>
-          <p:nvPr>
-            <p:ph type="title"/>
-          </p:nvPr>
-        </p:nvSpPr>
-        <p:spPr>
-          <a:xfrm>
-            <a:off x="400594" y="86450"/>
-            <a:ext cx="10515600" cy="1325563"/>
-          </a:xfrm>
-        </p:spPr>
-        <p:txBody>
-          <a:bodyPr/>
-          <a:lstStyle/>
-          <a:p>
-            <a:r>
-              <a:rPr lang="en-US" b="1" dirty="0">
-                <a:latin typeface="+mn-lt"/>
-              </a:rPr>
-              <a:t>UI Aspect:</a:t>
-            </a:r>
-          </a:p>
-        </p:txBody>
-      </p:sp>
-      <p:sp>
-        <p:nvSpPr>
-          <p:cNvPr id="5" name="Content Placeholder 2">
-            <a:extLst>
-              <a:ext uri="{FF2B5EF4-FFF2-40B4-BE49-F238E27FC236}">
-                <a16:creationId xmlns:a16="http://schemas.microsoft.com/office/drawing/2014/main" id="{507F342C-C331-44DB-ACF0-C06FE2A5C3FB}"/>
-              </a:ext>
-            </a:extLst>
-          </p:cNvPr>
-          <p:cNvSpPr>
-            <a:spLocks noGrp="1"/>
-          </p:cNvSpPr>
-          <p:nvPr>
-            <p:ph idx="1"/>
-          </p:nvPr>
-        </p:nvSpPr>
-        <p:spPr>
-          <a:xfrm>
-            <a:off x="400594" y="1201783"/>
-            <a:ext cx="11495315" cy="5468983"/>
-          </a:xfrm>
-        </p:spPr>
-        <p:txBody>
-          <a:bodyPr>
-            <a:normAutofit/>
-          </a:bodyPr>
-          <a:lstStyle/>
-          <a:p>
-            <a:pPr>
-              <a:lnSpc>
-                <a:spcPct val="150000"/>
-              </a:lnSpc>
-            </a:pPr>
-            <a:r>
-              <a:rPr lang="en-US" b="1" dirty="0"/>
-              <a:t>Update UI with informative message when fields/values are changed:</a:t>
-            </a:r>
-          </a:p>
-          <a:p>
-            <a:pPr lvl="1">
-              <a:lnSpc>
-                <a:spcPct val="150000"/>
-              </a:lnSpc>
-            </a:pPr>
-            <a:r>
-              <a:rPr lang="en-US" b="1" dirty="0" err="1"/>
-              <a:t>SpaceShip</a:t>
-            </a:r>
-            <a:r>
-              <a:rPr lang="en-US" b="1" dirty="0"/>
-              <a:t> is hit.</a:t>
-            </a:r>
-          </a:p>
-          <a:p>
-            <a:pPr lvl="1">
-              <a:lnSpc>
-                <a:spcPct val="150000"/>
-              </a:lnSpc>
-            </a:pPr>
-            <a:r>
-              <a:rPr lang="en-US" b="1" dirty="0"/>
-              <a:t>Teleport executed by </a:t>
-            </a:r>
-            <a:r>
-              <a:rPr lang="en-US" b="1" dirty="0" err="1"/>
-              <a:t>SpaceShip</a:t>
-            </a:r>
-            <a:r>
-              <a:rPr lang="en-US" b="1" dirty="0"/>
-              <a:t>.</a:t>
-            </a:r>
-          </a:p>
-          <a:p>
-            <a:pPr lvl="1">
-              <a:lnSpc>
-                <a:spcPct val="150000"/>
-              </a:lnSpc>
-            </a:pPr>
-            <a:r>
-              <a:rPr lang="en-US" b="1" dirty="0" err="1"/>
-              <a:t>SpaceShip</a:t>
-            </a:r>
-            <a:r>
-              <a:rPr lang="en-US" b="1" dirty="0"/>
-              <a:t> died.</a:t>
-            </a:r>
-          </a:p>
-          <a:p>
-            <a:pPr>
-              <a:lnSpc>
-                <a:spcPct val="150000"/>
-              </a:lnSpc>
-            </a:pPr>
-            <a:r>
-              <a:rPr lang="en-US" b="1" dirty="0">
-                <a:solidFill>
-                  <a:srgbClr val="FF0000"/>
-                </a:solidFill>
-              </a:rPr>
-              <a:t>Pointcut: </a:t>
-            </a:r>
-          </a:p>
-          <a:p>
-            <a:pPr>
-              <a:lnSpc>
-                <a:spcPct val="150000"/>
-              </a:lnSpc>
-            </a:pPr>
-            <a:r>
-              <a:rPr lang="en-US" b="1" dirty="0">
-                <a:solidFill>
-                  <a:srgbClr val="FF0000"/>
-                </a:solidFill>
-              </a:rPr>
-              <a:t>Advice:</a:t>
-            </a:r>
-          </a:p>
-          <a:p>
-            <a:pPr>
-              <a:lnSpc>
-                <a:spcPct val="150000"/>
-              </a:lnSpc>
-            </a:pPr>
-            <a:endParaRPr lang="en-US" b="1" dirty="0"/>
-          </a:p>
-        </p:txBody>
-      </p:sp>
+      <p:pic>
+        <p:nvPicPr>
+          <p:cNvPr id="6" name="Picture 5">
+            <a:extLst>
+              <a:ext uri="{FF2B5EF4-FFF2-40B4-BE49-F238E27FC236}">
+                <a16:creationId xmlns:a16="http://schemas.microsoft.com/office/drawing/2014/main" id="{7244F824-E925-4011-B15E-BE5D4FF35D41}"/>
+              </a:ext>
+            </a:extLst>
+          </p:cNvPr>
+          <p:cNvPicPr>
+            <a:picLocks noChangeAspect="1"/>
+          </p:cNvPicPr>
+          <p:nvPr/>
+        </p:nvPicPr>
+        <p:blipFill>
+          <a:blip r:embed="rId2"/>
+          <a:stretch>
+            <a:fillRect/>
+          </a:stretch>
+        </p:blipFill>
+        <p:spPr>
+          <a:xfrm>
+            <a:off x="2332138" y="5009012"/>
+            <a:ext cx="7925237" cy="1583372"/>
+          </a:xfrm>
+          <a:prstGeom prst="rect">
+            <a:avLst/>
+          </a:prstGeom>
+        </p:spPr>
+      </p:pic>
+      <p:pic>
+        <p:nvPicPr>
+          <p:cNvPr id="2" name="Picture 1">
+            <a:extLst>
+              <a:ext uri="{FF2B5EF4-FFF2-40B4-BE49-F238E27FC236}">
+                <a16:creationId xmlns:a16="http://schemas.microsoft.com/office/drawing/2014/main" id="{3F8F0494-CEDB-48D9-A47C-2690C2E8F311}"/>
+              </a:ext>
+            </a:extLst>
+          </p:cNvPr>
+          <p:cNvPicPr>
+            <a:picLocks noChangeAspect="1"/>
+          </p:cNvPicPr>
+          <p:nvPr/>
+        </p:nvPicPr>
+        <p:blipFill rotWithShape="1">
+          <a:blip r:embed="rId3"/>
+          <a:srcRect l="6103" b="2536"/>
+          <a:stretch/>
+        </p:blipFill>
+        <p:spPr>
+          <a:xfrm>
+            <a:off x="3115638" y="265616"/>
+            <a:ext cx="5354533" cy="4706443"/>
+          </a:xfrm>
+          <a:prstGeom prst="rect">
+            <a:avLst/>
+          </a:prstGeom>
+        </p:spPr>
+      </p:pic>
     </p:spTree>
     <p:extLst>
       <p:ext uri="{BB962C8B-B14F-4D97-AF65-F5344CB8AC3E}">
-        <p14:creationId xmlns:p14="http://schemas.microsoft.com/office/powerpoint/2010/main" val="2170754187"/>
+        <p14:creationId xmlns:p14="http://schemas.microsoft.com/office/powerpoint/2010/main" val="2654298937"/>
       </p:ext>
     </p:extLst>
   </p:cSld>
@@ -5929,60 +6093,159 @@
       </p:grpSpPr>
       <p:sp>
         <p:nvSpPr>
-          <p:cNvPr id="3" name="TextBox 2">
-            <a:extLst>
-              <a:ext uri="{FF2B5EF4-FFF2-40B4-BE49-F238E27FC236}">
-                <a16:creationId xmlns:a16="http://schemas.microsoft.com/office/drawing/2014/main" id="{77462736-FE3A-4BAB-8C7B-E597C0C00E8D}"/>
-              </a:ext>
-            </a:extLst>
-          </p:cNvPr>
-          <p:cNvSpPr txBox="1"/>
-          <p:nvPr/>
-        </p:nvSpPr>
-        <p:spPr>
-          <a:xfrm>
-            <a:off x="3848087" y="2334074"/>
-            <a:ext cx="4495826" cy="1754326"/>
-          </a:xfrm>
-          <a:prstGeom prst="rect">
-            <a:avLst/>
-          </a:prstGeom>
-          <a:solidFill>
-            <a:schemeClr val="tx1"/>
-          </a:solidFill>
-          <a:ln>
-            <a:solidFill>
-              <a:schemeClr val="tx1"/>
-            </a:solidFill>
-          </a:ln>
-        </p:spPr>
-        <p:txBody>
-          <a:bodyPr wrap="square" rtlCol="0">
-            <a:spAutoFit/>
+          <p:cNvPr id="4" name="Title 1">
+            <a:extLst>
+              <a:ext uri="{FF2B5EF4-FFF2-40B4-BE49-F238E27FC236}">
+                <a16:creationId xmlns:a16="http://schemas.microsoft.com/office/drawing/2014/main" id="{CAC17C8E-3677-4E33-AD1C-BB70137513FC}"/>
+              </a:ext>
+            </a:extLst>
+          </p:cNvPr>
+          <p:cNvSpPr>
+            <a:spLocks noGrp="1"/>
+          </p:cNvSpPr>
+          <p:nvPr>
+            <p:ph type="title"/>
+          </p:nvPr>
+        </p:nvSpPr>
+        <p:spPr>
+          <a:xfrm>
+            <a:off x="400594" y="86450"/>
+            <a:ext cx="10515600" cy="1325563"/>
+          </a:xfrm>
+        </p:spPr>
+        <p:txBody>
+          <a:bodyPr/>
+          <a:lstStyle/>
+          <a:p>
+            <a:r>
+              <a:rPr lang="en-US" b="1" dirty="0">
+                <a:latin typeface="+mn-lt"/>
+              </a:rPr>
+              <a:t>Authorization Aspect:</a:t>
+            </a:r>
+          </a:p>
+        </p:txBody>
+      </p:sp>
+      <p:sp>
+        <p:nvSpPr>
+          <p:cNvPr id="5" name="Content Placeholder 2">
+            <a:extLst>
+              <a:ext uri="{FF2B5EF4-FFF2-40B4-BE49-F238E27FC236}">
+                <a16:creationId xmlns:a16="http://schemas.microsoft.com/office/drawing/2014/main" id="{507F342C-C331-44DB-ACF0-C06FE2A5C3FB}"/>
+              </a:ext>
+            </a:extLst>
+          </p:cNvPr>
+          <p:cNvSpPr>
+            <a:spLocks noGrp="1"/>
+          </p:cNvSpPr>
+          <p:nvPr>
+            <p:ph idx="1"/>
+          </p:nvPr>
+        </p:nvSpPr>
+        <p:spPr>
+          <a:xfrm>
+            <a:off x="400594" y="1201783"/>
+            <a:ext cx="11495315" cy="5468983"/>
+          </a:xfrm>
+        </p:spPr>
+        <p:txBody>
+          <a:bodyPr>
+            <a:normAutofit/>
           </a:bodyPr>
           <a:lstStyle/>
           <a:p>
-            <a:pPr algn="ctr"/>
-            <a:r>
-              <a:rPr lang="en-US" sz="5400" b="1" dirty="0">
+            <a:pPr>
+              <a:lnSpc>
+                <a:spcPct val="150000"/>
+              </a:lnSpc>
+            </a:pPr>
+            <a:r>
+              <a:rPr lang="en-US" b="1" dirty="0"/>
+              <a:t>Password authorization mechanism – only authorized users can play the game.</a:t>
+            </a:r>
+          </a:p>
+          <a:p>
+            <a:pPr>
+              <a:lnSpc>
+                <a:spcPct val="150000"/>
+              </a:lnSpc>
+            </a:pPr>
+            <a:r>
+              <a:rPr lang="en-US" b="1" dirty="0"/>
+              <a:t>Enforced using user/password login using </a:t>
+            </a:r>
+            <a:r>
+              <a:rPr lang="en-US" b="1" dirty="0">
                 <a:solidFill>
-                  <a:schemeClr val="bg1"/>
+                  <a:srgbClr val="FF0000"/>
                 </a:solidFill>
               </a:rPr>
-              <a:t>Invasive Aspects</a:t>
-            </a:r>
-            <a:endParaRPr lang="en-US" sz="4800" b="1" dirty="0">
-              <a:solidFill>
-                <a:schemeClr val="bg1"/>
-              </a:solidFill>
-            </a:endParaRPr>
+              <a:t>STDOUT</a:t>
+            </a:r>
+            <a:r>
+              <a:rPr lang="en-US" b="1" dirty="0"/>
+              <a:t>.</a:t>
+            </a:r>
+          </a:p>
+          <a:p>
+            <a:pPr>
+              <a:lnSpc>
+                <a:spcPct val="150000"/>
+              </a:lnSpc>
+            </a:pPr>
+            <a:r>
+              <a:rPr lang="en-US" b="1" dirty="0">
+                <a:solidFill>
+                  <a:srgbClr val="FF0000"/>
+                </a:solidFill>
+              </a:rPr>
+              <a:t>Concern:</a:t>
+            </a:r>
+          </a:p>
+          <a:p>
+            <a:pPr>
+              <a:lnSpc>
+                <a:spcPct val="150000"/>
+              </a:lnSpc>
+            </a:pPr>
+            <a:r>
+              <a:rPr lang="en-US" b="1" dirty="0">
+                <a:solidFill>
+                  <a:srgbClr val="FF0000"/>
+                </a:solidFill>
+              </a:rPr>
+              <a:t>Pointcut: </a:t>
+            </a:r>
+          </a:p>
+          <a:p>
+            <a:pPr>
+              <a:lnSpc>
+                <a:spcPct val="150000"/>
+              </a:lnSpc>
+            </a:pPr>
+            <a:r>
+              <a:rPr lang="en-US" b="1" dirty="0">
+                <a:solidFill>
+                  <a:srgbClr val="FF0000"/>
+                </a:solidFill>
+              </a:rPr>
+              <a:t>Advice:</a:t>
+            </a:r>
+          </a:p>
+          <a:p>
+            <a:pPr>
+              <a:lnSpc>
+                <a:spcPct val="150000"/>
+              </a:lnSpc>
+            </a:pPr>
+            <a:endParaRPr lang="en-US" b="1" dirty="0"/>
           </a:p>
         </p:txBody>
       </p:sp>
     </p:spTree>
     <p:extLst>
       <p:ext uri="{BB962C8B-B14F-4D97-AF65-F5344CB8AC3E}">
-        <p14:creationId xmlns:p14="http://schemas.microsoft.com/office/powerpoint/2010/main" val="3739079832"/>
+        <p14:creationId xmlns:p14="http://schemas.microsoft.com/office/powerpoint/2010/main" val="1621691119"/>
       </p:ext>
     </p:extLst>
   </p:cSld>
@@ -6039,7 +6302,7 @@
               <a:rPr lang="en-US" b="1" dirty="0">
                 <a:latin typeface="+mn-lt"/>
               </a:rPr>
-              <a:t>Invasive Aspects:</a:t>
+              <a:t>UI Aspect:</a:t>
             </a:r>
           </a:p>
         </p:txBody>
@@ -6062,8 +6325,8 @@
         </p:nvSpPr>
         <p:spPr>
           <a:xfrm>
-            <a:off x="218114" y="1201784"/>
-            <a:ext cx="11677795" cy="2162202"/>
+            <a:off x="400594" y="1201783"/>
+            <a:ext cx="11495315" cy="5468983"/>
           </a:xfrm>
         </p:spPr>
         <p:txBody>
@@ -6072,213 +6335,124 @@
           </a:bodyPr>
           <a:lstStyle/>
           <a:p>
-            <a:pPr marL="0" indent="0">
+            <a:pPr>
               <a:lnSpc>
                 <a:spcPct val="150000"/>
               </a:lnSpc>
-              <a:buNone/>
             </a:pPr>
             <a:r>
-              <a:rPr lang="en-US" b="1" i="1" dirty="0">
-                <a:highlight>
-                  <a:srgbClr val="FFFF00"/>
-                </a:highlight>
-              </a:rPr>
-              <a:t>TODO</a:t>
-            </a:r>
-          </a:p>
-          <a:p>
-            <a:pPr marL="0" indent="0">
+              <a:rPr lang="en-US" b="1" dirty="0"/>
+              <a:t>Update UI with informative message when fields/values are changed:</a:t>
+            </a:r>
+          </a:p>
+          <a:p>
+            <a:pPr lvl="1">
               <a:lnSpc>
                 <a:spcPct val="150000"/>
               </a:lnSpc>
-              <a:buNone/>
             </a:pPr>
-            <a:endParaRPr lang="en-US" b="1" dirty="0">
-              <a:solidFill>
-                <a:srgbClr val="FF0000"/>
-              </a:solidFill>
-            </a:endParaRPr>
-          </a:p>
-        </p:txBody>
-      </p:sp>
-      <p:sp>
-        <p:nvSpPr>
-          <p:cNvPr id="2" name="Oval 1">
-            <a:extLst>
-              <a:ext uri="{FF2B5EF4-FFF2-40B4-BE49-F238E27FC236}">
-                <a16:creationId xmlns:a16="http://schemas.microsoft.com/office/drawing/2014/main" id="{BCF2E675-C3F4-427A-A354-973D66CCA7AF}"/>
-              </a:ext>
-            </a:extLst>
-          </p:cNvPr>
-          <p:cNvSpPr/>
-          <p:nvPr/>
-        </p:nvSpPr>
-        <p:spPr>
-          <a:xfrm>
-            <a:off x="4261562" y="3363983"/>
-            <a:ext cx="1602138" cy="1536585"/>
-          </a:xfrm>
-          <a:prstGeom prst="ellipse">
-            <a:avLst/>
-          </a:prstGeom>
-          <a:solidFill>
-            <a:schemeClr val="tx1"/>
-          </a:solidFill>
-          <a:ln>
-            <a:solidFill>
-              <a:schemeClr val="bg1"/>
-            </a:solidFill>
-          </a:ln>
-        </p:spPr>
-        <p:style>
-          <a:lnRef idx="2">
-            <a:schemeClr val="accent1">
-              <a:shade val="50000"/>
-            </a:schemeClr>
-          </a:lnRef>
-          <a:fillRef idx="1">
-            <a:schemeClr val="accent1"/>
-          </a:fillRef>
-          <a:effectRef idx="0">
-            <a:schemeClr val="accent1"/>
-          </a:effectRef>
-          <a:fontRef idx="minor">
-            <a:schemeClr val="lt1"/>
-          </a:fontRef>
-        </p:style>
-        <p:txBody>
-          <a:bodyPr rtlCol="0" anchor="ctr"/>
-          <a:lstStyle/>
-          <a:p>
-            <a:pPr algn="ctr"/>
-            <a:r>
-              <a:rPr lang="en-US" sz="1600" b="1" dirty="0" err="1"/>
-              <a:t>ExceptionHandler</a:t>
-            </a:r>
-            <a:r>
-              <a:rPr lang="en-US" sz="1600" b="1" dirty="0"/>
-              <a:t> Aspect</a:t>
-            </a:r>
-          </a:p>
-        </p:txBody>
-      </p:sp>
-      <p:sp>
-        <p:nvSpPr>
-          <p:cNvPr id="6" name="Oval 5">
-            <a:extLst>
-              <a:ext uri="{FF2B5EF4-FFF2-40B4-BE49-F238E27FC236}">
-                <a16:creationId xmlns:a16="http://schemas.microsoft.com/office/drawing/2014/main" id="{7F4FCC0E-5A9D-4984-A1C0-594C48631B84}"/>
-              </a:ext>
-            </a:extLst>
-          </p:cNvPr>
-          <p:cNvSpPr/>
-          <p:nvPr/>
-        </p:nvSpPr>
-        <p:spPr>
-          <a:xfrm>
-            <a:off x="1645992" y="3363984"/>
-            <a:ext cx="1602138" cy="1536585"/>
-          </a:xfrm>
-          <a:prstGeom prst="ellipse">
-            <a:avLst/>
-          </a:prstGeom>
-          <a:solidFill>
-            <a:schemeClr val="tx1"/>
-          </a:solidFill>
-          <a:ln>
-            <a:solidFill>
-              <a:schemeClr val="bg1"/>
-            </a:solidFill>
-          </a:ln>
-        </p:spPr>
-        <p:style>
-          <a:lnRef idx="2">
-            <a:schemeClr val="accent1">
-              <a:shade val="50000"/>
-            </a:schemeClr>
-          </a:lnRef>
-          <a:fillRef idx="1">
-            <a:schemeClr val="accent1"/>
-          </a:fillRef>
-          <a:effectRef idx="0">
-            <a:schemeClr val="accent1"/>
-          </a:effectRef>
-          <a:fontRef idx="minor">
-            <a:schemeClr val="lt1"/>
-          </a:fontRef>
-        </p:style>
-        <p:txBody>
-          <a:bodyPr rtlCol="0" anchor="ctr"/>
-          <a:lstStyle/>
-          <a:p>
-            <a:pPr algn="ctr"/>
-            <a:r>
-              <a:rPr lang="en-US" sz="1600" b="1" dirty="0" err="1"/>
-              <a:t>ExceptionTranslationAspect</a:t>
-            </a:r>
-            <a:endParaRPr lang="en-US" sz="1600" b="1" dirty="0"/>
-          </a:p>
-        </p:txBody>
-      </p:sp>
-      <p:sp>
-        <p:nvSpPr>
-          <p:cNvPr id="7" name="Oval 6">
-            <a:extLst>
-              <a:ext uri="{FF2B5EF4-FFF2-40B4-BE49-F238E27FC236}">
-                <a16:creationId xmlns:a16="http://schemas.microsoft.com/office/drawing/2014/main" id="{E2B9C561-C78F-4056-AE7A-9CB3495FFDD1}"/>
-              </a:ext>
-            </a:extLst>
-          </p:cNvPr>
-          <p:cNvSpPr/>
-          <p:nvPr/>
-        </p:nvSpPr>
-        <p:spPr>
-          <a:xfrm>
-            <a:off x="7678201" y="3363985"/>
-            <a:ext cx="1602138" cy="1536585"/>
-          </a:xfrm>
-          <a:prstGeom prst="ellipse">
-            <a:avLst/>
-          </a:prstGeom>
-          <a:solidFill>
-            <a:schemeClr val="tx1"/>
-          </a:solidFill>
-          <a:ln>
-            <a:solidFill>
-              <a:schemeClr val="bg1"/>
-            </a:solidFill>
-          </a:ln>
-        </p:spPr>
-        <p:style>
-          <a:lnRef idx="2">
-            <a:schemeClr val="accent1">
-              <a:shade val="50000"/>
-            </a:schemeClr>
-          </a:lnRef>
-          <a:fillRef idx="1">
-            <a:schemeClr val="accent1"/>
-          </a:fillRef>
-          <a:effectRef idx="0">
-            <a:schemeClr val="accent1"/>
-          </a:effectRef>
-          <a:fontRef idx="minor">
-            <a:schemeClr val="lt1"/>
-          </a:fontRef>
-        </p:style>
-        <p:txBody>
-          <a:bodyPr rtlCol="0" anchor="ctr"/>
-          <a:lstStyle/>
-          <a:p>
-            <a:pPr algn="ctr"/>
-            <a:endParaRPr lang="en-US" sz="1600" b="1" dirty="0"/>
+            <a:r>
+              <a:rPr lang="en-US" b="1" dirty="0" err="1"/>
+              <a:t>SpaceShip</a:t>
+            </a:r>
+            <a:r>
+              <a:rPr lang="en-US" b="1" dirty="0"/>
+              <a:t> is hit.</a:t>
+            </a:r>
+          </a:p>
+          <a:p>
+            <a:pPr lvl="1">
+              <a:lnSpc>
+                <a:spcPct val="150000"/>
+              </a:lnSpc>
+            </a:pPr>
+            <a:r>
+              <a:rPr lang="en-US" b="1" dirty="0"/>
+              <a:t>Teleport executed by </a:t>
+            </a:r>
+            <a:r>
+              <a:rPr lang="en-US" b="1" dirty="0" err="1"/>
+              <a:t>SpaceShip</a:t>
+            </a:r>
+            <a:r>
+              <a:rPr lang="en-US" b="1" dirty="0"/>
+              <a:t>.</a:t>
+            </a:r>
+          </a:p>
+          <a:p>
+            <a:pPr lvl="1">
+              <a:lnSpc>
+                <a:spcPct val="150000"/>
+              </a:lnSpc>
+            </a:pPr>
+            <a:r>
+              <a:rPr lang="en-US" b="1" dirty="0" err="1"/>
+              <a:t>SpaceShip</a:t>
+            </a:r>
+            <a:r>
+              <a:rPr lang="en-US" b="1" dirty="0"/>
+              <a:t> died.</a:t>
+            </a:r>
+          </a:p>
+          <a:p>
+            <a:pPr>
+              <a:lnSpc>
+                <a:spcPct val="150000"/>
+              </a:lnSpc>
+            </a:pPr>
+            <a:r>
+              <a:rPr lang="en-US" b="1" dirty="0">
+                <a:solidFill>
+                  <a:srgbClr val="FF0000"/>
+                </a:solidFill>
+              </a:rPr>
+              <a:t>Concern:</a:t>
+            </a:r>
+          </a:p>
+          <a:p>
+            <a:pPr>
+              <a:lnSpc>
+                <a:spcPct val="150000"/>
+              </a:lnSpc>
+            </a:pPr>
+            <a:r>
+              <a:rPr lang="en-US" b="1" dirty="0">
+                <a:solidFill>
+                  <a:srgbClr val="FF0000"/>
+                </a:solidFill>
+              </a:rPr>
+              <a:t>Pointcut: </a:t>
+            </a:r>
+          </a:p>
+          <a:p>
+            <a:pPr>
+              <a:lnSpc>
+                <a:spcPct val="150000"/>
+              </a:lnSpc>
+            </a:pPr>
+            <a:r>
+              <a:rPr lang="en-US" b="1" dirty="0">
+                <a:solidFill>
+                  <a:srgbClr val="FF0000"/>
+                </a:solidFill>
+              </a:rPr>
+              <a:t>Advice:</a:t>
+            </a:r>
+          </a:p>
+          <a:p>
+            <a:pPr>
+              <a:lnSpc>
+                <a:spcPct val="150000"/>
+              </a:lnSpc>
+            </a:pPr>
+            <a:endParaRPr lang="en-US" b="1" dirty="0"/>
           </a:p>
         </p:txBody>
       </p:sp>
     </p:spTree>
     <p:extLst>
       <p:ext uri="{BB962C8B-B14F-4D97-AF65-F5344CB8AC3E}">
-        <p14:creationId xmlns:p14="http://schemas.microsoft.com/office/powerpoint/2010/main" val="3990422798"/>
+        <p14:creationId xmlns:p14="http://schemas.microsoft.com/office/powerpoint/2010/main" val="2170754187"/>
       </p:ext>
     </p:extLst>
   </p:cSld>
@@ -6307,177 +6481,60 @@
       </p:grpSpPr>
       <p:sp>
         <p:nvSpPr>
-          <p:cNvPr id="4" name="Title 1">
-            <a:extLst>
-              <a:ext uri="{FF2B5EF4-FFF2-40B4-BE49-F238E27FC236}">
-                <a16:creationId xmlns:a16="http://schemas.microsoft.com/office/drawing/2014/main" id="{CAC17C8E-3677-4E33-AD1C-BB70137513FC}"/>
-              </a:ext>
-            </a:extLst>
-          </p:cNvPr>
-          <p:cNvSpPr>
-            <a:spLocks noGrp="1"/>
-          </p:cNvSpPr>
-          <p:nvPr>
-            <p:ph type="title"/>
-          </p:nvPr>
-        </p:nvSpPr>
-        <p:spPr>
-          <a:xfrm>
-            <a:off x="400594" y="86450"/>
-            <a:ext cx="10515600" cy="1325563"/>
-          </a:xfrm>
-        </p:spPr>
-        <p:txBody>
-          <a:bodyPr/>
-          <a:lstStyle/>
-          <a:p>
-            <a:r>
-              <a:rPr lang="en-US" b="1" dirty="0">
-                <a:latin typeface="+mn-lt"/>
-              </a:rPr>
-              <a:t>Exceptions:</a:t>
-            </a:r>
-          </a:p>
-        </p:txBody>
-      </p:sp>
-      <p:sp>
-        <p:nvSpPr>
-          <p:cNvPr id="5" name="Content Placeholder 2">
-            <a:extLst>
-              <a:ext uri="{FF2B5EF4-FFF2-40B4-BE49-F238E27FC236}">
-                <a16:creationId xmlns:a16="http://schemas.microsoft.com/office/drawing/2014/main" id="{507F342C-C331-44DB-ACF0-C06FE2A5C3FB}"/>
-              </a:ext>
-            </a:extLst>
-          </p:cNvPr>
-          <p:cNvSpPr>
-            <a:spLocks noGrp="1"/>
-          </p:cNvSpPr>
-          <p:nvPr>
-            <p:ph idx="1"/>
-          </p:nvPr>
-        </p:nvSpPr>
-        <p:spPr>
-          <a:xfrm>
-            <a:off x="157314" y="1010093"/>
-            <a:ext cx="8508513" cy="5660673"/>
-          </a:xfrm>
-        </p:spPr>
-        <p:txBody>
-          <a:bodyPr>
-            <a:normAutofit/>
-          </a:bodyPr>
-          <a:lstStyle/>
-          <a:p>
-            <a:pPr>
-              <a:lnSpc>
-                <a:spcPct val="150000"/>
-              </a:lnSpc>
-            </a:pPr>
-            <a:r>
-              <a:rPr lang="en-US" sz="2400" b="1" i="1" dirty="0"/>
-              <a:t>When an exception is thrown in Java, it is passed up the call chain until it is either </a:t>
-            </a:r>
-            <a:r>
-              <a:rPr lang="en-US" sz="2400" b="1" i="1" dirty="0">
-                <a:solidFill>
-                  <a:srgbClr val="FF0000"/>
-                </a:solidFill>
-              </a:rPr>
-              <a:t>handled</a:t>
-            </a:r>
-            <a:r>
-              <a:rPr lang="en-US" sz="2400" b="1" i="1" dirty="0"/>
-              <a:t> by a catch statement as part of a try/catch block or it reaches the Java run-time and </a:t>
-            </a:r>
-            <a:r>
-              <a:rPr lang="en-US" sz="2400" b="1" i="1" dirty="0">
-                <a:solidFill>
-                  <a:srgbClr val="FF0000"/>
-                </a:solidFill>
-              </a:rPr>
-              <a:t>causes </a:t>
-            </a:r>
-            <a:r>
-              <a:rPr lang="en-US" sz="2400" b="1" i="1" dirty="0"/>
-              <a:t>a messy message on your console. If a Java exception is caught then we can </a:t>
-            </a:r>
-            <a:r>
-              <a:rPr lang="en-US" sz="2400" b="1" i="1" dirty="0">
-                <a:solidFill>
-                  <a:srgbClr val="FF0000"/>
-                </a:solidFill>
-              </a:rPr>
-              <a:t>handle the exception </a:t>
-            </a:r>
-            <a:r>
-              <a:rPr lang="en-US" sz="2400" b="1" i="1" dirty="0"/>
-              <a:t>(log it, print it, ...).</a:t>
-            </a:r>
-          </a:p>
-          <a:p>
-            <a:pPr>
-              <a:lnSpc>
-                <a:spcPct val="150000"/>
-              </a:lnSpc>
-            </a:pPr>
-            <a:r>
-              <a:rPr lang="en-US" sz="2400" b="1" i="1" dirty="0"/>
-              <a:t>It is useful to know when an exception has been handled/occurred.</a:t>
-            </a:r>
-          </a:p>
-        </p:txBody>
-      </p:sp>
-      <p:pic>
-        <p:nvPicPr>
-          <p:cNvPr id="1026" name="Picture 2" descr="Image result for java exceptions try catch">
-            <a:extLst>
-              <a:ext uri="{FF2B5EF4-FFF2-40B4-BE49-F238E27FC236}">
-                <a16:creationId xmlns:a16="http://schemas.microsoft.com/office/drawing/2014/main" id="{3539B113-97E8-4FC9-90AD-9D6E6BD14083}"/>
-              </a:ext>
-            </a:extLst>
-          </p:cNvPr>
-          <p:cNvPicPr>
-            <a:picLocks noChangeAspect="1" noChangeArrowheads="1"/>
-          </p:cNvPicPr>
+          <p:cNvPr id="3" name="TextBox 2">
+            <a:extLst>
+              <a:ext uri="{FF2B5EF4-FFF2-40B4-BE49-F238E27FC236}">
+                <a16:creationId xmlns:a16="http://schemas.microsoft.com/office/drawing/2014/main" id="{77462736-FE3A-4BAB-8C7B-E597C0C00E8D}"/>
+              </a:ext>
+            </a:extLst>
+          </p:cNvPr>
+          <p:cNvSpPr txBox="1"/>
           <p:nvPr/>
-        </p:nvPicPr>
-        <p:blipFill>
-          <a:blip r:embed="rId2">
-            <a:extLst>
-              <a:ext uri="{28A0092B-C50C-407E-A947-70E740481C1C}">
-                <a14:useLocalDpi xmlns:a14="http://schemas.microsoft.com/office/drawing/2010/main" val="0"/>
-              </a:ext>
-            </a:extLst>
-          </a:blip>
-          <a:srcRect/>
-          <a:stretch>
-            <a:fillRect/>
-          </a:stretch>
-        </p:blipFill>
-        <p:spPr bwMode="auto">
-          <a:xfrm>
-            <a:off x="8330267" y="2159411"/>
-            <a:ext cx="3504064" cy="2539177"/>
+        </p:nvSpPr>
+        <p:spPr>
+          <a:xfrm>
+            <a:off x="3848087" y="2334074"/>
+            <a:ext cx="4495826" cy="1754326"/>
           </a:xfrm>
           <a:prstGeom prst="rect">
             <a:avLst/>
           </a:prstGeom>
-          <a:noFill/>
-          <a:extLst>
-            <a:ext uri="{909E8E84-426E-40DD-AFC4-6F175D3DCCD1}">
-              <a14:hiddenFill xmlns:a14="http://schemas.microsoft.com/office/drawing/2010/main">
+          <a:solidFill>
+            <a:schemeClr val="tx1"/>
+          </a:solidFill>
+          <a:ln>
+            <a:solidFill>
+              <a:schemeClr val="tx1"/>
+            </a:solidFill>
+          </a:ln>
+        </p:spPr>
+        <p:txBody>
+          <a:bodyPr wrap="square" rtlCol="0">
+            <a:spAutoFit/>
+          </a:bodyPr>
+          <a:lstStyle/>
+          <a:p>
+            <a:pPr algn="ctr"/>
+            <a:r>
+              <a:rPr lang="en-US" sz="5400" b="1" dirty="0">
                 <a:solidFill>
-                  <a:srgbClr val="FFFFFF"/>
+                  <a:schemeClr val="bg1"/>
                 </a:solidFill>
-              </a14:hiddenFill>
-            </a:ext>
-          </a:extLst>
-        </p:spPr>
-      </p:pic>
+              </a:rPr>
+              <a:t>Invasive Aspects</a:t>
+            </a:r>
+            <a:endParaRPr lang="en-US" sz="4800" b="1" dirty="0">
+              <a:solidFill>
+                <a:schemeClr val="bg1"/>
+              </a:solidFill>
+            </a:endParaRPr>
+          </a:p>
+        </p:txBody>
+      </p:sp>
     </p:spTree>
     <p:extLst>
       <p:ext uri="{BB962C8B-B14F-4D97-AF65-F5344CB8AC3E}">
-        <p14:creationId xmlns:p14="http://schemas.microsoft.com/office/powerpoint/2010/main" val="2916240712"/>
+        <p14:creationId xmlns:p14="http://schemas.microsoft.com/office/powerpoint/2010/main" val="3739079832"/>
       </p:ext>
     </p:extLst>
   </p:cSld>
@@ -6531,14 +6588,11 @@
           <a:lstStyle/>
           <a:p>
             <a:r>
-              <a:rPr lang="en-US" b="1" dirty="0" err="1">
+              <a:rPr lang="en-US" b="1" dirty="0">
                 <a:latin typeface="+mn-lt"/>
               </a:rPr>
-              <a:t>ExceptionHandlerAspect</a:t>
-            </a:r>
-            <a:endParaRPr lang="en-US" b="1" dirty="0">
-              <a:latin typeface="+mn-lt"/>
-            </a:endParaRPr>
+              <a:t>Invasive Aspects:</a:t>
+            </a:r>
           </a:p>
         </p:txBody>
       </p:sp>
@@ -6560,8 +6614,8 @@
         </p:nvSpPr>
         <p:spPr>
           <a:xfrm>
-            <a:off x="400595" y="1010093"/>
-            <a:ext cx="11284586" cy="5660673"/>
+            <a:off x="218114" y="1201784"/>
+            <a:ext cx="11677795" cy="2162202"/>
           </a:xfrm>
         </p:spPr>
         <p:txBody>
@@ -6569,87 +6623,6 @@
             <a:normAutofit/>
           </a:bodyPr>
           <a:lstStyle/>
-          <a:p>
-            <a:pPr>
-              <a:lnSpc>
-                <a:spcPct val="150000"/>
-              </a:lnSpc>
-            </a:pPr>
-            <a:r>
-              <a:rPr lang="en-US" sz="2400" b="1" dirty="0">
-                <a:solidFill>
-                  <a:srgbClr val="FF0000"/>
-                </a:solidFill>
-              </a:rPr>
-              <a:t>Concern:</a:t>
-            </a:r>
-            <a:r>
-              <a:rPr lang="en-US" sz="2400" b="1" dirty="0"/>
-              <a:t> exceptions not caught in code, one place to take monitor/handle them.</a:t>
-            </a:r>
-          </a:p>
-          <a:p>
-            <a:pPr>
-              <a:lnSpc>
-                <a:spcPct val="150000"/>
-              </a:lnSpc>
-            </a:pPr>
-            <a:r>
-              <a:rPr lang="en-US" sz="2400" b="1" i="1" dirty="0">
-                <a:solidFill>
-                  <a:srgbClr val="FF0000"/>
-                </a:solidFill>
-              </a:rPr>
-              <a:t>Pointcut: </a:t>
-            </a:r>
-            <a:r>
-              <a:rPr lang="en-US" sz="2400" b="1" i="1" dirty="0"/>
-              <a:t>any exception is thrown but not handled (</a:t>
-            </a:r>
-            <a:r>
-              <a:rPr lang="en-US" sz="2400" b="1" i="1" dirty="0" err="1"/>
-              <a:t>catched</a:t>
-            </a:r>
-            <a:r>
-              <a:rPr lang="en-US" sz="2400" b="1" i="1" dirty="0"/>
-              <a:t>).</a:t>
-            </a:r>
-          </a:p>
-          <a:p>
-            <a:pPr>
-              <a:lnSpc>
-                <a:spcPct val="150000"/>
-              </a:lnSpc>
-            </a:pPr>
-            <a:r>
-              <a:rPr lang="en-US" sz="2400" b="1" i="1" dirty="0">
-                <a:solidFill>
-                  <a:srgbClr val="FF0000"/>
-                </a:solidFill>
-              </a:rPr>
-              <a:t>Advice: </a:t>
-            </a:r>
-            <a:r>
-              <a:rPr lang="en-US" sz="2400" b="1" i="1" dirty="0"/>
-              <a:t>logs the exception and throws </a:t>
-            </a:r>
-            <a:r>
-              <a:rPr lang="en-US" sz="2400" b="1" i="1" dirty="0" err="1"/>
-              <a:t>UnhandledException</a:t>
-            </a:r>
-            <a:r>
-              <a:rPr lang="en-US" sz="2400" b="1" i="1" dirty="0"/>
-              <a:t>(</a:t>
-            </a:r>
-            <a:r>
-              <a:rPr lang="en-US" sz="2400" b="1" i="1" dirty="0" err="1"/>
-              <a:t>msg</a:t>
-            </a:r>
-            <a:r>
-              <a:rPr lang="en-US" sz="2400" b="1" i="1" dirty="0"/>
-              <a:t>).</a:t>
-            </a:r>
-          </a:p>
           <a:p>
             <a:pPr marL="0" indent="0">
               <a:lnSpc>
@@ -6657,74 +6630,210 @@
               </a:lnSpc>
               <a:buNone/>
             </a:pPr>
-            <a:endParaRPr lang="en-US" sz="2400" b="1" dirty="0"/>
-          </a:p>
-        </p:txBody>
-      </p:sp>
-      <p:pic>
-        <p:nvPicPr>
-          <p:cNvPr id="2" name="Picture 1">
-            <a:extLst>
-              <a:ext uri="{FF2B5EF4-FFF2-40B4-BE49-F238E27FC236}">
-                <a16:creationId xmlns:a16="http://schemas.microsoft.com/office/drawing/2014/main" id="{58E11952-6FC9-4707-B67B-5A9B34E6C0F4}"/>
-              </a:ext>
-            </a:extLst>
-          </p:cNvPr>
-          <p:cNvPicPr>
-            <a:picLocks noChangeAspect="1"/>
-          </p:cNvPicPr>
+            <a:r>
+              <a:rPr lang="en-US" b="1" i="1" dirty="0">
+                <a:highlight>
+                  <a:srgbClr val="FFFF00"/>
+                </a:highlight>
+              </a:rPr>
+              <a:t>TODO</a:t>
+            </a:r>
+          </a:p>
+          <a:p>
+            <a:pPr marL="0" indent="0">
+              <a:lnSpc>
+                <a:spcPct val="150000"/>
+              </a:lnSpc>
+              <a:buNone/>
+            </a:pPr>
+            <a:endParaRPr lang="en-US" b="1" dirty="0">
+              <a:solidFill>
+                <a:srgbClr val="FF0000"/>
+              </a:solidFill>
+            </a:endParaRPr>
+          </a:p>
+        </p:txBody>
+      </p:sp>
+      <p:sp>
+        <p:nvSpPr>
+          <p:cNvPr id="2" name="Oval 1">
+            <a:extLst>
+              <a:ext uri="{FF2B5EF4-FFF2-40B4-BE49-F238E27FC236}">
+                <a16:creationId xmlns:a16="http://schemas.microsoft.com/office/drawing/2014/main" id="{BCF2E675-C3F4-427A-A354-973D66CCA7AF}"/>
+              </a:ext>
+            </a:extLst>
+          </p:cNvPr>
+          <p:cNvSpPr/>
           <p:nvPr/>
-        </p:nvPicPr>
-        <p:blipFill>
-          <a:blip r:embed="rId2"/>
-          <a:stretch>
-            <a:fillRect/>
-          </a:stretch>
-        </p:blipFill>
-        <p:spPr>
-          <a:xfrm>
-            <a:off x="2769291" y="5547392"/>
-            <a:ext cx="5778205" cy="1123374"/>
-          </a:xfrm>
-          <a:prstGeom prst="rect">
+        </p:nvSpPr>
+        <p:spPr>
+          <a:xfrm>
+            <a:off x="4513800" y="3363983"/>
+            <a:ext cx="1602138" cy="1536585"/>
+          </a:xfrm>
+          <a:prstGeom prst="ellipse">
             <a:avLst/>
           </a:prstGeom>
-        </p:spPr>
-      </p:pic>
-      <p:pic>
-        <p:nvPicPr>
-          <p:cNvPr id="3" name="Picture 2">
-            <a:extLst>
-              <a:ext uri="{FF2B5EF4-FFF2-40B4-BE49-F238E27FC236}">
-                <a16:creationId xmlns:a16="http://schemas.microsoft.com/office/drawing/2014/main" id="{C92848CC-56D5-4692-A2A9-819A7745B6A4}"/>
-              </a:ext>
-            </a:extLst>
-          </p:cNvPr>
-          <p:cNvPicPr>
-            <a:picLocks noChangeAspect="1"/>
-          </p:cNvPicPr>
+          <a:solidFill>
+            <a:srgbClr val="FF0000"/>
+          </a:solidFill>
+          <a:ln>
+            <a:solidFill>
+              <a:schemeClr val="bg1"/>
+            </a:solidFill>
+          </a:ln>
+        </p:spPr>
+        <p:style>
+          <a:lnRef idx="2">
+            <a:schemeClr val="accent1">
+              <a:shade val="50000"/>
+            </a:schemeClr>
+          </a:lnRef>
+          <a:fillRef idx="1">
+            <a:schemeClr val="accent1"/>
+          </a:fillRef>
+          <a:effectRef idx="0">
+            <a:schemeClr val="accent1"/>
+          </a:effectRef>
+          <a:fontRef idx="minor">
+            <a:schemeClr val="lt1"/>
+          </a:fontRef>
+        </p:style>
+        <p:txBody>
+          <a:bodyPr rtlCol="0" anchor="ctr"/>
+          <a:lstStyle/>
+          <a:p>
+            <a:pPr algn="ctr"/>
+            <a:r>
+              <a:rPr lang="en-US" sz="1600" b="1" dirty="0" err="1"/>
+              <a:t>ExceptionHandler</a:t>
+            </a:r>
+            <a:r>
+              <a:rPr lang="en-US" sz="1600" b="1" dirty="0"/>
+              <a:t> Aspect</a:t>
+            </a:r>
+          </a:p>
+        </p:txBody>
+      </p:sp>
+      <p:sp>
+        <p:nvSpPr>
+          <p:cNvPr id="6" name="Oval 5">
+            <a:extLst>
+              <a:ext uri="{FF2B5EF4-FFF2-40B4-BE49-F238E27FC236}">
+                <a16:creationId xmlns:a16="http://schemas.microsoft.com/office/drawing/2014/main" id="{7F4FCC0E-5A9D-4984-A1C0-594C48631B84}"/>
+              </a:ext>
+            </a:extLst>
+          </p:cNvPr>
+          <p:cNvSpPr/>
           <p:nvPr/>
-        </p:nvPicPr>
-        <p:blipFill>
-          <a:blip r:embed="rId3"/>
-          <a:stretch>
-            <a:fillRect/>
-          </a:stretch>
-        </p:blipFill>
-        <p:spPr>
-          <a:xfrm>
-            <a:off x="2881603" y="3095537"/>
-            <a:ext cx="5356798" cy="2229767"/>
-          </a:xfrm>
-          <a:prstGeom prst="rect">
+        </p:nvSpPr>
+        <p:spPr>
+          <a:xfrm>
+            <a:off x="1645992" y="3363984"/>
+            <a:ext cx="1602138" cy="1536585"/>
+          </a:xfrm>
+          <a:prstGeom prst="ellipse">
             <a:avLst/>
           </a:prstGeom>
-        </p:spPr>
-      </p:pic>
+          <a:solidFill>
+            <a:srgbClr val="FF0000"/>
+          </a:solidFill>
+          <a:ln>
+            <a:solidFill>
+              <a:schemeClr val="bg1"/>
+            </a:solidFill>
+          </a:ln>
+        </p:spPr>
+        <p:style>
+          <a:lnRef idx="2">
+            <a:schemeClr val="accent1">
+              <a:shade val="50000"/>
+            </a:schemeClr>
+          </a:lnRef>
+          <a:fillRef idx="1">
+            <a:schemeClr val="accent1"/>
+          </a:fillRef>
+          <a:effectRef idx="0">
+            <a:schemeClr val="accent1"/>
+          </a:effectRef>
+          <a:fontRef idx="minor">
+            <a:schemeClr val="lt1"/>
+          </a:fontRef>
+        </p:style>
+        <p:txBody>
+          <a:bodyPr rtlCol="0" anchor="ctr"/>
+          <a:lstStyle/>
+          <a:p>
+            <a:pPr algn="ctr"/>
+            <a:r>
+              <a:rPr lang="en-US" sz="1600" b="1" dirty="0" err="1"/>
+              <a:t>ExceptionTranslationAspect</a:t>
+            </a:r>
+            <a:endParaRPr lang="en-US" sz="1600" b="1" dirty="0"/>
+          </a:p>
+        </p:txBody>
+      </p:sp>
+      <p:sp>
+        <p:nvSpPr>
+          <p:cNvPr id="7" name="Oval 6">
+            <a:extLst>
+              <a:ext uri="{FF2B5EF4-FFF2-40B4-BE49-F238E27FC236}">
+                <a16:creationId xmlns:a16="http://schemas.microsoft.com/office/drawing/2014/main" id="{E2B9C561-C78F-4056-AE7A-9CB3495FFDD1}"/>
+              </a:ext>
+            </a:extLst>
+          </p:cNvPr>
+          <p:cNvSpPr/>
+          <p:nvPr/>
+        </p:nvSpPr>
+        <p:spPr>
+          <a:xfrm>
+            <a:off x="7678201" y="3363985"/>
+            <a:ext cx="1602138" cy="1536585"/>
+          </a:xfrm>
+          <a:prstGeom prst="ellipse">
+            <a:avLst/>
+          </a:prstGeom>
+          <a:solidFill>
+            <a:srgbClr val="FF0000"/>
+          </a:solidFill>
+          <a:ln>
+            <a:solidFill>
+              <a:schemeClr val="bg1"/>
+            </a:solidFill>
+          </a:ln>
+        </p:spPr>
+        <p:style>
+          <a:lnRef idx="2">
+            <a:schemeClr val="accent1">
+              <a:shade val="50000"/>
+            </a:schemeClr>
+          </a:lnRef>
+          <a:fillRef idx="1">
+            <a:schemeClr val="accent1"/>
+          </a:fillRef>
+          <a:effectRef idx="0">
+            <a:schemeClr val="accent1"/>
+          </a:effectRef>
+          <a:fontRef idx="minor">
+            <a:schemeClr val="lt1"/>
+          </a:fontRef>
+        </p:style>
+        <p:txBody>
+          <a:bodyPr rtlCol="0" anchor="ctr"/>
+          <a:lstStyle/>
+          <a:p>
+            <a:pPr algn="ctr"/>
+            <a:r>
+              <a:rPr lang="en-US" sz="1600" b="1" dirty="0"/>
+              <a:t>Design Patterns Aspect</a:t>
+            </a:r>
+          </a:p>
+        </p:txBody>
+      </p:sp>
     </p:spTree>
     <p:extLst>
       <p:ext uri="{BB962C8B-B14F-4D97-AF65-F5344CB8AC3E}">
-        <p14:creationId xmlns:p14="http://schemas.microsoft.com/office/powerpoint/2010/main" val="1696651618"/>
+        <p14:creationId xmlns:p14="http://schemas.microsoft.com/office/powerpoint/2010/main" val="3990422798"/>
       </p:ext>
     </p:extLst>
   </p:cSld>
@@ -6778,16 +6887,10 @@
           <a:lstStyle/>
           <a:p>
             <a:r>
-              <a:rPr lang="en-US" b="1" dirty="0" err="1">
-                <a:latin typeface="+mn-lt"/>
-              </a:rPr>
-              <a:t>ExceptionTranslationAspect</a:t>
-            </a:r>
-            <a:r>
               <a:rPr lang="en-US" b="1" dirty="0">
                 <a:latin typeface="+mn-lt"/>
               </a:rPr>
-              <a:t>, the concern:</a:t>
+              <a:t>Exceptions:</a:t>
             </a:r>
           </a:p>
         </p:txBody>
@@ -6810,8 +6913,8 @@
         </p:nvSpPr>
         <p:spPr>
           <a:xfrm>
-            <a:off x="400595" y="1010093"/>
-            <a:ext cx="11284586" cy="5660673"/>
+            <a:off x="157314" y="1010093"/>
+            <a:ext cx="8508513" cy="5660673"/>
           </a:xfrm>
         </p:spPr>
         <p:txBody>
@@ -6827,7 +6930,7 @@
             </a:pPr>
             <a:r>
               <a:rPr lang="en-US" sz="2400" b="1" i="1" dirty="0"/>
-              <a:t>Assume we use a third-party library (</a:t>
+              <a:t>When an exception is thrown in Java, it is passed up the call chain until it is either </a:t>
             </a:r>
             <a:r>
               <a:rPr lang="en-US" sz="2400" b="1" i="1" dirty="0">
@@ -6835,35 +6938,11 @@
                   <a:srgbClr val="FF0000"/>
                 </a:solidFill>
               </a:rPr>
-              <a:t>some ORM library</a:t>
+              <a:t>handled</a:t>
             </a:r>
             <a:r>
               <a:rPr lang="en-US" sz="2400" b="1" i="1" dirty="0"/>
-              <a:t>) which helps us transform RDBMS tables to Java objects. This library throws exceptions (</a:t>
-            </a:r>
-            <a:r>
-              <a:rPr lang="en-US" sz="2400" b="1" i="1" dirty="0" err="1"/>
-              <a:t>NoTableExistException</a:t>
-            </a:r>
-            <a:r>
-              <a:rPr lang="en-US" sz="2400" b="1" i="1" dirty="0"/>
-              <a:t>, </a:t>
-            </a:r>
-            <a:r>
-              <a:rPr lang="en-US" sz="2400" b="1" i="1" dirty="0" err="1"/>
-              <a:t>RecordException</a:t>
-            </a:r>
-            <a:r>
-              <a:rPr lang="en-US" sz="2400" b="1" i="1" dirty="0"/>
-              <a:t>, </a:t>
-            </a:r>
-            <a:r>
-              <a:rPr lang="en-US" sz="2400" b="1" i="1" dirty="0" err="1"/>
-              <a:t>etc</a:t>
-            </a:r>
-            <a:r>
-              <a:rPr lang="en-US" sz="2400" b="1" i="1" dirty="0"/>
-              <a:t>…). We would like to </a:t>
+              <a:t> by a catch statement as part of a try/catch block or it reaches the Java run-time and </a:t>
             </a:r>
             <a:r>
               <a:rPr lang="en-US" sz="2400" b="1" i="1" dirty="0">
@@ -6871,23 +6950,23 @@
                   <a:srgbClr val="FF0000"/>
                 </a:solidFill>
               </a:rPr>
-              <a:t>convert those exceptions to our APPLICATION exceptions: </a:t>
-            </a:r>
-            <a:r>
-              <a:rPr lang="en-US" sz="2400" b="1" i="1" dirty="0" err="1"/>
-              <a:t>DataAccessException</a:t>
+              <a:t>causes </a:t>
             </a:r>
             <a:r>
               <a:rPr lang="en-US" sz="2400" b="1" i="1" dirty="0"/>
-              <a:t>,  </a:t>
-            </a:r>
-            <a:r>
-              <a:rPr lang="en-US" sz="2400" b="1" i="1" dirty="0" err="1"/>
-              <a:t>PersistenceLayerException</a:t>
+              <a:t>a messy message on your console. If a Java exception is caught then we can </a:t>
+            </a:r>
+            <a:r>
+              <a:rPr lang="en-US" sz="2400" b="1" i="1" dirty="0">
+                <a:solidFill>
+                  <a:srgbClr val="FF0000"/>
+                </a:solidFill>
+              </a:rPr>
+              <a:t>handle the exception </a:t>
             </a:r>
             <a:r>
               <a:rPr lang="en-US" sz="2400" b="1" i="1" dirty="0"/>
-              <a:t>. </a:t>
+              <a:t>(log it, print it, ...).</a:t>
             </a:r>
           </a:p>
           <a:p>
@@ -6898,87 +6977,62 @@
             </a:pPr>
             <a:r>
               <a:rPr lang="en-US" sz="2400" b="1" i="1" dirty="0"/>
-              <a:t>Lots of code will be </a:t>
-            </a:r>
-            <a:r>
-              <a:rPr lang="en-US" sz="2400" b="1" i="1" dirty="0">
-                <a:solidFill>
-                  <a:srgbClr val="FF0000"/>
-                </a:solidFill>
-              </a:rPr>
-              <a:t>scattered</a:t>
-            </a:r>
-            <a:r>
-              <a:rPr lang="en-US" sz="2400" b="1" i="1" dirty="0"/>
-              <a:t> over our codebase, with </a:t>
-            </a:r>
-            <a:r>
-              <a:rPr lang="en-US" sz="2400" b="1" i="1" dirty="0">
-                <a:solidFill>
-                  <a:srgbClr val="FF0000"/>
-                </a:solidFill>
-              </a:rPr>
-              <a:t>tangled</a:t>
-            </a:r>
-            <a:r>
-              <a:rPr lang="en-US" sz="2400" b="1" i="1" dirty="0"/>
-              <a:t> conversions.</a:t>
-            </a:r>
-          </a:p>
-          <a:p>
-            <a:pPr>
-              <a:lnSpc>
-                <a:spcPct val="150000"/>
-              </a:lnSpc>
-            </a:pPr>
-            <a:r>
-              <a:rPr lang="en-US" sz="2400" b="1" i="1" dirty="0"/>
-              <a:t>This can be taken care separately in an Aspect, making our code more clean and concise.</a:t>
-            </a:r>
-          </a:p>
-          <a:p>
-            <a:pPr>
-              <a:lnSpc>
-                <a:spcPct val="150000"/>
-              </a:lnSpc>
-            </a:pPr>
-            <a:endParaRPr lang="en-US" sz="2400" b="1" i="1" dirty="0"/>
+              <a:t>It is useful to know when an exception has been handled/occurred.</a:t>
+            </a:r>
           </a:p>
         </p:txBody>
       </p:sp>
       <p:pic>
         <p:nvPicPr>
-          <p:cNvPr id="2" name="Picture 1">
-            <a:extLst>
-              <a:ext uri="{FF2B5EF4-FFF2-40B4-BE49-F238E27FC236}">
-                <a16:creationId xmlns:a16="http://schemas.microsoft.com/office/drawing/2014/main" id="{916FA2C5-607D-4599-BCA3-FD80C2B687E9}"/>
+          <p:cNvPr id="1026" name="Picture 2" descr="Image result for java exceptions try catch">
+            <a:extLst>
+              <a:ext uri="{FF2B5EF4-FFF2-40B4-BE49-F238E27FC236}">
+                <a16:creationId xmlns:a16="http://schemas.microsoft.com/office/drawing/2014/main" id="{3539B113-97E8-4FC9-90AD-9D6E6BD14083}"/>
               </a:ext>
             </a:extLst>
           </p:cNvPr>
           <p:cNvPicPr>
-            <a:picLocks noChangeAspect="1"/>
+            <a:picLocks noChangeAspect="1" noChangeArrowheads="1"/>
           </p:cNvPicPr>
           <p:nvPr/>
         </p:nvPicPr>
-        <p:blipFill rotWithShape="1">
-          <a:blip r:embed="rId2"/>
-          <a:srcRect l="4415" r="3668" b="5536"/>
-          <a:stretch/>
+        <p:blipFill>
+          <a:blip r:embed="rId2">
+            <a:extLst>
+              <a:ext uri="{28A0092B-C50C-407E-A947-70E740481C1C}">
+                <a14:useLocalDpi xmlns:a14="http://schemas.microsoft.com/office/drawing/2010/main" val="0"/>
+              </a:ext>
+            </a:extLst>
+          </a:blip>
+          <a:srcRect/>
+          <a:stretch>
+            <a:fillRect/>
+          </a:stretch>
         </p:blipFill>
-        <p:spPr>
-          <a:xfrm>
-            <a:off x="5658394" y="4681533"/>
-            <a:ext cx="5899951" cy="1989233"/>
+        <p:spPr bwMode="auto">
+          <a:xfrm>
+            <a:off x="8330267" y="2159411"/>
+            <a:ext cx="3504064" cy="2539177"/>
           </a:xfrm>
           <a:prstGeom prst="rect">
             <a:avLst/>
           </a:prstGeom>
+          <a:noFill/>
+          <a:extLst>
+            <a:ext uri="{909E8E84-426E-40DD-AFC4-6F175D3DCCD1}">
+              <a14:hiddenFill xmlns:a14="http://schemas.microsoft.com/office/drawing/2010/main">
+                <a:solidFill>
+                  <a:srgbClr val="FFFFFF"/>
+                </a:solidFill>
+              </a14:hiddenFill>
+            </a:ext>
+          </a:extLst>
         </p:spPr>
       </p:pic>
     </p:spTree>
     <p:extLst>
       <p:ext uri="{BB962C8B-B14F-4D97-AF65-F5344CB8AC3E}">
-        <p14:creationId xmlns:p14="http://schemas.microsoft.com/office/powerpoint/2010/main" val="3599381813"/>
+        <p14:creationId xmlns:p14="http://schemas.microsoft.com/office/powerpoint/2010/main" val="2916240712"/>
       </p:ext>
     </p:extLst>
   </p:cSld>
@@ -7032,14 +7086,11 @@
           <a:lstStyle/>
           <a:p>
             <a:r>
-              <a:rPr lang="en-US" b="1" dirty="0" err="1">
+              <a:rPr lang="en-US" b="1" dirty="0">
                 <a:latin typeface="+mn-lt"/>
               </a:rPr>
-              <a:t>ExceptionTranslatorAspect</a:t>
-            </a:r>
-            <a:endParaRPr lang="en-US" b="1" dirty="0">
-              <a:latin typeface="+mn-lt"/>
-            </a:endParaRPr>
+              <a:t>ExceptionHandlerAspect1</a:t>
+            </a:r>
           </a:p>
         </p:txBody>
       </p:sp>
@@ -7061,8 +7112,8 @@
         </p:nvSpPr>
         <p:spPr>
           <a:xfrm>
-            <a:off x="125835" y="1116419"/>
-            <a:ext cx="7407479" cy="5554347"/>
+            <a:off x="400595" y="1010093"/>
+            <a:ext cx="11284586" cy="5660673"/>
           </a:xfrm>
         </p:spPr>
         <p:txBody>
@@ -7086,13 +7137,8 @@
             </a:r>
             <a:r>
               <a:rPr lang="en-US" sz="2400" b="1" dirty="0"/>
-              <a:t> noted above.</a:t>
-            </a:r>
-            <a:endParaRPr lang="en-US" sz="2400" b="1" dirty="0">
-              <a:solidFill>
-                <a:srgbClr val="FF0000"/>
-              </a:solidFill>
-            </a:endParaRPr>
+              <a:t> exceptions not caught in code, one place to take monitor/handle them.</a:t>
+            </a:r>
           </a:p>
           <a:p>
             <a:pPr>
@@ -7110,15 +7156,15 @@
             </a:r>
             <a:r>
               <a:rPr lang="en-US" sz="2400" b="1" i="1" dirty="0"/>
-              <a:t>a </a:t>
+              <a:t>any exception is thrown but not handled (</a:t>
             </a:r>
             <a:r>
               <a:rPr lang="en-US" sz="2400" b="1" i="1" dirty="0" err="1"/>
-              <a:t>KeyboardException</a:t>
+              <a:t>catched</a:t>
             </a:r>
             <a:r>
               <a:rPr lang="en-US" sz="2400" b="1" i="1" dirty="0"/>
-              <a:t> is thrown  (ESC is pressed)</a:t>
+              <a:t>).</a:t>
             </a:r>
           </a:p>
           <a:p>
@@ -7137,44 +7183,42 @@
             </a:r>
             <a:r>
               <a:rPr lang="en-US" sz="2400" b="1" i="1" dirty="0"/>
-              <a:t>Translate 3</a:t>
-            </a:r>
-            <a:r>
-              <a:rPr lang="en-US" sz="2400" b="1" i="1" baseline="30000" dirty="0"/>
-              <a:t>rd</a:t>
+              <a:t>logs the exception and throws </a:t>
+            </a:r>
+            <a:r>
+              <a:rPr lang="en-US" sz="2400" b="1" i="1" dirty="0" err="1"/>
+              <a:t>UnhandledException</a:t>
             </a:r>
             <a:r>
               <a:rPr lang="en-US" sz="2400" b="1" i="1" dirty="0"/>
-              <a:t> party thrown exception into our application exception.</a:t>
-            </a:r>
-          </a:p>
-          <a:p>
-            <a:pPr>
+              <a:t>(</a:t>
+            </a:r>
+            <a:r>
+              <a:rPr lang="en-US" sz="2400" b="1" i="1" dirty="0" err="1"/>
+              <a:t>msg</a:t>
+            </a:r>
+            <a:r>
+              <a:rPr lang="en-US" sz="2400" b="1" i="1" dirty="0"/>
+              <a:t>).</a:t>
+            </a:r>
+          </a:p>
+          <a:p>
+            <a:pPr marL="0" indent="0">
               <a:lnSpc>
                 <a:spcPct val="150000"/>
               </a:lnSpc>
+              <a:buNone/>
             </a:pPr>
-            <a:r>
-              <a:rPr lang="en-US" sz="2400" b="1" i="1" dirty="0" err="1">
-                <a:solidFill>
-                  <a:srgbClr val="FF0000"/>
-                </a:solidFill>
-              </a:rPr>
-              <a:t>ProceedingJointPoint</a:t>
-            </a:r>
-            <a:r>
-              <a:rPr lang="en-US" sz="2400" b="1" i="1" dirty="0"/>
-              <a:t>: an around advice is a special advice that can control when and if a method (or other join point) is executed. so they require an argument of type PJP, whereas other advices just use JP.</a:t>
-            </a:r>
+            <a:endParaRPr lang="en-US" sz="2400" b="1" dirty="0"/>
           </a:p>
         </p:txBody>
       </p:sp>
       <p:pic>
         <p:nvPicPr>
-          <p:cNvPr id="3" name="Picture 2">
-            <a:extLst>
-              <a:ext uri="{FF2B5EF4-FFF2-40B4-BE49-F238E27FC236}">
-                <a16:creationId xmlns:a16="http://schemas.microsoft.com/office/drawing/2014/main" id="{FB8C3ACA-AF67-425D-801A-91FA3380E055}"/>
+          <p:cNvPr id="2" name="Picture 1">
+            <a:extLst>
+              <a:ext uri="{FF2B5EF4-FFF2-40B4-BE49-F238E27FC236}">
+                <a16:creationId xmlns:a16="http://schemas.microsoft.com/office/drawing/2014/main" id="{58E11952-6FC9-4707-B67B-5A9B34E6C0F4}"/>
               </a:ext>
             </a:extLst>
           </p:cNvPr>
@@ -7183,15 +7227,16 @@
           </p:cNvPicPr>
           <p:nvPr/>
         </p:nvPicPr>
-        <p:blipFill rotWithShape="1">
+        <p:blipFill>
           <a:blip r:embed="rId2"/>
-          <a:srcRect l="4202" r="4131"/>
-          <a:stretch/>
+          <a:stretch>
+            <a:fillRect/>
+          </a:stretch>
         </p:blipFill>
         <p:spPr>
           <a:xfrm>
-            <a:off x="7357145" y="868914"/>
-            <a:ext cx="4530056" cy="2285345"/>
+            <a:off x="2318009" y="5547392"/>
+            <a:ext cx="6296599" cy="1224158"/>
           </a:xfrm>
           <a:prstGeom prst="rect">
             <a:avLst/>
@@ -7200,10 +7245,10 @@
       </p:pic>
       <p:pic>
         <p:nvPicPr>
-          <p:cNvPr id="6" name="Picture 5">
-            <a:extLst>
-              <a:ext uri="{FF2B5EF4-FFF2-40B4-BE49-F238E27FC236}">
-                <a16:creationId xmlns:a16="http://schemas.microsoft.com/office/drawing/2014/main" id="{A75B7A1E-574B-44AA-BE59-767919BC74E9}"/>
+          <p:cNvPr id="3" name="Picture 2">
+            <a:extLst>
+              <a:ext uri="{FF2B5EF4-FFF2-40B4-BE49-F238E27FC236}">
+                <a16:creationId xmlns:a16="http://schemas.microsoft.com/office/drawing/2014/main" id="{C92848CC-56D5-4692-A2A9-819A7745B6A4}"/>
               </a:ext>
             </a:extLst>
           </p:cNvPr>
@@ -7212,15 +7257,16 @@
           </p:cNvPicPr>
           <p:nvPr/>
         </p:nvPicPr>
-        <p:blipFill rotWithShape="1">
+        <p:blipFill>
           <a:blip r:embed="rId3"/>
-          <a:srcRect l="5305"/>
-          <a:stretch/>
+          <a:stretch>
+            <a:fillRect/>
+          </a:stretch>
         </p:blipFill>
         <p:spPr>
           <a:xfrm>
-            <a:off x="7222921" y="3566964"/>
-            <a:ext cx="4775588" cy="1352372"/>
+            <a:off x="2782654" y="3104883"/>
+            <a:ext cx="5679256" cy="2363990"/>
           </a:xfrm>
           <a:prstGeom prst="rect">
             <a:avLst/>
@@ -7230,7 +7276,7 @@
     </p:spTree>
     <p:extLst>
       <p:ext uri="{BB962C8B-B14F-4D97-AF65-F5344CB8AC3E}">
-        <p14:creationId xmlns:p14="http://schemas.microsoft.com/office/powerpoint/2010/main" val="596891456"/>
+        <p14:creationId xmlns:p14="http://schemas.microsoft.com/office/powerpoint/2010/main" val="1696651618"/>
       </p:ext>
     </p:extLst>
   </p:cSld>
@@ -7259,60 +7305,138 @@
       </p:grpSpPr>
       <p:sp>
         <p:nvSpPr>
-          <p:cNvPr id="5" name="TextBox 4">
-            <a:extLst>
-              <a:ext uri="{FF2B5EF4-FFF2-40B4-BE49-F238E27FC236}">
-                <a16:creationId xmlns:a16="http://schemas.microsoft.com/office/drawing/2014/main" id="{0470CAB3-69C7-4708-B6B1-132C92342460}"/>
-              </a:ext>
-            </a:extLst>
-          </p:cNvPr>
-          <p:cNvSpPr txBox="1"/>
-          <p:nvPr/>
-        </p:nvSpPr>
-        <p:spPr>
-          <a:xfrm>
-            <a:off x="3263295" y="2334074"/>
-            <a:ext cx="5933477" cy="923330"/>
-          </a:xfrm>
-          <a:prstGeom prst="rect">
-            <a:avLst/>
-          </a:prstGeom>
-          <a:solidFill>
-            <a:schemeClr val="tx1"/>
-          </a:solidFill>
-          <a:ln>
-            <a:solidFill>
-              <a:schemeClr val="tx1"/>
-            </a:solidFill>
-          </a:ln>
-        </p:spPr>
-        <p:txBody>
-          <a:bodyPr wrap="square" rtlCol="0">
-            <a:spAutoFit/>
+          <p:cNvPr id="4" name="Title 1">
+            <a:extLst>
+              <a:ext uri="{FF2B5EF4-FFF2-40B4-BE49-F238E27FC236}">
+                <a16:creationId xmlns:a16="http://schemas.microsoft.com/office/drawing/2014/main" id="{CAC17C8E-3677-4E33-AD1C-BB70137513FC}"/>
+              </a:ext>
+            </a:extLst>
+          </p:cNvPr>
+          <p:cNvSpPr>
+            <a:spLocks noGrp="1"/>
+          </p:cNvSpPr>
+          <p:nvPr>
+            <p:ph type="title"/>
+          </p:nvPr>
+        </p:nvSpPr>
+        <p:spPr>
+          <a:xfrm>
+            <a:off x="400594" y="86450"/>
+            <a:ext cx="10515600" cy="1325563"/>
+          </a:xfrm>
+        </p:spPr>
+        <p:txBody>
+          <a:bodyPr/>
+          <a:lstStyle/>
+          <a:p>
+            <a:r>
+              <a:rPr lang="en-US" b="1" dirty="0">
+                <a:latin typeface="+mn-lt"/>
+              </a:rPr>
+              <a:t>ExceptionHandlerAspect2</a:t>
+            </a:r>
+          </a:p>
+        </p:txBody>
+      </p:sp>
+      <p:sp>
+        <p:nvSpPr>
+          <p:cNvPr id="5" name="Content Placeholder 2">
+            <a:extLst>
+              <a:ext uri="{FF2B5EF4-FFF2-40B4-BE49-F238E27FC236}">
+                <a16:creationId xmlns:a16="http://schemas.microsoft.com/office/drawing/2014/main" id="{507F342C-C331-44DB-ACF0-C06FE2A5C3FB}"/>
+              </a:ext>
+            </a:extLst>
+          </p:cNvPr>
+          <p:cNvSpPr>
+            <a:spLocks noGrp="1"/>
+          </p:cNvSpPr>
+          <p:nvPr>
+            <p:ph idx="1"/>
+          </p:nvPr>
+        </p:nvSpPr>
+        <p:spPr>
+          <a:xfrm>
+            <a:off x="400595" y="1010093"/>
+            <a:ext cx="11284586" cy="5660673"/>
+          </a:xfrm>
+        </p:spPr>
+        <p:txBody>
+          <a:bodyPr>
+            <a:normAutofit/>
           </a:bodyPr>
           <a:lstStyle/>
           <a:p>
-            <a:pPr algn="ctr"/>
-            <a:r>
-              <a:rPr lang="en-US" sz="5400" b="1" dirty="0">
+            <a:pPr>
+              <a:lnSpc>
+                <a:spcPct val="150000"/>
+              </a:lnSpc>
+            </a:pPr>
+            <a:r>
+              <a:rPr lang="en-US" sz="2400" b="1" dirty="0">
                 <a:solidFill>
-                  <a:schemeClr val="bg1"/>
+                  <a:srgbClr val="FF0000"/>
                 </a:solidFill>
               </a:rPr>
-              <a:t>Testing the aspects</a:t>
-            </a:r>
-            <a:endParaRPr lang="en-US" sz="4800" b="1" dirty="0">
-              <a:solidFill>
-                <a:schemeClr val="bg1"/>
-              </a:solidFill>
-            </a:endParaRPr>
+              <a:t>Concern:</a:t>
+            </a:r>
+            <a:r>
+              <a:rPr lang="en-US" sz="2400" b="1" dirty="0"/>
+              <a:t> exceptions are caught by a specific class over and over again, determine which class catches a specific exception and do something on it without touching the existing codebase.</a:t>
+            </a:r>
+          </a:p>
+          <a:p>
+            <a:pPr>
+              <a:lnSpc>
+                <a:spcPct val="150000"/>
+              </a:lnSpc>
+            </a:pPr>
+            <a:r>
+              <a:rPr lang="en-US" sz="2400" b="1" i="1" dirty="0">
+                <a:solidFill>
+                  <a:srgbClr val="FF0000"/>
+                </a:solidFill>
+              </a:rPr>
+              <a:t>Pointcut: </a:t>
+            </a:r>
+            <a:r>
+              <a:rPr lang="en-US" sz="2400" b="1" i="1" dirty="0"/>
+              <a:t>exception handled by class X.</a:t>
+            </a:r>
+          </a:p>
+          <a:p>
+            <a:pPr>
+              <a:lnSpc>
+                <a:spcPct val="150000"/>
+              </a:lnSpc>
+            </a:pPr>
+            <a:r>
+              <a:rPr lang="en-US" sz="2400" b="1" i="1" dirty="0">
+                <a:solidFill>
+                  <a:srgbClr val="FF0000"/>
+                </a:solidFill>
+              </a:rPr>
+              <a:t>Advice: </a:t>
+            </a:r>
+            <a:r>
+              <a:rPr lang="en-US" sz="2400" b="1" i="1" dirty="0"/>
+              <a:t>do Y on that specific case.</a:t>
+            </a:r>
+          </a:p>
+          <a:p>
+            <a:pPr marL="0" indent="0">
+              <a:lnSpc>
+                <a:spcPct val="150000"/>
+              </a:lnSpc>
+              <a:buNone/>
+            </a:pPr>
+            <a:endParaRPr lang="en-US" sz="2400" b="1" dirty="0"/>
           </a:p>
         </p:txBody>
       </p:sp>
     </p:spTree>
     <p:extLst>
       <p:ext uri="{BB962C8B-B14F-4D97-AF65-F5344CB8AC3E}">
-        <p14:creationId xmlns:p14="http://schemas.microsoft.com/office/powerpoint/2010/main" val="2841633555"/>
+        <p14:creationId xmlns:p14="http://schemas.microsoft.com/office/powerpoint/2010/main" val="603592867"/>
       </p:ext>
     </p:extLst>
   </p:cSld>
@@ -7366,13 +7490,16 @@
           <a:lstStyle/>
           <a:p>
             <a:r>
+              <a:rPr lang="en-US" b="1" dirty="0" err="1">
+                <a:latin typeface="+mn-lt"/>
+              </a:rPr>
+              <a:t>ExceptionTranslationAspect</a:t>
+            </a:r>
+            <a:r>
               <a:rPr lang="en-US" b="1" dirty="0">
-                <a:highlight>
-                  <a:srgbClr val="FFFF00"/>
-                </a:highlight>
                 <a:latin typeface="+mn-lt"/>
               </a:rPr>
-              <a:t>Testing our aspects – unit testing aspects?</a:t>
+              <a:t>, the concern:</a:t>
             </a:r>
           </a:p>
         </p:txBody>
@@ -7395,8 +7522,8 @@
         </p:nvSpPr>
         <p:spPr>
           <a:xfrm>
-            <a:off x="400594" y="1201783"/>
-            <a:ext cx="11495315" cy="5468983"/>
+            <a:off x="400595" y="1010093"/>
+            <a:ext cx="11284586" cy="5660673"/>
           </a:xfrm>
         </p:spPr>
         <p:txBody>
@@ -7411,24 +7538,159 @@
               </a:lnSpc>
             </a:pPr>
             <a:r>
-              <a:rPr lang="en-US" b="1" dirty="0"/>
-              <a:t>Logging Aspect – just by checking the written files. If have time &lt;write </a:t>
-            </a:r>
-            <a:r>
-              <a:rPr lang="en-US" b="1" dirty="0" err="1"/>
-              <a:t>uni</a:t>
-            </a:r>
-            <a:r>
-              <a:rPr lang="en-US" b="1" dirty="0"/>
-              <a:t> test to check file&gt;</a:t>
-            </a:r>
-          </a:p>
-        </p:txBody>
-      </p:sp>
+              <a:rPr lang="en-US" sz="2400" b="1" i="1" dirty="0"/>
+              <a:t>Assume we use a third-party library (</a:t>
+            </a:r>
+            <a:r>
+              <a:rPr lang="en-US" sz="2400" b="1" i="1" dirty="0">
+                <a:solidFill>
+                  <a:srgbClr val="FF0000"/>
+                </a:solidFill>
+              </a:rPr>
+              <a:t>some ORM library</a:t>
+            </a:r>
+            <a:r>
+              <a:rPr lang="en-US" sz="2400" b="1" i="1" dirty="0"/>
+              <a:t>) which helps us transform RDBMS tables to Java objects. This library throws exceptions (</a:t>
+            </a:r>
+            <a:r>
+              <a:rPr lang="en-US" sz="2400" b="1" i="1" dirty="0" err="1"/>
+              <a:t>NoTableExistException</a:t>
+            </a:r>
+            <a:r>
+              <a:rPr lang="en-US" sz="2400" b="1" i="1" dirty="0"/>
+              <a:t>, </a:t>
+            </a:r>
+            <a:r>
+              <a:rPr lang="en-US" sz="2400" b="1" i="1" dirty="0" err="1"/>
+              <a:t>RecordException</a:t>
+            </a:r>
+            <a:r>
+              <a:rPr lang="en-US" sz="2400" b="1" i="1" dirty="0"/>
+              <a:t>, </a:t>
+            </a:r>
+            <a:r>
+              <a:rPr lang="en-US" sz="2400" b="1" i="1" dirty="0" err="1"/>
+              <a:t>etc</a:t>
+            </a:r>
+            <a:r>
+              <a:rPr lang="en-US" sz="2400" b="1" i="1" dirty="0"/>
+              <a:t>…). We would like to </a:t>
+            </a:r>
+            <a:r>
+              <a:rPr lang="en-US" sz="2400" b="1" i="1" dirty="0">
+                <a:solidFill>
+                  <a:srgbClr val="FF0000"/>
+                </a:solidFill>
+              </a:rPr>
+              <a:t>convert those exceptions to our APPLICATION exceptions: </a:t>
+            </a:r>
+            <a:r>
+              <a:rPr lang="en-US" sz="2400" b="1" i="1" dirty="0" err="1"/>
+              <a:t>DataAccessException</a:t>
+            </a:r>
+            <a:r>
+              <a:rPr lang="en-US" sz="2400" b="1" i="1" dirty="0"/>
+              <a:t>,  </a:t>
+            </a:r>
+            <a:r>
+              <a:rPr lang="en-US" sz="2400" b="1" i="1" dirty="0" err="1"/>
+              <a:t>PersistenceLayerException</a:t>
+            </a:r>
+            <a:r>
+              <a:rPr lang="en-US" sz="2400" b="1" i="1" dirty="0"/>
+              <a:t>. </a:t>
+            </a:r>
+          </a:p>
+          <a:p>
+            <a:pPr>
+              <a:lnSpc>
+                <a:spcPct val="150000"/>
+              </a:lnSpc>
+            </a:pPr>
+            <a:r>
+              <a:rPr lang="en-US" sz="2400" b="1" i="1" dirty="0"/>
+              <a:t>Lots of code will be </a:t>
+            </a:r>
+            <a:r>
+              <a:rPr lang="en-US" sz="2400" b="1" i="1" dirty="0">
+                <a:solidFill>
+                  <a:srgbClr val="FF0000"/>
+                </a:solidFill>
+              </a:rPr>
+              <a:t>scattered</a:t>
+            </a:r>
+            <a:r>
+              <a:rPr lang="en-US" sz="2400" b="1" i="1" dirty="0"/>
+              <a:t> over our codebase, with </a:t>
+            </a:r>
+            <a:r>
+              <a:rPr lang="en-US" sz="2400" b="1" i="1" dirty="0">
+                <a:solidFill>
+                  <a:srgbClr val="FF0000"/>
+                </a:solidFill>
+              </a:rPr>
+              <a:t>tangled</a:t>
+            </a:r>
+            <a:r>
+              <a:rPr lang="en-US" sz="2400" b="1" i="1" dirty="0"/>
+              <a:t> conversions.</a:t>
+            </a:r>
+          </a:p>
+          <a:p>
+            <a:pPr>
+              <a:lnSpc>
+                <a:spcPct val="150000"/>
+              </a:lnSpc>
+            </a:pPr>
+            <a:r>
+              <a:rPr lang="en-US" sz="2400" b="1" i="1" dirty="0"/>
+              <a:t>This can be taken care separately in an Aspect, making our code more clean and concise.</a:t>
+            </a:r>
+          </a:p>
+          <a:p>
+            <a:pPr>
+              <a:lnSpc>
+                <a:spcPct val="150000"/>
+              </a:lnSpc>
+            </a:pPr>
+            <a:endParaRPr lang="en-US" sz="2400" b="1" i="1" dirty="0"/>
+          </a:p>
+        </p:txBody>
+      </p:sp>
+      <p:pic>
+        <p:nvPicPr>
+          <p:cNvPr id="2" name="Picture 1">
+            <a:extLst>
+              <a:ext uri="{FF2B5EF4-FFF2-40B4-BE49-F238E27FC236}">
+                <a16:creationId xmlns:a16="http://schemas.microsoft.com/office/drawing/2014/main" id="{916FA2C5-607D-4599-BCA3-FD80C2B687E9}"/>
+              </a:ext>
+            </a:extLst>
+          </p:cNvPr>
+          <p:cNvPicPr>
+            <a:picLocks noChangeAspect="1"/>
+          </p:cNvPicPr>
+          <p:nvPr/>
+        </p:nvPicPr>
+        <p:blipFill rotWithShape="1">
+          <a:blip r:embed="rId2"/>
+          <a:srcRect l="4415" r="3668" b="5536"/>
+          <a:stretch/>
+        </p:blipFill>
+        <p:spPr>
+          <a:xfrm>
+            <a:off x="5658394" y="4681533"/>
+            <a:ext cx="5899951" cy="1989233"/>
+          </a:xfrm>
+          <a:prstGeom prst="rect">
+            <a:avLst/>
+          </a:prstGeom>
+        </p:spPr>
+      </p:pic>
     </p:spTree>
     <p:extLst>
       <p:ext uri="{BB962C8B-B14F-4D97-AF65-F5344CB8AC3E}">
-        <p14:creationId xmlns:p14="http://schemas.microsoft.com/office/powerpoint/2010/main" val="3605706162"/>
+        <p14:creationId xmlns:p14="http://schemas.microsoft.com/office/powerpoint/2010/main" val="3599381813"/>
       </p:ext>
     </p:extLst>
   </p:cSld>
@@ -7482,14 +7744,14 @@
           <a:lstStyle/>
           <a:p>
             <a:r>
-              <a:rPr lang="en-US" b="1" dirty="0">
-                <a:highlight>
-                  <a:srgbClr val="FFFF00"/>
-                </a:highlight>
+              <a:rPr lang="en-US" b="1" dirty="0" err="1">
                 <a:latin typeface="+mn-lt"/>
               </a:rPr>
-              <a:t>TODO</a:t>
-            </a:r>
+              <a:t>ExceptionTranslatorAspect</a:t>
+            </a:r>
+            <a:endParaRPr lang="en-US" b="1" dirty="0">
+              <a:latin typeface="+mn-lt"/>
+            </a:endParaRPr>
           </a:p>
         </p:txBody>
       </p:sp>
@@ -7511,8 +7773,8 @@
         </p:nvSpPr>
         <p:spPr>
           <a:xfrm>
-            <a:off x="400594" y="1201783"/>
-            <a:ext cx="11495315" cy="5468983"/>
+            <a:off x="125835" y="1116419"/>
+            <a:ext cx="7407479" cy="5554347"/>
           </a:xfrm>
         </p:spPr>
         <p:txBody>
@@ -7527,26 +7789,22 @@
               </a:lnSpc>
             </a:pPr>
             <a:r>
-              <a:rPr lang="en-US" b="1" dirty="0" err="1"/>
-              <a:t>StartGame</a:t>
-            </a:r>
-            <a:r>
-              <a:rPr lang="en-US" b="1" dirty="0"/>
-              <a:t>/</a:t>
-            </a:r>
-            <a:r>
-              <a:rPr lang="en-US" b="1" dirty="0" err="1"/>
-              <a:t>EndGame</a:t>
-            </a:r>
-            <a:r>
-              <a:rPr lang="en-US" b="1" dirty="0"/>
-              <a:t> message to </a:t>
-            </a:r>
-            <a:r>
-              <a:rPr lang="en-US" b="1" dirty="0" err="1"/>
-              <a:t>stdout</a:t>
-            </a:r>
-            <a:endParaRPr lang="en-US" b="1" dirty="0"/>
+              <a:rPr lang="en-US" sz="2400" b="1" dirty="0">
+                <a:solidFill>
+                  <a:srgbClr val="FF0000"/>
+                </a:solidFill>
+              </a:rPr>
+              <a:t>Concern:</a:t>
+            </a:r>
+            <a:r>
+              <a:rPr lang="en-US" sz="2400" b="1" dirty="0"/>
+              <a:t> noted above.</a:t>
+            </a:r>
+            <a:endParaRPr lang="en-US" sz="2400" b="1" dirty="0">
+              <a:solidFill>
+                <a:srgbClr val="FF0000"/>
+              </a:solidFill>
+            </a:endParaRPr>
           </a:p>
           <a:p>
             <a:pPr>
@@ -7555,8 +7813,24 @@
               </a:lnSpc>
             </a:pPr>
             <a:r>
-              <a:rPr lang="en-US" b="1" dirty="0"/>
-              <a:t>Copy code lines to our PPT</a:t>
+              <a:rPr lang="en-US" sz="2400" b="1" i="1" dirty="0">
+                <a:solidFill>
+                  <a:srgbClr val="FF0000"/>
+                </a:solidFill>
+              </a:rPr>
+              <a:t>Pointcut: </a:t>
+            </a:r>
+            <a:r>
+              <a:rPr lang="en-US" sz="2400" b="1" i="1" dirty="0"/>
+              <a:t>a </a:t>
+            </a:r>
+            <a:r>
+              <a:rPr lang="en-US" sz="2400" b="1" i="1" dirty="0" err="1"/>
+              <a:t>KeyboardException</a:t>
+            </a:r>
+            <a:r>
+              <a:rPr lang="en-US" sz="2400" b="1" i="1" dirty="0"/>
+              <a:t> is thrown  (ESC is pressed)</a:t>
             </a:r>
           </a:p>
           <a:p>
@@ -7566,16 +7840,109 @@
               </a:lnSpc>
             </a:pPr>
             <a:r>
-              <a:rPr lang="en-US" b="1" dirty="0"/>
-              <a:t>Test aspects</a:t>
-            </a:r>
-          </a:p>
-        </p:txBody>
-      </p:sp>
+              <a:rPr lang="en-US" sz="2400" b="1" i="1" dirty="0">
+                <a:solidFill>
+                  <a:srgbClr val="FF0000"/>
+                </a:solidFill>
+              </a:rPr>
+              <a:t>Advice: </a:t>
+            </a:r>
+            <a:r>
+              <a:rPr lang="en-US" sz="2400" b="1" i="1" dirty="0"/>
+              <a:t>Translate 3</a:t>
+            </a:r>
+            <a:r>
+              <a:rPr lang="en-US" sz="2400" b="1" i="1" baseline="30000" dirty="0"/>
+              <a:t>rd</a:t>
+            </a:r>
+            <a:r>
+              <a:rPr lang="en-US" sz="2400" b="1" i="1" dirty="0"/>
+              <a:t> party thrown exception into our application exception.</a:t>
+            </a:r>
+          </a:p>
+          <a:p>
+            <a:pPr>
+              <a:lnSpc>
+                <a:spcPct val="150000"/>
+              </a:lnSpc>
+            </a:pPr>
+            <a:r>
+              <a:rPr lang="en-US" sz="2400" b="1" i="1" dirty="0" err="1">
+                <a:solidFill>
+                  <a:srgbClr val="FF0000"/>
+                </a:solidFill>
+              </a:rPr>
+              <a:t>ProceedingJointPoint</a:t>
+            </a:r>
+            <a:r>
+              <a:rPr lang="en-US" sz="2400" b="1" i="1" dirty="0"/>
+              <a:t>: an around advice is a special advice that can control when and if a method (or other join point) is executed. so they require an argument of type PJP, whereas other advices just use JP.</a:t>
+            </a:r>
+          </a:p>
+        </p:txBody>
+      </p:sp>
+      <p:pic>
+        <p:nvPicPr>
+          <p:cNvPr id="3" name="Picture 2">
+            <a:extLst>
+              <a:ext uri="{FF2B5EF4-FFF2-40B4-BE49-F238E27FC236}">
+                <a16:creationId xmlns:a16="http://schemas.microsoft.com/office/drawing/2014/main" id="{FB8C3ACA-AF67-425D-801A-91FA3380E055}"/>
+              </a:ext>
+            </a:extLst>
+          </p:cNvPr>
+          <p:cNvPicPr>
+            <a:picLocks noChangeAspect="1"/>
+          </p:cNvPicPr>
+          <p:nvPr/>
+        </p:nvPicPr>
+        <p:blipFill rotWithShape="1">
+          <a:blip r:embed="rId2"/>
+          <a:srcRect l="4202" r="4131"/>
+          <a:stretch/>
+        </p:blipFill>
+        <p:spPr>
+          <a:xfrm>
+            <a:off x="7357145" y="868914"/>
+            <a:ext cx="4530056" cy="2285345"/>
+          </a:xfrm>
+          <a:prstGeom prst="rect">
+            <a:avLst/>
+          </a:prstGeom>
+        </p:spPr>
+      </p:pic>
+      <p:pic>
+        <p:nvPicPr>
+          <p:cNvPr id="6" name="Picture 5">
+            <a:extLst>
+              <a:ext uri="{FF2B5EF4-FFF2-40B4-BE49-F238E27FC236}">
+                <a16:creationId xmlns:a16="http://schemas.microsoft.com/office/drawing/2014/main" id="{A75B7A1E-574B-44AA-BE59-767919BC74E9}"/>
+              </a:ext>
+            </a:extLst>
+          </p:cNvPr>
+          <p:cNvPicPr>
+            <a:picLocks noChangeAspect="1"/>
+          </p:cNvPicPr>
+          <p:nvPr/>
+        </p:nvPicPr>
+        <p:blipFill rotWithShape="1">
+          <a:blip r:embed="rId3"/>
+          <a:srcRect l="5305"/>
+          <a:stretch/>
+        </p:blipFill>
+        <p:spPr>
+          <a:xfrm>
+            <a:off x="7222921" y="3566964"/>
+            <a:ext cx="4775588" cy="1352372"/>
+          </a:xfrm>
+          <a:prstGeom prst="rect">
+            <a:avLst/>
+          </a:prstGeom>
+        </p:spPr>
+      </p:pic>
     </p:spTree>
     <p:extLst>
       <p:ext uri="{BB962C8B-B14F-4D97-AF65-F5344CB8AC3E}">
-        <p14:creationId xmlns:p14="http://schemas.microsoft.com/office/powerpoint/2010/main" val="3667126705"/>
+        <p14:creationId xmlns:p14="http://schemas.microsoft.com/office/powerpoint/2010/main" val="596891456"/>
       </p:ext>
     </p:extLst>
   </p:cSld>
@@ -7629,14 +7996,20 @@
           <a:lstStyle/>
           <a:p>
             <a:r>
-              <a:rPr lang="en-US" b="1" dirty="0"/>
+              <a:rPr lang="en-US" b="1" dirty="0">
+                <a:latin typeface="Calibri (Body)"/>
+              </a:rPr>
               <a:t>Base class: </a:t>
             </a:r>
             <a:r>
-              <a:rPr lang="en-US" b="1" dirty="0" err="1"/>
+              <a:rPr lang="en-US" b="1" dirty="0" err="1">
+                <a:latin typeface="Calibri (Body)"/>
+              </a:rPr>
               <a:t>SpaceWars</a:t>
             </a:r>
-            <a:endParaRPr lang="en-US" b="1" dirty="0"/>
+            <a:endParaRPr lang="en-US" b="1" dirty="0">
+              <a:latin typeface="Calibri (Body)"/>
+            </a:endParaRPr>
           </a:p>
         </p:txBody>
       </p:sp>
@@ -7679,15 +8052,11 @@
             </a:r>
             <a:r>
               <a:rPr lang="en-US" dirty="0"/>
-              <a:t> is a 1977 vector graphics arcade game based on the 1962PDP-1 program </a:t>
-            </a:r>
-            <a:r>
-              <a:rPr lang="en-US" i="1" dirty="0"/>
-              <a:t>Spacewar!</a:t>
-            </a:r>
-            <a:r>
-              <a:rPr lang="en-US" dirty="0"/>
-              <a:t>. </a:t>
+              <a:t> </a:t>
+            </a:r>
+            <a:r>
+              <a:rPr lang="en-US" b="1" i="1" dirty="0"/>
+              <a:t>is a 1977 vector graphics arcade game based on the 1962PDP-1 program Spacewar!. </a:t>
             </a:r>
           </a:p>
           <a:p>
@@ -7803,6 +8172,926 @@
     <p:extLst>
       <p:ext uri="{BB962C8B-B14F-4D97-AF65-F5344CB8AC3E}">
         <p14:creationId xmlns:p14="http://schemas.microsoft.com/office/powerpoint/2010/main" val="2173555499"/>
+      </p:ext>
+    </p:extLst>
+  </p:cSld>
+  <p:clrMapOvr>
+    <a:masterClrMapping/>
+  </p:clrMapOvr>
+</p:sld>
+</file>
+
+<file path=ppt/slides/slide30.xml><?xml version="1.0" encoding="utf-8"?>
+<p:sld xmlns:a="http://schemas.openxmlformats.org/drawingml/2006/main" xmlns:r="http://schemas.openxmlformats.org/officeDocument/2006/relationships" xmlns:p="http://schemas.openxmlformats.org/presentationml/2006/main">
+  <p:cSld>
+    <p:spTree>
+      <p:nvGrpSpPr>
+        <p:cNvPr id="1" name=""/>
+        <p:cNvGrpSpPr/>
+        <p:nvPr/>
+      </p:nvGrpSpPr>
+      <p:grpSpPr>
+        <a:xfrm>
+          <a:off x="0" y="0"/>
+          <a:ext cx="0" cy="0"/>
+          <a:chOff x="0" y="0"/>
+          <a:chExt cx="0" cy="0"/>
+        </a:xfrm>
+      </p:grpSpPr>
+      <p:sp>
+        <p:nvSpPr>
+          <p:cNvPr id="4" name="Title 1">
+            <a:extLst>
+              <a:ext uri="{FF2B5EF4-FFF2-40B4-BE49-F238E27FC236}">
+                <a16:creationId xmlns:a16="http://schemas.microsoft.com/office/drawing/2014/main" id="{CAC17C8E-3677-4E33-AD1C-BB70137513FC}"/>
+              </a:ext>
+            </a:extLst>
+          </p:cNvPr>
+          <p:cNvSpPr>
+            <a:spLocks noGrp="1"/>
+          </p:cNvSpPr>
+          <p:nvPr>
+            <p:ph type="title"/>
+          </p:nvPr>
+        </p:nvSpPr>
+        <p:spPr>
+          <a:xfrm>
+            <a:off x="400594" y="86450"/>
+            <a:ext cx="10515600" cy="1325563"/>
+          </a:xfrm>
+        </p:spPr>
+        <p:txBody>
+          <a:bodyPr/>
+          <a:lstStyle/>
+          <a:p>
+            <a:r>
+              <a:rPr lang="en-US" b="1" dirty="0">
+                <a:latin typeface="+mn-lt"/>
+              </a:rPr>
+              <a:t>Design Patterns Aspect</a:t>
+            </a:r>
+          </a:p>
+        </p:txBody>
+      </p:sp>
+      <p:pic>
+        <p:nvPicPr>
+          <p:cNvPr id="1026" name="Picture 2" descr="Image result for GoF book">
+            <a:extLst>
+              <a:ext uri="{FF2B5EF4-FFF2-40B4-BE49-F238E27FC236}">
+                <a16:creationId xmlns:a16="http://schemas.microsoft.com/office/drawing/2014/main" id="{966E0442-254E-4253-B496-BAF659BB4D0B}"/>
+              </a:ext>
+            </a:extLst>
+          </p:cNvPr>
+          <p:cNvPicPr>
+            <a:picLocks noChangeAspect="1" noChangeArrowheads="1"/>
+          </p:cNvPicPr>
+          <p:nvPr/>
+        </p:nvPicPr>
+        <p:blipFill>
+          <a:blip r:embed="rId2">
+            <a:extLst>
+              <a:ext uri="{28A0092B-C50C-407E-A947-70E740481C1C}">
+                <a14:useLocalDpi xmlns:a14="http://schemas.microsoft.com/office/drawing/2010/main" val="0"/>
+              </a:ext>
+            </a:extLst>
+          </a:blip>
+          <a:srcRect/>
+          <a:stretch>
+            <a:fillRect/>
+          </a:stretch>
+        </p:blipFill>
+        <p:spPr bwMode="auto">
+          <a:xfrm>
+            <a:off x="2021747" y="1284853"/>
+            <a:ext cx="7103747" cy="5327810"/>
+          </a:xfrm>
+          <a:prstGeom prst="rect">
+            <a:avLst/>
+          </a:prstGeom>
+          <a:ln>
+            <a:noFill/>
+          </a:ln>
+          <a:effectLst>
+            <a:softEdge rad="112500"/>
+          </a:effectLst>
+          <a:extLst>
+            <a:ext uri="{909E8E84-426E-40DD-AFC4-6F175D3DCCD1}">
+              <a14:hiddenFill xmlns:a14="http://schemas.microsoft.com/office/drawing/2010/main">
+                <a:solidFill>
+                  <a:srgbClr val="FFFFFF"/>
+                </a:solidFill>
+              </a14:hiddenFill>
+            </a:ext>
+          </a:extLst>
+        </p:spPr>
+      </p:pic>
+    </p:spTree>
+    <p:extLst>
+      <p:ext uri="{BB962C8B-B14F-4D97-AF65-F5344CB8AC3E}">
+        <p14:creationId xmlns:p14="http://schemas.microsoft.com/office/powerpoint/2010/main" val="2422268095"/>
+      </p:ext>
+    </p:extLst>
+  </p:cSld>
+  <p:clrMapOvr>
+    <a:masterClrMapping/>
+  </p:clrMapOvr>
+</p:sld>
+</file>
+
+<file path=ppt/slides/slide31.xml><?xml version="1.0" encoding="utf-8"?>
+<p:sld xmlns:a="http://schemas.openxmlformats.org/drawingml/2006/main" xmlns:r="http://schemas.openxmlformats.org/officeDocument/2006/relationships" xmlns:p="http://schemas.openxmlformats.org/presentationml/2006/main">
+  <p:cSld>
+    <p:spTree>
+      <p:nvGrpSpPr>
+        <p:cNvPr id="1" name=""/>
+        <p:cNvGrpSpPr/>
+        <p:nvPr/>
+      </p:nvGrpSpPr>
+      <p:grpSpPr>
+        <a:xfrm>
+          <a:off x="0" y="0"/>
+          <a:ext cx="0" cy="0"/>
+          <a:chOff x="0" y="0"/>
+          <a:chExt cx="0" cy="0"/>
+        </a:xfrm>
+      </p:grpSpPr>
+      <p:sp>
+        <p:nvSpPr>
+          <p:cNvPr id="4" name="Title 1">
+            <a:extLst>
+              <a:ext uri="{FF2B5EF4-FFF2-40B4-BE49-F238E27FC236}">
+                <a16:creationId xmlns:a16="http://schemas.microsoft.com/office/drawing/2014/main" id="{CAC17C8E-3677-4E33-AD1C-BB70137513FC}"/>
+              </a:ext>
+            </a:extLst>
+          </p:cNvPr>
+          <p:cNvSpPr>
+            <a:spLocks noGrp="1"/>
+          </p:cNvSpPr>
+          <p:nvPr>
+            <p:ph type="title"/>
+          </p:nvPr>
+        </p:nvSpPr>
+        <p:spPr>
+          <a:xfrm>
+            <a:off x="333482" y="80621"/>
+            <a:ext cx="10515600" cy="1325563"/>
+          </a:xfrm>
+        </p:spPr>
+        <p:txBody>
+          <a:bodyPr/>
+          <a:lstStyle/>
+          <a:p>
+            <a:r>
+              <a:rPr lang="en-US" b="1" dirty="0">
+                <a:latin typeface="+mn-lt"/>
+              </a:rPr>
+              <a:t>Design Patterns Aspect</a:t>
+            </a:r>
+          </a:p>
+        </p:txBody>
+      </p:sp>
+      <p:pic>
+        <p:nvPicPr>
+          <p:cNvPr id="2" name="Picture 1">
+            <a:extLst>
+              <a:ext uri="{FF2B5EF4-FFF2-40B4-BE49-F238E27FC236}">
+                <a16:creationId xmlns:a16="http://schemas.microsoft.com/office/drawing/2014/main" id="{91A2A1B7-4B54-4644-B4AE-AF5029AADC84}"/>
+              </a:ext>
+            </a:extLst>
+          </p:cNvPr>
+          <p:cNvPicPr>
+            <a:picLocks noChangeAspect="1"/>
+          </p:cNvPicPr>
+          <p:nvPr/>
+        </p:nvPicPr>
+        <p:blipFill>
+          <a:blip r:embed="rId2"/>
+          <a:stretch>
+            <a:fillRect/>
+          </a:stretch>
+        </p:blipFill>
+        <p:spPr>
+          <a:xfrm>
+            <a:off x="2610095" y="1020897"/>
+            <a:ext cx="6169671" cy="5750653"/>
+          </a:xfrm>
+          <a:prstGeom prst="rect">
+            <a:avLst/>
+          </a:prstGeom>
+        </p:spPr>
+      </p:pic>
+    </p:spTree>
+    <p:extLst>
+      <p:ext uri="{BB962C8B-B14F-4D97-AF65-F5344CB8AC3E}">
+        <p14:creationId xmlns:p14="http://schemas.microsoft.com/office/powerpoint/2010/main" val="567078856"/>
+      </p:ext>
+    </p:extLst>
+  </p:cSld>
+  <p:clrMapOvr>
+    <a:masterClrMapping/>
+  </p:clrMapOvr>
+</p:sld>
+</file>
+
+<file path=ppt/slides/slide32.xml><?xml version="1.0" encoding="utf-8"?>
+<p:sld xmlns:a="http://schemas.openxmlformats.org/drawingml/2006/main" xmlns:r="http://schemas.openxmlformats.org/officeDocument/2006/relationships" xmlns:p="http://schemas.openxmlformats.org/presentationml/2006/main">
+  <p:cSld>
+    <p:spTree>
+      <p:nvGrpSpPr>
+        <p:cNvPr id="1" name=""/>
+        <p:cNvGrpSpPr/>
+        <p:nvPr/>
+      </p:nvGrpSpPr>
+      <p:grpSpPr>
+        <a:xfrm>
+          <a:off x="0" y="0"/>
+          <a:ext cx="0" cy="0"/>
+          <a:chOff x="0" y="0"/>
+          <a:chExt cx="0" cy="0"/>
+        </a:xfrm>
+      </p:grpSpPr>
+      <p:sp>
+        <p:nvSpPr>
+          <p:cNvPr id="4" name="Title 1">
+            <a:extLst>
+              <a:ext uri="{FF2B5EF4-FFF2-40B4-BE49-F238E27FC236}">
+                <a16:creationId xmlns:a16="http://schemas.microsoft.com/office/drawing/2014/main" id="{CAC17C8E-3677-4E33-AD1C-BB70137513FC}"/>
+              </a:ext>
+            </a:extLst>
+          </p:cNvPr>
+          <p:cNvSpPr>
+            <a:spLocks noGrp="1"/>
+          </p:cNvSpPr>
+          <p:nvPr>
+            <p:ph type="title"/>
+          </p:nvPr>
+        </p:nvSpPr>
+        <p:spPr>
+          <a:xfrm>
+            <a:off x="333482" y="80621"/>
+            <a:ext cx="10515600" cy="1325563"/>
+          </a:xfrm>
+        </p:spPr>
+        <p:txBody>
+          <a:bodyPr/>
+          <a:lstStyle/>
+          <a:p>
+            <a:r>
+              <a:rPr lang="en-US" b="1" dirty="0">
+                <a:latin typeface="+mn-lt"/>
+              </a:rPr>
+              <a:t>Design Patterns Aspect</a:t>
+            </a:r>
+          </a:p>
+        </p:txBody>
+      </p:sp>
+      <p:pic>
+        <p:nvPicPr>
+          <p:cNvPr id="3" name="Picture 2">
+            <a:extLst>
+              <a:ext uri="{FF2B5EF4-FFF2-40B4-BE49-F238E27FC236}">
+                <a16:creationId xmlns:a16="http://schemas.microsoft.com/office/drawing/2014/main" id="{BBB34FF8-947E-4A5E-90D5-61BADFEBD95E}"/>
+              </a:ext>
+            </a:extLst>
+          </p:cNvPr>
+          <p:cNvPicPr>
+            <a:picLocks noChangeAspect="1"/>
+          </p:cNvPicPr>
+          <p:nvPr/>
+        </p:nvPicPr>
+        <p:blipFill rotWithShape="1">
+          <a:blip r:embed="rId2"/>
+          <a:srcRect l="5169" t="3663" r="5718"/>
+          <a:stretch/>
+        </p:blipFill>
+        <p:spPr>
+          <a:xfrm>
+            <a:off x="2810312" y="1015067"/>
+            <a:ext cx="6014906" cy="5762311"/>
+          </a:xfrm>
+          <a:prstGeom prst="rect">
+            <a:avLst/>
+          </a:prstGeom>
+        </p:spPr>
+      </p:pic>
+      <p:cxnSp>
+        <p:nvCxnSpPr>
+          <p:cNvPr id="6" name="Straight Arrow Connector 5">
+            <a:extLst>
+              <a:ext uri="{FF2B5EF4-FFF2-40B4-BE49-F238E27FC236}">
+                <a16:creationId xmlns:a16="http://schemas.microsoft.com/office/drawing/2014/main" id="{C3797FAD-97F8-4764-83CD-173FA42186D0}"/>
+              </a:ext>
+            </a:extLst>
+          </p:cNvPr>
+          <p:cNvCxnSpPr>
+            <a:cxnSpLocks/>
+          </p:cNvCxnSpPr>
+          <p:nvPr/>
+        </p:nvCxnSpPr>
+        <p:spPr>
+          <a:xfrm flipV="1">
+            <a:off x="1669409" y="6123963"/>
+            <a:ext cx="1057013" cy="360727"/>
+          </a:xfrm>
+          <a:prstGeom prst="straightConnector1">
+            <a:avLst/>
+          </a:prstGeom>
+          <a:ln>
+            <a:tailEnd type="triangle"/>
+          </a:ln>
+        </p:spPr>
+        <p:style>
+          <a:lnRef idx="3">
+            <a:schemeClr val="dk1"/>
+          </a:lnRef>
+          <a:fillRef idx="0">
+            <a:schemeClr val="dk1"/>
+          </a:fillRef>
+          <a:effectRef idx="2">
+            <a:schemeClr val="dk1"/>
+          </a:effectRef>
+          <a:fontRef idx="minor">
+            <a:schemeClr val="tx1"/>
+          </a:fontRef>
+        </p:style>
+      </p:cxnSp>
+      <p:cxnSp>
+        <p:nvCxnSpPr>
+          <p:cNvPr id="7" name="Straight Arrow Connector 6">
+            <a:extLst>
+              <a:ext uri="{FF2B5EF4-FFF2-40B4-BE49-F238E27FC236}">
+                <a16:creationId xmlns:a16="http://schemas.microsoft.com/office/drawing/2014/main" id="{FCE51C9C-3B47-4546-8DBE-41759435DDB4}"/>
+              </a:ext>
+            </a:extLst>
+          </p:cNvPr>
+          <p:cNvCxnSpPr>
+            <a:cxnSpLocks/>
+          </p:cNvCxnSpPr>
+          <p:nvPr/>
+        </p:nvCxnSpPr>
+        <p:spPr>
+          <a:xfrm flipV="1">
+            <a:off x="1325461" y="3783435"/>
+            <a:ext cx="1400961" cy="511728"/>
+          </a:xfrm>
+          <a:prstGeom prst="straightConnector1">
+            <a:avLst/>
+          </a:prstGeom>
+          <a:ln>
+            <a:tailEnd type="triangle"/>
+          </a:ln>
+        </p:spPr>
+        <p:style>
+          <a:lnRef idx="3">
+            <a:schemeClr val="dk1"/>
+          </a:lnRef>
+          <a:fillRef idx="0">
+            <a:schemeClr val="dk1"/>
+          </a:fillRef>
+          <a:effectRef idx="2">
+            <a:schemeClr val="dk1"/>
+          </a:effectRef>
+          <a:fontRef idx="minor">
+            <a:schemeClr val="tx1"/>
+          </a:fontRef>
+        </p:style>
+      </p:cxnSp>
+    </p:spTree>
+    <p:extLst>
+      <p:ext uri="{BB962C8B-B14F-4D97-AF65-F5344CB8AC3E}">
+        <p14:creationId xmlns:p14="http://schemas.microsoft.com/office/powerpoint/2010/main" val="415492850"/>
+      </p:ext>
+    </p:extLst>
+  </p:cSld>
+  <p:clrMapOvr>
+    <a:masterClrMapping/>
+  </p:clrMapOvr>
+</p:sld>
+</file>
+
+<file path=ppt/slides/slide33.xml><?xml version="1.0" encoding="utf-8"?>
+<p:sld xmlns:a="http://schemas.openxmlformats.org/drawingml/2006/main" xmlns:r="http://schemas.openxmlformats.org/officeDocument/2006/relationships" xmlns:p="http://schemas.openxmlformats.org/presentationml/2006/main">
+  <p:cSld>
+    <p:spTree>
+      <p:nvGrpSpPr>
+        <p:cNvPr id="1" name=""/>
+        <p:cNvGrpSpPr/>
+        <p:nvPr/>
+      </p:nvGrpSpPr>
+      <p:grpSpPr>
+        <a:xfrm>
+          <a:off x="0" y="0"/>
+          <a:ext cx="0" cy="0"/>
+          <a:chOff x="0" y="0"/>
+          <a:chExt cx="0" cy="0"/>
+        </a:xfrm>
+      </p:grpSpPr>
+      <p:sp>
+        <p:nvSpPr>
+          <p:cNvPr id="4" name="Title 1">
+            <a:extLst>
+              <a:ext uri="{FF2B5EF4-FFF2-40B4-BE49-F238E27FC236}">
+                <a16:creationId xmlns:a16="http://schemas.microsoft.com/office/drawing/2014/main" id="{CAC17C8E-3677-4E33-AD1C-BB70137513FC}"/>
+              </a:ext>
+            </a:extLst>
+          </p:cNvPr>
+          <p:cNvSpPr>
+            <a:spLocks noGrp="1"/>
+          </p:cNvSpPr>
+          <p:nvPr>
+            <p:ph type="title"/>
+          </p:nvPr>
+        </p:nvSpPr>
+        <p:spPr>
+          <a:xfrm>
+            <a:off x="333482" y="80621"/>
+            <a:ext cx="10515600" cy="1325563"/>
+          </a:xfrm>
+        </p:spPr>
+        <p:txBody>
+          <a:bodyPr/>
+          <a:lstStyle/>
+          <a:p>
+            <a:r>
+              <a:rPr lang="en-US" b="1" dirty="0">
+                <a:latin typeface="+mn-lt"/>
+              </a:rPr>
+              <a:t>Design Patterns Aspect</a:t>
+            </a:r>
+          </a:p>
+        </p:txBody>
+      </p:sp>
+      <p:pic>
+        <p:nvPicPr>
+          <p:cNvPr id="2050" name="Picture 2" descr="Image result for decorator design pattern">
+            <a:extLst>
+              <a:ext uri="{FF2B5EF4-FFF2-40B4-BE49-F238E27FC236}">
+                <a16:creationId xmlns:a16="http://schemas.microsoft.com/office/drawing/2014/main" id="{BF84600F-F124-4133-9B41-A693531B31DE}"/>
+              </a:ext>
+            </a:extLst>
+          </p:cNvPr>
+          <p:cNvPicPr>
+            <a:picLocks noChangeAspect="1" noChangeArrowheads="1"/>
+          </p:cNvPicPr>
+          <p:nvPr/>
+        </p:nvPicPr>
+        <p:blipFill rotWithShape="1">
+          <a:blip r:embed="rId2">
+            <a:extLst>
+              <a:ext uri="{28A0092B-C50C-407E-A947-70E740481C1C}">
+                <a14:useLocalDpi xmlns:a14="http://schemas.microsoft.com/office/drawing/2010/main" val="0"/>
+              </a:ext>
+            </a:extLst>
+          </a:blip>
+          <a:srcRect l="8290" r="8039"/>
+          <a:stretch/>
+        </p:blipFill>
+        <p:spPr bwMode="auto">
+          <a:xfrm>
+            <a:off x="838898" y="2363598"/>
+            <a:ext cx="5100507" cy="3429000"/>
+          </a:xfrm>
+          <a:prstGeom prst="rect">
+            <a:avLst/>
+          </a:prstGeom>
+          <a:noFill/>
+          <a:extLst>
+            <a:ext uri="{909E8E84-426E-40DD-AFC4-6F175D3DCCD1}">
+              <a14:hiddenFill xmlns:a14="http://schemas.microsoft.com/office/drawing/2010/main">
+                <a:solidFill>
+                  <a:srgbClr val="FFFFFF"/>
+                </a:solidFill>
+              </a14:hiddenFill>
+            </a:ext>
+          </a:extLst>
+        </p:spPr>
+      </p:pic>
+      <p:pic>
+        <p:nvPicPr>
+          <p:cNvPr id="2052" name="Picture 4" descr="Related image">
+            <a:extLst>
+              <a:ext uri="{FF2B5EF4-FFF2-40B4-BE49-F238E27FC236}">
+                <a16:creationId xmlns:a16="http://schemas.microsoft.com/office/drawing/2014/main" id="{5343AF97-D643-4D92-83B5-1EEFE5FA49E7}"/>
+              </a:ext>
+            </a:extLst>
+          </p:cNvPr>
+          <p:cNvPicPr>
+            <a:picLocks noChangeAspect="1" noChangeArrowheads="1"/>
+          </p:cNvPicPr>
+          <p:nvPr/>
+        </p:nvPicPr>
+        <p:blipFill>
+          <a:blip r:embed="rId3">
+            <a:extLst>
+              <a:ext uri="{28A0092B-C50C-407E-A947-70E740481C1C}">
+                <a14:useLocalDpi xmlns:a14="http://schemas.microsoft.com/office/drawing/2010/main" val="0"/>
+              </a:ext>
+            </a:extLst>
+          </a:blip>
+          <a:srcRect/>
+          <a:stretch>
+            <a:fillRect/>
+          </a:stretch>
+        </p:blipFill>
+        <p:spPr bwMode="auto">
+          <a:xfrm>
+            <a:off x="6288683" y="2363597"/>
+            <a:ext cx="5490967" cy="2946633"/>
+          </a:xfrm>
+          <a:prstGeom prst="rect">
+            <a:avLst/>
+          </a:prstGeom>
+          <a:noFill/>
+          <a:extLst>
+            <a:ext uri="{909E8E84-426E-40DD-AFC4-6F175D3DCCD1}">
+              <a14:hiddenFill xmlns:a14="http://schemas.microsoft.com/office/drawing/2010/main">
+                <a:solidFill>
+                  <a:srgbClr val="FFFFFF"/>
+                </a:solidFill>
+              </a14:hiddenFill>
+            </a:ext>
+          </a:extLst>
+        </p:spPr>
+      </p:pic>
+      <p:sp>
+        <p:nvSpPr>
+          <p:cNvPr id="8" name="Title 1">
+            <a:extLst>
+              <a:ext uri="{FF2B5EF4-FFF2-40B4-BE49-F238E27FC236}">
+                <a16:creationId xmlns:a16="http://schemas.microsoft.com/office/drawing/2014/main" id="{B5B8C92D-110A-40B3-A45C-E7D0D1EFA93B}"/>
+              </a:ext>
+            </a:extLst>
+          </p:cNvPr>
+          <p:cNvSpPr txBox="1">
+            <a:spLocks/>
+          </p:cNvSpPr>
+          <p:nvPr/>
+        </p:nvSpPr>
+        <p:spPr>
+          <a:xfrm>
+            <a:off x="8276403" y="1759478"/>
+            <a:ext cx="1624955" cy="604120"/>
+          </a:xfrm>
+          <a:prstGeom prst="rect">
+            <a:avLst/>
+          </a:prstGeom>
+        </p:spPr>
+        <p:txBody>
+          <a:bodyPr vert="horz" lIns="91440" tIns="45720" rIns="91440" bIns="45720" rtlCol="0" anchor="ctr">
+            <a:normAutofit/>
+          </a:bodyPr>
+          <a:lstStyle>
+            <a:lvl1pPr algn="l" defTabSz="914400" rtl="0" eaLnBrk="1" latinLnBrk="0" hangingPunct="1">
+              <a:lnSpc>
+                <a:spcPct val="90000"/>
+              </a:lnSpc>
+              <a:spcBef>
+                <a:spcPct val="0"/>
+              </a:spcBef>
+              <a:buNone/>
+              <a:defRPr sz="4400" kern="1200">
+                <a:solidFill>
+                  <a:schemeClr val="tx1"/>
+                </a:solidFill>
+                <a:latin typeface="+mj-lt"/>
+                <a:ea typeface="+mj-ea"/>
+                <a:cs typeface="+mj-cs"/>
+              </a:defRPr>
+            </a:lvl1pPr>
+          </a:lstStyle>
+          <a:p>
+            <a:r>
+              <a:rPr lang="en-US" sz="2400" b="1" dirty="0">
+                <a:latin typeface="+mn-lt"/>
+              </a:rPr>
+              <a:t>Singleton</a:t>
+            </a:r>
+          </a:p>
+        </p:txBody>
+      </p:sp>
+    </p:spTree>
+    <p:extLst>
+      <p:ext uri="{BB962C8B-B14F-4D97-AF65-F5344CB8AC3E}">
+        <p14:creationId xmlns:p14="http://schemas.microsoft.com/office/powerpoint/2010/main" val="1590348669"/>
+      </p:ext>
+    </p:extLst>
+  </p:cSld>
+  <p:clrMapOvr>
+    <a:masterClrMapping/>
+  </p:clrMapOvr>
+</p:sld>
+</file>
+
+<file path=ppt/slides/slide34.xml><?xml version="1.0" encoding="utf-8"?>
+<p:sld xmlns:a="http://schemas.openxmlformats.org/drawingml/2006/main" xmlns:r="http://schemas.openxmlformats.org/officeDocument/2006/relationships" xmlns:p="http://schemas.openxmlformats.org/presentationml/2006/main">
+  <p:cSld>
+    <p:spTree>
+      <p:nvGrpSpPr>
+        <p:cNvPr id="1" name=""/>
+        <p:cNvGrpSpPr/>
+        <p:nvPr/>
+      </p:nvGrpSpPr>
+      <p:grpSpPr>
+        <a:xfrm>
+          <a:off x="0" y="0"/>
+          <a:ext cx="0" cy="0"/>
+          <a:chOff x="0" y="0"/>
+          <a:chExt cx="0" cy="0"/>
+        </a:xfrm>
+      </p:grpSpPr>
+      <p:sp>
+        <p:nvSpPr>
+          <p:cNvPr id="4" name="Title 1">
+            <a:extLst>
+              <a:ext uri="{FF2B5EF4-FFF2-40B4-BE49-F238E27FC236}">
+                <a16:creationId xmlns:a16="http://schemas.microsoft.com/office/drawing/2014/main" id="{CAC17C8E-3677-4E33-AD1C-BB70137513FC}"/>
+              </a:ext>
+            </a:extLst>
+          </p:cNvPr>
+          <p:cNvSpPr>
+            <a:spLocks noGrp="1"/>
+          </p:cNvSpPr>
+          <p:nvPr>
+            <p:ph type="title"/>
+          </p:nvPr>
+        </p:nvSpPr>
+        <p:spPr>
+          <a:xfrm>
+            <a:off x="400594" y="86450"/>
+            <a:ext cx="10515600" cy="1325563"/>
+          </a:xfrm>
+        </p:spPr>
+        <p:txBody>
+          <a:bodyPr/>
+          <a:lstStyle/>
+          <a:p>
+            <a:r>
+              <a:rPr lang="en-US" b="1" dirty="0">
+                <a:latin typeface="+mn-lt"/>
+              </a:rPr>
+              <a:t>Design Pattern Aspect</a:t>
+            </a:r>
+          </a:p>
+        </p:txBody>
+      </p:sp>
+      <p:sp>
+        <p:nvSpPr>
+          <p:cNvPr id="5" name="Content Placeholder 2">
+            <a:extLst>
+              <a:ext uri="{FF2B5EF4-FFF2-40B4-BE49-F238E27FC236}">
+                <a16:creationId xmlns:a16="http://schemas.microsoft.com/office/drawing/2014/main" id="{507F342C-C331-44DB-ACF0-C06FE2A5C3FB}"/>
+              </a:ext>
+            </a:extLst>
+          </p:cNvPr>
+          <p:cNvSpPr>
+            <a:spLocks noGrp="1"/>
+          </p:cNvSpPr>
+          <p:nvPr>
+            <p:ph idx="1"/>
+          </p:nvPr>
+        </p:nvSpPr>
+        <p:spPr>
+          <a:xfrm>
+            <a:off x="125835" y="1116419"/>
+            <a:ext cx="11434194" cy="5554347"/>
+          </a:xfrm>
+        </p:spPr>
+        <p:txBody>
+          <a:bodyPr>
+            <a:normAutofit/>
+          </a:bodyPr>
+          <a:lstStyle/>
+          <a:p>
+            <a:pPr marL="0" indent="0">
+              <a:lnSpc>
+                <a:spcPct val="150000"/>
+              </a:lnSpc>
+              <a:buNone/>
+            </a:pPr>
+            <a:r>
+              <a:rPr lang="en-US" sz="2400" b="1" dirty="0"/>
+              <a:t>Implementing Decorator and </a:t>
+            </a:r>
+            <a:r>
+              <a:rPr lang="en-US" sz="2400" b="1" dirty="0" err="1"/>
+              <a:t>Singletone</a:t>
+            </a:r>
+            <a:r>
+              <a:rPr lang="en-US" sz="2400" b="1" dirty="0"/>
+              <a:t> design patterns using Aspects which improves code reusability and composability.</a:t>
+            </a:r>
+          </a:p>
+          <a:p>
+            <a:pPr>
+              <a:lnSpc>
+                <a:spcPct val="150000"/>
+              </a:lnSpc>
+            </a:pPr>
+            <a:r>
+              <a:rPr lang="en-US" sz="2400" b="1" dirty="0">
+                <a:solidFill>
+                  <a:srgbClr val="FF0000"/>
+                </a:solidFill>
+              </a:rPr>
+              <a:t>Concern:</a:t>
+            </a:r>
+          </a:p>
+          <a:p>
+            <a:pPr>
+              <a:lnSpc>
+                <a:spcPct val="150000"/>
+              </a:lnSpc>
+            </a:pPr>
+            <a:r>
+              <a:rPr lang="en-US" sz="2400" b="1" i="1" dirty="0">
+                <a:solidFill>
+                  <a:srgbClr val="FF0000"/>
+                </a:solidFill>
+              </a:rPr>
+              <a:t>Pointcut:</a:t>
+            </a:r>
+            <a:r>
+              <a:rPr lang="en-US" sz="2400" b="1" i="1" dirty="0"/>
+              <a:t> launch of the game (dependent on given </a:t>
+            </a:r>
+            <a:r>
+              <a:rPr lang="en-US" sz="2400" b="1" i="1" dirty="0" err="1"/>
+              <a:t>args</a:t>
+            </a:r>
+            <a:r>
+              <a:rPr lang="en-US" sz="2400" b="1" i="1" dirty="0"/>
+              <a:t>).</a:t>
+            </a:r>
+          </a:p>
+          <a:p>
+            <a:pPr>
+              <a:lnSpc>
+                <a:spcPct val="150000"/>
+              </a:lnSpc>
+            </a:pPr>
+            <a:r>
+              <a:rPr lang="en-US" sz="2400" b="1" i="1" dirty="0">
+                <a:solidFill>
+                  <a:srgbClr val="FF0000"/>
+                </a:solidFill>
+              </a:rPr>
+              <a:t>Advice: </a:t>
+            </a:r>
+            <a:r>
+              <a:rPr lang="en-US" sz="2400" b="1" i="1" dirty="0"/>
+              <a:t>creating spaceships (</a:t>
+            </a:r>
+            <a:r>
+              <a:rPr lang="en-US" sz="2400" b="1" i="1" dirty="0" err="1"/>
+              <a:t>SpaceShipFactory</a:t>
+            </a:r>
+            <a:r>
+              <a:rPr lang="en-US" sz="2400" b="1" i="1" dirty="0"/>
+              <a:t>) using an Aspect.</a:t>
+            </a:r>
+          </a:p>
+        </p:txBody>
+      </p:sp>
+    </p:spTree>
+    <p:extLst>
+      <p:ext uri="{BB962C8B-B14F-4D97-AF65-F5344CB8AC3E}">
+        <p14:creationId xmlns:p14="http://schemas.microsoft.com/office/powerpoint/2010/main" val="1911093046"/>
+      </p:ext>
+    </p:extLst>
+  </p:cSld>
+  <p:clrMapOvr>
+    <a:masterClrMapping/>
+  </p:clrMapOvr>
+</p:sld>
+</file>
+
+<file path=ppt/slides/slide35.xml><?xml version="1.0" encoding="utf-8"?>
+<p:sld xmlns:a="http://schemas.openxmlformats.org/drawingml/2006/main" xmlns:r="http://schemas.openxmlformats.org/officeDocument/2006/relationships" xmlns:p="http://schemas.openxmlformats.org/presentationml/2006/main">
+  <p:cSld>
+    <p:spTree>
+      <p:nvGrpSpPr>
+        <p:cNvPr id="1" name=""/>
+        <p:cNvGrpSpPr/>
+        <p:nvPr/>
+      </p:nvGrpSpPr>
+      <p:grpSpPr>
+        <a:xfrm>
+          <a:off x="0" y="0"/>
+          <a:ext cx="0" cy="0"/>
+          <a:chOff x="0" y="0"/>
+          <a:chExt cx="0" cy="0"/>
+        </a:xfrm>
+      </p:grpSpPr>
+      <p:sp>
+        <p:nvSpPr>
+          <p:cNvPr id="4" name="Title 1">
+            <a:extLst>
+              <a:ext uri="{FF2B5EF4-FFF2-40B4-BE49-F238E27FC236}">
+                <a16:creationId xmlns:a16="http://schemas.microsoft.com/office/drawing/2014/main" id="{CAC17C8E-3677-4E33-AD1C-BB70137513FC}"/>
+              </a:ext>
+            </a:extLst>
+          </p:cNvPr>
+          <p:cNvSpPr>
+            <a:spLocks noGrp="1"/>
+          </p:cNvSpPr>
+          <p:nvPr>
+            <p:ph type="title"/>
+          </p:nvPr>
+        </p:nvSpPr>
+        <p:spPr>
+          <a:xfrm>
+            <a:off x="400594" y="86450"/>
+            <a:ext cx="10515600" cy="1325563"/>
+          </a:xfrm>
+        </p:spPr>
+        <p:txBody>
+          <a:bodyPr/>
+          <a:lstStyle/>
+          <a:p>
+            <a:r>
+              <a:rPr lang="en-US" b="1" dirty="0">
+                <a:highlight>
+                  <a:srgbClr val="FFFF00"/>
+                </a:highlight>
+                <a:latin typeface="+mn-lt"/>
+              </a:rPr>
+              <a:t>TODO</a:t>
+            </a:r>
+          </a:p>
+        </p:txBody>
+      </p:sp>
+      <p:sp>
+        <p:nvSpPr>
+          <p:cNvPr id="5" name="Content Placeholder 2">
+            <a:extLst>
+              <a:ext uri="{FF2B5EF4-FFF2-40B4-BE49-F238E27FC236}">
+                <a16:creationId xmlns:a16="http://schemas.microsoft.com/office/drawing/2014/main" id="{507F342C-C331-44DB-ACF0-C06FE2A5C3FB}"/>
+              </a:ext>
+            </a:extLst>
+          </p:cNvPr>
+          <p:cNvSpPr>
+            <a:spLocks noGrp="1"/>
+          </p:cNvSpPr>
+          <p:nvPr>
+            <p:ph idx="1"/>
+          </p:nvPr>
+        </p:nvSpPr>
+        <p:spPr>
+          <a:xfrm>
+            <a:off x="400594" y="1201783"/>
+            <a:ext cx="11495315" cy="5468983"/>
+          </a:xfrm>
+        </p:spPr>
+        <p:txBody>
+          <a:bodyPr>
+            <a:normAutofit/>
+          </a:bodyPr>
+          <a:lstStyle/>
+          <a:p>
+            <a:pPr>
+              <a:lnSpc>
+                <a:spcPct val="150000"/>
+              </a:lnSpc>
+            </a:pPr>
+            <a:r>
+              <a:rPr lang="en-US" b="1" dirty="0" err="1"/>
+              <a:t>StartGame</a:t>
+            </a:r>
+            <a:r>
+              <a:rPr lang="en-US" b="1" dirty="0"/>
+              <a:t>/</a:t>
+            </a:r>
+            <a:r>
+              <a:rPr lang="en-US" b="1" dirty="0" err="1"/>
+              <a:t>EndGame</a:t>
+            </a:r>
+            <a:r>
+              <a:rPr lang="en-US" b="1" dirty="0"/>
+              <a:t> message to </a:t>
+            </a:r>
+            <a:r>
+              <a:rPr lang="en-US" b="1" dirty="0" err="1"/>
+              <a:t>stdout</a:t>
+            </a:r>
+            <a:endParaRPr lang="en-US" b="1" dirty="0"/>
+          </a:p>
+          <a:p>
+            <a:pPr>
+              <a:lnSpc>
+                <a:spcPct val="150000"/>
+              </a:lnSpc>
+            </a:pPr>
+            <a:r>
+              <a:rPr lang="en-US" b="1" dirty="0"/>
+              <a:t>Copy code lines to our PPT</a:t>
+            </a:r>
+          </a:p>
+        </p:txBody>
+      </p:sp>
+    </p:spTree>
+    <p:extLst>
+      <p:ext uri="{BB962C8B-B14F-4D97-AF65-F5344CB8AC3E}">
+        <p14:creationId xmlns:p14="http://schemas.microsoft.com/office/powerpoint/2010/main" val="3667126705"/>
       </p:ext>
     </p:extLst>
   </p:cSld>
@@ -7971,44 +9260,350 @@
       </p:sp>
       <p:sp>
         <p:nvSpPr>
-          <p:cNvPr id="5" name="Content Placeholder 2">
-            <a:extLst>
-              <a:ext uri="{FF2B5EF4-FFF2-40B4-BE49-F238E27FC236}">
-                <a16:creationId xmlns:a16="http://schemas.microsoft.com/office/drawing/2014/main" id="{507F342C-C331-44DB-ACF0-C06FE2A5C3FB}"/>
-              </a:ext>
-            </a:extLst>
-          </p:cNvPr>
-          <p:cNvSpPr>
-            <a:spLocks noGrp="1"/>
-          </p:cNvSpPr>
-          <p:nvPr>
-            <p:ph idx="1"/>
-          </p:nvPr>
-        </p:nvSpPr>
-        <p:spPr>
-          <a:xfrm>
-            <a:off x="400594" y="1201783"/>
-            <a:ext cx="11495315" cy="5468983"/>
-          </a:xfrm>
-        </p:spPr>
-        <p:txBody>
-          <a:bodyPr>
-            <a:normAutofit/>
-          </a:bodyPr>
-          <a:lstStyle/>
-          <a:p>
-            <a:pPr>
-              <a:lnSpc>
-                <a:spcPct val="150000"/>
-              </a:lnSpc>
-            </a:pPr>
-            <a:r>
-              <a:rPr lang="en-US" b="1" dirty="0">
-                <a:highlight>
-                  <a:srgbClr val="FFFF00"/>
-                </a:highlight>
-              </a:rPr>
-              <a:t>TODO</a:t>
+          <p:cNvPr id="6" name="Oval 5">
+            <a:extLst>
+              <a:ext uri="{FF2B5EF4-FFF2-40B4-BE49-F238E27FC236}">
+                <a16:creationId xmlns:a16="http://schemas.microsoft.com/office/drawing/2014/main" id="{3CCBE272-FDB5-4B84-9612-1A9B7233A9E1}"/>
+              </a:ext>
+            </a:extLst>
+          </p:cNvPr>
+          <p:cNvSpPr/>
+          <p:nvPr/>
+        </p:nvSpPr>
+        <p:spPr>
+          <a:xfrm>
+            <a:off x="1120790" y="1788614"/>
+            <a:ext cx="1743512" cy="1550281"/>
+          </a:xfrm>
+          <a:prstGeom prst="ellipse">
+            <a:avLst/>
+          </a:prstGeom>
+          <a:solidFill>
+            <a:schemeClr val="accent1">
+              <a:lumMod val="50000"/>
+            </a:schemeClr>
+          </a:solidFill>
+          <a:ln>
+            <a:solidFill>
+              <a:schemeClr val="bg1"/>
+            </a:solidFill>
+          </a:ln>
+        </p:spPr>
+        <p:style>
+          <a:lnRef idx="2">
+            <a:schemeClr val="accent1">
+              <a:shade val="50000"/>
+            </a:schemeClr>
+          </a:lnRef>
+          <a:fillRef idx="1">
+            <a:schemeClr val="accent1"/>
+          </a:fillRef>
+          <a:effectRef idx="0">
+            <a:schemeClr val="accent1"/>
+          </a:effectRef>
+          <a:fontRef idx="minor">
+            <a:schemeClr val="lt1"/>
+          </a:fontRef>
+        </p:style>
+        <p:txBody>
+          <a:bodyPr rtlCol="0" anchor="ctr"/>
+          <a:lstStyle/>
+          <a:p>
+            <a:pPr algn="ctr"/>
+            <a:r>
+              <a:rPr lang="en-US" sz="1400" b="1" dirty="0"/>
+              <a:t>Logging</a:t>
+            </a:r>
+          </a:p>
+        </p:txBody>
+      </p:sp>
+      <p:sp>
+        <p:nvSpPr>
+          <p:cNvPr id="7" name="Oval 6">
+            <a:extLst>
+              <a:ext uri="{FF2B5EF4-FFF2-40B4-BE49-F238E27FC236}">
+                <a16:creationId xmlns:a16="http://schemas.microsoft.com/office/drawing/2014/main" id="{5890A3BC-FB57-47AF-896F-4C56AE183A15}"/>
+              </a:ext>
+            </a:extLst>
+          </p:cNvPr>
+          <p:cNvSpPr/>
+          <p:nvPr/>
+        </p:nvSpPr>
+        <p:spPr>
+          <a:xfrm>
+            <a:off x="5286812" y="1641126"/>
+            <a:ext cx="1743512" cy="1550281"/>
+          </a:xfrm>
+          <a:prstGeom prst="ellipse">
+            <a:avLst/>
+          </a:prstGeom>
+          <a:solidFill>
+            <a:schemeClr val="tx1"/>
+          </a:solidFill>
+          <a:ln>
+            <a:solidFill>
+              <a:schemeClr val="bg1"/>
+            </a:solidFill>
+          </a:ln>
+        </p:spPr>
+        <p:style>
+          <a:lnRef idx="2">
+            <a:schemeClr val="accent1">
+              <a:shade val="50000"/>
+            </a:schemeClr>
+          </a:lnRef>
+          <a:fillRef idx="1">
+            <a:schemeClr val="accent1"/>
+          </a:fillRef>
+          <a:effectRef idx="0">
+            <a:schemeClr val="accent1"/>
+          </a:effectRef>
+          <a:fontRef idx="minor">
+            <a:schemeClr val="lt1"/>
+          </a:fontRef>
+        </p:style>
+        <p:txBody>
+          <a:bodyPr rtlCol="0" anchor="ctr"/>
+          <a:lstStyle/>
+          <a:p>
+            <a:pPr algn="ctr"/>
+            <a:r>
+              <a:rPr lang="en-US" sz="1400" b="1" dirty="0"/>
+              <a:t>Authorization</a:t>
+            </a:r>
+          </a:p>
+        </p:txBody>
+      </p:sp>
+      <p:sp>
+        <p:nvSpPr>
+          <p:cNvPr id="8" name="Oval 7">
+            <a:extLst>
+              <a:ext uri="{FF2B5EF4-FFF2-40B4-BE49-F238E27FC236}">
+                <a16:creationId xmlns:a16="http://schemas.microsoft.com/office/drawing/2014/main" id="{A22F7F96-7135-4A3A-BEB5-38A353DE8D60}"/>
+              </a:ext>
+            </a:extLst>
+          </p:cNvPr>
+          <p:cNvSpPr/>
+          <p:nvPr/>
+        </p:nvSpPr>
+        <p:spPr>
+          <a:xfrm>
+            <a:off x="649087" y="3980692"/>
+            <a:ext cx="1743512" cy="1550281"/>
+          </a:xfrm>
+          <a:prstGeom prst="ellipse">
+            <a:avLst/>
+          </a:prstGeom>
+          <a:solidFill>
+            <a:schemeClr val="accent2">
+              <a:lumMod val="50000"/>
+            </a:schemeClr>
+          </a:solidFill>
+          <a:ln>
+            <a:solidFill>
+              <a:schemeClr val="bg1"/>
+            </a:solidFill>
+          </a:ln>
+        </p:spPr>
+        <p:style>
+          <a:lnRef idx="2">
+            <a:schemeClr val="accent1">
+              <a:shade val="50000"/>
+            </a:schemeClr>
+          </a:lnRef>
+          <a:fillRef idx="1">
+            <a:schemeClr val="accent1"/>
+          </a:fillRef>
+          <a:effectRef idx="0">
+            <a:schemeClr val="accent1"/>
+          </a:effectRef>
+          <a:fontRef idx="minor">
+            <a:schemeClr val="lt1"/>
+          </a:fontRef>
+        </p:style>
+        <p:txBody>
+          <a:bodyPr rtlCol="0" anchor="ctr"/>
+          <a:lstStyle/>
+          <a:p>
+            <a:pPr algn="ctr"/>
+            <a:r>
+              <a:rPr lang="en-US" sz="1400" b="1" dirty="0"/>
+              <a:t>Validation</a:t>
+            </a:r>
+          </a:p>
+        </p:txBody>
+      </p:sp>
+      <p:sp>
+        <p:nvSpPr>
+          <p:cNvPr id="9" name="Oval 8">
+            <a:extLst>
+              <a:ext uri="{FF2B5EF4-FFF2-40B4-BE49-F238E27FC236}">
+                <a16:creationId xmlns:a16="http://schemas.microsoft.com/office/drawing/2014/main" id="{81D44466-8B39-43B5-98A7-17B1C1BAB962}"/>
+              </a:ext>
+            </a:extLst>
+          </p:cNvPr>
+          <p:cNvSpPr/>
+          <p:nvPr/>
+        </p:nvSpPr>
+        <p:spPr>
+          <a:xfrm>
+            <a:off x="8999828" y="1432014"/>
+            <a:ext cx="1743512" cy="1550281"/>
+          </a:xfrm>
+          <a:prstGeom prst="ellipse">
+            <a:avLst/>
+          </a:prstGeom>
+          <a:solidFill>
+            <a:schemeClr val="accent1">
+              <a:lumMod val="50000"/>
+            </a:schemeClr>
+          </a:solidFill>
+          <a:ln>
+            <a:solidFill>
+              <a:schemeClr val="bg1"/>
+            </a:solidFill>
+          </a:ln>
+        </p:spPr>
+        <p:style>
+          <a:lnRef idx="2">
+            <a:schemeClr val="accent1">
+              <a:shade val="50000"/>
+            </a:schemeClr>
+          </a:lnRef>
+          <a:fillRef idx="1">
+            <a:schemeClr val="accent1"/>
+          </a:fillRef>
+          <a:effectRef idx="0">
+            <a:schemeClr val="accent1"/>
+          </a:effectRef>
+          <a:fontRef idx="minor">
+            <a:schemeClr val="lt1"/>
+          </a:fontRef>
+        </p:style>
+        <p:txBody>
+          <a:bodyPr rtlCol="0" anchor="ctr"/>
+          <a:lstStyle/>
+          <a:p>
+            <a:pPr algn="ctr"/>
+            <a:r>
+              <a:rPr lang="en-US" sz="1400" b="1" dirty="0"/>
+              <a:t>UI</a:t>
+            </a:r>
+          </a:p>
+        </p:txBody>
+      </p:sp>
+      <p:sp>
+        <p:nvSpPr>
+          <p:cNvPr id="10" name="Oval 9">
+            <a:extLst>
+              <a:ext uri="{FF2B5EF4-FFF2-40B4-BE49-F238E27FC236}">
+                <a16:creationId xmlns:a16="http://schemas.microsoft.com/office/drawing/2014/main" id="{1DFB1A15-DF63-4603-BAA4-ED9A71999CBA}"/>
+              </a:ext>
+            </a:extLst>
+          </p:cNvPr>
+          <p:cNvSpPr/>
+          <p:nvPr/>
+        </p:nvSpPr>
+        <p:spPr>
+          <a:xfrm>
+            <a:off x="4352488" y="4225965"/>
+            <a:ext cx="1743512" cy="1550281"/>
+          </a:xfrm>
+          <a:prstGeom prst="ellipse">
+            <a:avLst/>
+          </a:prstGeom>
+          <a:solidFill>
+            <a:schemeClr val="tx1"/>
+          </a:solidFill>
+          <a:ln>
+            <a:solidFill>
+              <a:schemeClr val="bg1"/>
+            </a:solidFill>
+          </a:ln>
+        </p:spPr>
+        <p:style>
+          <a:lnRef idx="2">
+            <a:schemeClr val="accent1">
+              <a:shade val="50000"/>
+            </a:schemeClr>
+          </a:lnRef>
+          <a:fillRef idx="1">
+            <a:schemeClr val="accent1"/>
+          </a:fillRef>
+          <a:effectRef idx="0">
+            <a:schemeClr val="accent1"/>
+          </a:effectRef>
+          <a:fontRef idx="minor">
+            <a:schemeClr val="lt1"/>
+          </a:fontRef>
+        </p:style>
+        <p:txBody>
+          <a:bodyPr rtlCol="0" anchor="ctr"/>
+          <a:lstStyle/>
+          <a:p>
+            <a:pPr algn="ctr"/>
+            <a:r>
+              <a:rPr lang="en-US" sz="1400" b="1" dirty="0"/>
+              <a:t>Exceptions Handling</a:t>
+            </a:r>
+          </a:p>
+        </p:txBody>
+      </p:sp>
+      <p:sp>
+        <p:nvSpPr>
+          <p:cNvPr id="11" name="Oval 10">
+            <a:extLst>
+              <a:ext uri="{FF2B5EF4-FFF2-40B4-BE49-F238E27FC236}">
+                <a16:creationId xmlns:a16="http://schemas.microsoft.com/office/drawing/2014/main" id="{9B22ACEB-539D-4705-8D09-700A6F1D46EE}"/>
+              </a:ext>
+            </a:extLst>
+          </p:cNvPr>
+          <p:cNvSpPr/>
+          <p:nvPr/>
+        </p:nvSpPr>
+        <p:spPr>
+          <a:xfrm>
+            <a:off x="8727347" y="4116351"/>
+            <a:ext cx="1743512" cy="1550281"/>
+          </a:xfrm>
+          <a:prstGeom prst="ellipse">
+            <a:avLst/>
+          </a:prstGeom>
+          <a:solidFill>
+            <a:schemeClr val="accent2">
+              <a:lumMod val="50000"/>
+            </a:schemeClr>
+          </a:solidFill>
+          <a:ln>
+            <a:solidFill>
+              <a:schemeClr val="bg1"/>
+            </a:solidFill>
+          </a:ln>
+        </p:spPr>
+        <p:style>
+          <a:lnRef idx="2">
+            <a:schemeClr val="accent1">
+              <a:shade val="50000"/>
+            </a:schemeClr>
+          </a:lnRef>
+          <a:fillRef idx="1">
+            <a:schemeClr val="accent1"/>
+          </a:fillRef>
+          <a:effectRef idx="0">
+            <a:schemeClr val="accent1"/>
+          </a:effectRef>
+          <a:fontRef idx="minor">
+            <a:schemeClr val="lt1"/>
+          </a:fontRef>
+        </p:style>
+        <p:txBody>
+          <a:bodyPr rtlCol="0" anchor="ctr"/>
+          <a:lstStyle/>
+          <a:p>
+            <a:pPr algn="ctr"/>
+            <a:r>
+              <a:rPr lang="en-US" sz="1400" b="1" dirty="0"/>
+              <a:t>Code reuse (design patterns)</a:t>
             </a:r>
           </a:p>
         </p:txBody>
@@ -8096,13 +9691,13 @@
         </p:nvSpPr>
         <p:spPr>
           <a:xfrm>
-            <a:off x="400594" y="1201783"/>
-            <a:ext cx="11495315" cy="5468983"/>
+            <a:off x="260060" y="975280"/>
+            <a:ext cx="11635850" cy="5796270"/>
           </a:xfrm>
         </p:spPr>
         <p:txBody>
           <a:bodyPr>
-            <a:normAutofit fontScale="85000" lnSpcReduction="20000"/>
+            <a:noAutofit/>
           </a:bodyPr>
           <a:lstStyle/>
           <a:p>
@@ -8112,7 +9707,7 @@
               </a:lnSpc>
             </a:pPr>
             <a:r>
-              <a:rPr lang="en-US" b="1" dirty="0" err="1">
+              <a:rPr lang="en-US" sz="1800" b="1" dirty="0" err="1">
                 <a:solidFill>
                   <a:srgbClr val="FF0000"/>
                 </a:solidFill>
@@ -8120,7 +9715,7 @@
               <a:t>Spectative</a:t>
             </a:r>
             <a:r>
-              <a:rPr lang="en-US" b="1" dirty="0">
+              <a:rPr lang="en-US" sz="1800" b="1" dirty="0">
                 <a:solidFill>
                   <a:srgbClr val="FF0000"/>
                 </a:solidFill>
@@ -8135,15 +9730,15 @@
               </a:lnSpc>
             </a:pPr>
             <a:r>
-              <a:rPr lang="en-US" b="1" dirty="0"/>
+              <a:rPr lang="en-US" sz="1800" b="1" dirty="0"/>
               <a:t>Game Logging Aspect – saves data about game (time took, </a:t>
             </a:r>
             <a:r>
-              <a:rPr lang="en-US" b="1" dirty="0" err="1"/>
+              <a:rPr lang="en-US" sz="1800" b="1" dirty="0" err="1"/>
               <a:t>num</a:t>
             </a:r>
             <a:r>
-              <a:rPr lang="en-US" b="1" dirty="0"/>
+              <a:rPr lang="en-US" sz="1800" b="1" dirty="0"/>
               <a:t> of shots, start of game, etc..)</a:t>
             </a:r>
           </a:p>
@@ -8154,7 +9749,7 @@
               </a:lnSpc>
             </a:pPr>
             <a:r>
-              <a:rPr lang="en-US" b="1" dirty="0"/>
+              <a:rPr lang="en-US" sz="1800" b="1" dirty="0"/>
               <a:t>Audit Aspect - logs game events using method signature, for auditing (security) and data analysis.</a:t>
             </a:r>
           </a:p>
@@ -8165,7 +9760,7 @@
               </a:lnSpc>
             </a:pPr>
             <a:r>
-              <a:rPr lang="en-US" b="1" dirty="0">
+              <a:rPr lang="en-US" sz="1800" b="1" dirty="0">
                 <a:solidFill>
                   <a:srgbClr val="FF0000"/>
                 </a:solidFill>
@@ -8180,16 +9775,8 @@
               </a:lnSpc>
             </a:pPr>
             <a:r>
-              <a:rPr lang="en-US" b="1" dirty="0"/>
-              <a:t>Lock aspect: locks some feature of the player - for </a:t>
-            </a:r>
-            <a:r>
-              <a:rPr lang="en-US" b="1" dirty="0" err="1"/>
-              <a:t>e.g</a:t>
-            </a:r>
-            <a:r>
-              <a:rPr lang="en-US" b="1" dirty="0"/>
-              <a:t>: can’t shoot anymore.</a:t>
+              <a:rPr lang="en-US" sz="1800" b="1" dirty="0"/>
+              <a:t>Password authorization Aspect – only authorized users can play the game (using password). </a:t>
             </a:r>
           </a:p>
           <a:p>
@@ -8199,8 +9786,28 @@
               </a:lnSpc>
             </a:pPr>
             <a:r>
-              <a:rPr lang="en-US" b="1" dirty="0"/>
-              <a:t>Password authorization mechanism – only authorized users can play the game (using password). </a:t>
+              <a:rPr lang="en-US" sz="1800" b="1" dirty="0">
+                <a:highlight>
+                  <a:srgbClr val="FFFF00"/>
+                </a:highlight>
+              </a:rPr>
+              <a:t>UI update Aspect - each time some value is change (</a:t>
+            </a:r>
+            <a:r>
+              <a:rPr lang="en-US" sz="1800" b="1" dirty="0" err="1">
+                <a:highlight>
+                  <a:srgbClr val="FFFF00"/>
+                </a:highlight>
+              </a:rPr>
+              <a:t>e.g</a:t>
+            </a:r>
+            <a:r>
+              <a:rPr lang="en-US" sz="1800" b="1" dirty="0">
+                <a:highlight>
+                  <a:srgbClr val="FFFF00"/>
+                </a:highlight>
+              </a:rPr>
+              <a:t>: asteroid is hit) - we display it on screen. </a:t>
             </a:r>
           </a:p>
           <a:p>
@@ -8210,16 +9817,8 @@
               </a:lnSpc>
             </a:pPr>
             <a:r>
-              <a:rPr lang="en-US" b="1" dirty="0"/>
-              <a:t>UI update aspect: each time some value is change (</a:t>
-            </a:r>
-            <a:r>
-              <a:rPr lang="en-US" b="1" dirty="0" err="1"/>
-              <a:t>e.g</a:t>
-            </a:r>
-            <a:r>
-              <a:rPr lang="en-US" b="1" dirty="0"/>
-              <a:t>: asteroid is hit) - we display it on screen. </a:t>
+              <a:rPr lang="en-US" sz="1800" b="1" dirty="0"/>
+              <a:t>Validator Aspect – validates parameters passed to methods in the codebase.</a:t>
             </a:r>
           </a:p>
           <a:p>
@@ -8229,7 +9828,7 @@
               </a:lnSpc>
             </a:pPr>
             <a:r>
-              <a:rPr lang="en-US" b="1" dirty="0">
+              <a:rPr lang="en-US" sz="1800" b="1" dirty="0">
                 <a:solidFill>
                   <a:srgbClr val="FF0000"/>
                 </a:solidFill>
@@ -8244,8 +9843,20 @@
               </a:lnSpc>
             </a:pPr>
             <a:r>
-              <a:rPr lang="en-US" b="1" dirty="0"/>
-              <a:t>Heuristic aspect: changes heuristic of the game (change from drunk player to smart player). </a:t>
+              <a:rPr lang="en-US" sz="1800" b="1" dirty="0" err="1">
+                <a:highlight>
+                  <a:srgbClr val="FFFF00"/>
+                </a:highlight>
+              </a:rPr>
+              <a:t>DesignPattern</a:t>
+            </a:r>
+            <a:r>
+              <a:rPr lang="en-US" sz="1800" b="1" dirty="0">
+                <a:highlight>
+                  <a:srgbClr val="FFFF00"/>
+                </a:highlight>
+              </a:rPr>
+              <a:t> Aspect – implementation of design patterns using aspects.</a:t>
             </a:r>
           </a:p>
           <a:p>
@@ -8255,12 +9866,24 @@
               </a:lnSpc>
             </a:pPr>
             <a:r>
-              <a:rPr lang="en-US" b="1" dirty="0" err="1"/>
+              <a:rPr lang="en-US" sz="1800" b="1" dirty="0" err="1"/>
               <a:t>ExceptionHandler</a:t>
             </a:r>
             <a:r>
-              <a:rPr lang="en-US" b="1" dirty="0"/>
-              <a:t> Aspect – Monitors exceptions and handles unhandled exceptions.</a:t>
+              <a:rPr lang="en-US" sz="1800" b="1" dirty="0"/>
+              <a:t> Aspect –</a:t>
+            </a:r>
+            <a:r>
+              <a:rPr lang="en-US" sz="1800" b="1" dirty="0">
+                <a:highlight>
+                  <a:srgbClr val="FFFF00"/>
+                </a:highlight>
+              </a:rPr>
+              <a:t> Monitors </a:t>
+            </a:r>
+            <a:r>
+              <a:rPr lang="en-US" sz="1800" b="1" dirty="0"/>
+              <a:t>exceptions and handles unhandled exceptions.</a:t>
             </a:r>
           </a:p>
           <a:p>
@@ -8270,19 +9893,19 @@
               </a:lnSpc>
             </a:pPr>
             <a:r>
-              <a:rPr lang="en-US" b="1" dirty="0" err="1"/>
-              <a:t>ExceptionTranslatorAspect</a:t>
-            </a:r>
-            <a:r>
-              <a:rPr lang="en-US" b="1" dirty="0"/>
-              <a:t> – Translates exceptions from 3</a:t>
-            </a:r>
-            <a:r>
-              <a:rPr lang="en-US" b="1" baseline="30000" dirty="0"/>
+              <a:rPr lang="en-US" sz="1800" b="1" dirty="0" err="1"/>
+              <a:t>ExceptionTranslator</a:t>
+            </a:r>
+            <a:r>
+              <a:rPr lang="en-US" sz="1800" b="1" dirty="0"/>
+              <a:t> Aspect – Translates exceptions from 3</a:t>
+            </a:r>
+            <a:r>
+              <a:rPr lang="en-US" sz="1800" b="1" baseline="30000" dirty="0"/>
               <a:t>rd</a:t>
             </a:r>
             <a:r>
-              <a:rPr lang="en-US" b="1" dirty="0"/>
+              <a:rPr lang="en-US" sz="1800" b="1" dirty="0"/>
               <a:t> parties code.</a:t>
             </a:r>
           </a:p>

</xml_diff>

<commit_message>
DesignPatternsAspect impl part1 - singleton + tests, Logging config change
</commit_message>
<xml_diff>
--- a/src/Final Project Presentation.pptx
+++ b/src/Final Project Presentation.pptx
@@ -38,8 +38,11 @@
     <p:sldId id="294" r:id="rId32"/>
     <p:sldId id="295" r:id="rId33"/>
     <p:sldId id="296" r:id="rId34"/>
-    <p:sldId id="293" r:id="rId35"/>
-    <p:sldId id="273" r:id="rId36"/>
+    <p:sldId id="297" r:id="rId35"/>
+    <p:sldId id="293" r:id="rId36"/>
+    <p:sldId id="298" r:id="rId37"/>
+    <p:sldId id="299" r:id="rId38"/>
+    <p:sldId id="273" r:id="rId39"/>
   </p:sldIdLst>
   <p:sldSz cx="12192000" cy="6858000"/>
   <p:notesSz cx="6858000" cy="9144000"/>
@@ -293,7 +296,7 @@
           <a:p>
             <a:fld id="{2D0B15E7-0F5E-4AF9-8FAD-4329F98176F1}" type="datetimeFigureOut">
               <a:rPr lang="en-US" smtClean="0"/>
-              <a:t>6/11/2019</a:t>
+              <a:t>6/15/2019</a:t>
             </a:fld>
             <a:endParaRPr lang="en-US"/>
           </a:p>
@@ -491,7 +494,7 @@
           <a:p>
             <a:fld id="{2D0B15E7-0F5E-4AF9-8FAD-4329F98176F1}" type="datetimeFigureOut">
               <a:rPr lang="en-US" smtClean="0"/>
-              <a:t>6/11/2019</a:t>
+              <a:t>6/15/2019</a:t>
             </a:fld>
             <a:endParaRPr lang="en-US"/>
           </a:p>
@@ -699,7 +702,7 @@
           <a:p>
             <a:fld id="{2D0B15E7-0F5E-4AF9-8FAD-4329F98176F1}" type="datetimeFigureOut">
               <a:rPr lang="en-US" smtClean="0"/>
-              <a:t>6/11/2019</a:t>
+              <a:t>6/15/2019</a:t>
             </a:fld>
             <a:endParaRPr lang="en-US"/>
           </a:p>
@@ -897,7 +900,7 @@
           <a:p>
             <a:fld id="{2D0B15E7-0F5E-4AF9-8FAD-4329F98176F1}" type="datetimeFigureOut">
               <a:rPr lang="en-US" smtClean="0"/>
-              <a:t>6/11/2019</a:t>
+              <a:t>6/15/2019</a:t>
             </a:fld>
             <a:endParaRPr lang="en-US"/>
           </a:p>
@@ -1172,7 +1175,7 @@
           <a:p>
             <a:fld id="{2D0B15E7-0F5E-4AF9-8FAD-4329F98176F1}" type="datetimeFigureOut">
               <a:rPr lang="en-US" smtClean="0"/>
-              <a:t>6/11/2019</a:t>
+              <a:t>6/15/2019</a:t>
             </a:fld>
             <a:endParaRPr lang="en-US"/>
           </a:p>
@@ -1437,7 +1440,7 @@
           <a:p>
             <a:fld id="{2D0B15E7-0F5E-4AF9-8FAD-4329F98176F1}" type="datetimeFigureOut">
               <a:rPr lang="en-US" smtClean="0"/>
-              <a:t>6/11/2019</a:t>
+              <a:t>6/15/2019</a:t>
             </a:fld>
             <a:endParaRPr lang="en-US"/>
           </a:p>
@@ -1849,7 +1852,7 @@
           <a:p>
             <a:fld id="{2D0B15E7-0F5E-4AF9-8FAD-4329F98176F1}" type="datetimeFigureOut">
               <a:rPr lang="en-US" smtClean="0"/>
-              <a:t>6/11/2019</a:t>
+              <a:t>6/15/2019</a:t>
             </a:fld>
             <a:endParaRPr lang="en-US"/>
           </a:p>
@@ -1990,7 +1993,7 @@
           <a:p>
             <a:fld id="{2D0B15E7-0F5E-4AF9-8FAD-4329F98176F1}" type="datetimeFigureOut">
               <a:rPr lang="en-US" smtClean="0"/>
-              <a:t>6/11/2019</a:t>
+              <a:t>6/15/2019</a:t>
             </a:fld>
             <a:endParaRPr lang="en-US"/>
           </a:p>
@@ -2103,7 +2106,7 @@
           <a:p>
             <a:fld id="{2D0B15E7-0F5E-4AF9-8FAD-4329F98176F1}" type="datetimeFigureOut">
               <a:rPr lang="en-US" smtClean="0"/>
-              <a:t>6/11/2019</a:t>
+              <a:t>6/15/2019</a:t>
             </a:fld>
             <a:endParaRPr lang="en-US"/>
           </a:p>
@@ -2414,7 +2417,7 @@
           <a:p>
             <a:fld id="{2D0B15E7-0F5E-4AF9-8FAD-4329F98176F1}" type="datetimeFigureOut">
               <a:rPr lang="en-US" smtClean="0"/>
-              <a:t>6/11/2019</a:t>
+              <a:t>6/15/2019</a:t>
             </a:fld>
             <a:endParaRPr lang="en-US"/>
           </a:p>
@@ -2702,7 +2705,7 @@
           <a:p>
             <a:fld id="{2D0B15E7-0F5E-4AF9-8FAD-4329F98176F1}" type="datetimeFigureOut">
               <a:rPr lang="en-US" smtClean="0"/>
-              <a:t>6/11/2019</a:t>
+              <a:t>6/15/2019</a:t>
             </a:fld>
             <a:endParaRPr lang="en-US"/>
           </a:p>
@@ -2943,7 +2946,7 @@
           <a:p>
             <a:fld id="{2D0B15E7-0F5E-4AF9-8FAD-4329F98176F1}" type="datetimeFigureOut">
               <a:rPr lang="en-US" smtClean="0"/>
-              <a:t>6/11/2019</a:t>
+              <a:t>6/15/2019</a:t>
             </a:fld>
             <a:endParaRPr lang="en-US"/>
           </a:p>
@@ -8262,8 +8265,8 @@
         </p:blipFill>
         <p:spPr bwMode="auto">
           <a:xfrm>
-            <a:off x="2021747" y="1284853"/>
-            <a:ext cx="7103747" cy="5327810"/>
+            <a:off x="2021748" y="1845577"/>
+            <a:ext cx="6356114" cy="4767085"/>
           </a:xfrm>
           <a:prstGeom prst="rect">
             <a:avLst/>
@@ -8285,6 +8288,45 @@
           </a:extLst>
         </p:spPr>
       </p:pic>
+      <p:sp>
+        <p:nvSpPr>
+          <p:cNvPr id="2" name="Rectangle 1">
+            <a:extLst>
+              <a:ext uri="{FF2B5EF4-FFF2-40B4-BE49-F238E27FC236}">
+                <a16:creationId xmlns:a16="http://schemas.microsoft.com/office/drawing/2014/main" id="{B9A2FA25-F286-4621-B275-EB73D30A2CD8}"/>
+              </a:ext>
+            </a:extLst>
+          </p:cNvPr>
+          <p:cNvSpPr/>
+          <p:nvPr/>
+        </p:nvSpPr>
+        <p:spPr>
+          <a:xfrm>
+            <a:off x="310752" y="1158097"/>
+            <a:ext cx="11570496" cy="507831"/>
+          </a:xfrm>
+          <a:prstGeom prst="rect">
+            <a:avLst/>
+          </a:prstGeom>
+        </p:spPr>
+        <p:txBody>
+          <a:bodyPr wrap="square">
+            <a:spAutoFit/>
+          </a:bodyPr>
+          <a:lstStyle/>
+          <a:p>
+            <a:pPr>
+              <a:lnSpc>
+                <a:spcPct val="150000"/>
+              </a:lnSpc>
+            </a:pPr>
+            <a:r>
+              <a:rPr lang="en-US" b="1" dirty="0"/>
+              <a:t>Implementing Factory and Singleton design patterns using Aspects which improves code reusability and composability.</a:t>
+            </a:r>
+          </a:p>
+        </p:txBody>
+      </p:sp>
     </p:spTree>
     <p:extLst>
       <p:ext uri="{BB962C8B-B14F-4D97-AF65-F5344CB8AC3E}">
@@ -8372,8 +8414,8 @@
         </p:blipFill>
         <p:spPr>
           <a:xfrm>
-            <a:off x="2610095" y="1020897"/>
-            <a:ext cx="6169671" cy="5750653"/>
+            <a:off x="2835479" y="1113176"/>
+            <a:ext cx="5935898" cy="5532757"/>
           </a:xfrm>
           <a:prstGeom prst="rect">
             <a:avLst/>
@@ -8490,7 +8532,7 @@
         </p:nvCxnSpPr>
         <p:spPr>
           <a:xfrm flipV="1">
-            <a:off x="1669409" y="6123963"/>
+            <a:off x="1711354" y="6126889"/>
             <a:ext cx="1057013" cy="360727"/>
           </a:xfrm>
           <a:prstGeom prst="straightConnector1">
@@ -8531,7 +8573,7 @@
         </p:nvCxnSpPr>
         <p:spPr>
           <a:xfrm flipV="1">
-            <a:off x="1325461" y="3783435"/>
+            <a:off x="1325461" y="2646607"/>
             <a:ext cx="1400961" cy="511728"/>
           </a:xfrm>
           <a:prstGeom prst="straightConnector1">
@@ -8623,10 +8665,10 @@
       </p:sp>
       <p:pic>
         <p:nvPicPr>
-          <p:cNvPr id="2050" name="Picture 2" descr="Image result for decorator design pattern">
-            <a:extLst>
-              <a:ext uri="{FF2B5EF4-FFF2-40B4-BE49-F238E27FC236}">
-                <a16:creationId xmlns:a16="http://schemas.microsoft.com/office/drawing/2014/main" id="{BF84600F-F124-4133-9B41-A693531B31DE}"/>
+          <p:cNvPr id="2052" name="Picture 4" descr="Related image">
+            <a:extLst>
+              <a:ext uri="{FF2B5EF4-FFF2-40B4-BE49-F238E27FC236}">
+                <a16:creationId xmlns:a16="http://schemas.microsoft.com/office/drawing/2014/main" id="{5343AF97-D643-4D92-83B5-1EEFE5FA49E7}"/>
               </a:ext>
             </a:extLst>
           </p:cNvPr>
@@ -8635,7 +8677,7 @@
           </p:cNvPicPr>
           <p:nvPr/>
         </p:nvPicPr>
-        <p:blipFill rotWithShape="1">
+        <p:blipFill>
           <a:blip r:embed="rId2">
             <a:extLst>
               <a:ext uri="{28A0092B-C50C-407E-A947-70E740481C1C}">
@@ -8643,13 +8685,15 @@
               </a:ext>
             </a:extLst>
           </a:blip>
-          <a:srcRect l="8290" r="8039"/>
-          <a:stretch/>
+          <a:srcRect/>
+          <a:stretch>
+            <a:fillRect/>
+          </a:stretch>
         </p:blipFill>
         <p:spPr bwMode="auto">
           <a:xfrm>
-            <a:off x="838898" y="2363598"/>
-            <a:ext cx="5100507" cy="3429000"/>
+            <a:off x="4840449" y="2504741"/>
+            <a:ext cx="6544920" cy="3512219"/>
           </a:xfrm>
           <a:prstGeom prst="rect">
             <a:avLst/>
@@ -8666,53 +8710,6 @@
           </a:extLst>
         </p:spPr>
       </p:pic>
-      <p:pic>
-        <p:nvPicPr>
-          <p:cNvPr id="2052" name="Picture 4" descr="Related image">
-            <a:extLst>
-              <a:ext uri="{FF2B5EF4-FFF2-40B4-BE49-F238E27FC236}">
-                <a16:creationId xmlns:a16="http://schemas.microsoft.com/office/drawing/2014/main" id="{5343AF97-D643-4D92-83B5-1EEFE5FA49E7}"/>
-              </a:ext>
-            </a:extLst>
-          </p:cNvPr>
-          <p:cNvPicPr>
-            <a:picLocks noChangeAspect="1" noChangeArrowheads="1"/>
-          </p:cNvPicPr>
-          <p:nvPr/>
-        </p:nvPicPr>
-        <p:blipFill>
-          <a:blip r:embed="rId3">
-            <a:extLst>
-              <a:ext uri="{28A0092B-C50C-407E-A947-70E740481C1C}">
-                <a14:useLocalDpi xmlns:a14="http://schemas.microsoft.com/office/drawing/2010/main" val="0"/>
-              </a:ext>
-            </a:extLst>
-          </a:blip>
-          <a:srcRect/>
-          <a:stretch>
-            <a:fillRect/>
-          </a:stretch>
-        </p:blipFill>
-        <p:spPr bwMode="auto">
-          <a:xfrm>
-            <a:off x="6288683" y="2363597"/>
-            <a:ext cx="5490967" cy="2946633"/>
-          </a:xfrm>
-          <a:prstGeom prst="rect">
-            <a:avLst/>
-          </a:prstGeom>
-          <a:noFill/>
-          <a:extLst>
-            <a:ext uri="{909E8E84-426E-40DD-AFC4-6F175D3DCCD1}">
-              <a14:hiddenFill xmlns:a14="http://schemas.microsoft.com/office/drawing/2010/main">
-                <a:solidFill>
-                  <a:srgbClr val="FFFFFF"/>
-                </a:solidFill>
-              </a14:hiddenFill>
-            </a:ext>
-          </a:extLst>
-        </p:spPr>
-      </p:pic>
       <p:sp>
         <p:nvSpPr>
           <p:cNvPr id="8" name="Title 1">
@@ -8729,8 +8726,8 @@
         </p:nvSpPr>
         <p:spPr>
           <a:xfrm>
-            <a:off x="8276403" y="1759478"/>
-            <a:ext cx="1624955" cy="604120"/>
+            <a:off x="7386526" y="1600761"/>
+            <a:ext cx="1807808" cy="709403"/>
           </a:xfrm>
           <a:prstGeom prst="rect">
             <a:avLst/>
@@ -8761,7 +8758,7 @@
           </a:lstStyle>
           <a:p>
             <a:r>
-              <a:rPr lang="en-US" sz="2400" b="1" dirty="0">
+              <a:rPr lang="en-US" sz="3200" b="1" dirty="0">
                 <a:latin typeface="+mn-lt"/>
               </a:rPr>
               <a:t>Singleton</a:t>
@@ -8829,7 +8826,7 @@
               <a:rPr lang="en-US" b="1" dirty="0">
                 <a:latin typeface="+mn-lt"/>
               </a:rPr>
-              <a:t>Design Pattern Aspect</a:t>
+              <a:t>Singleton, the concern.</a:t>
             </a:r>
           </a:p>
         </p:txBody>
@@ -8852,8 +8849,8 @@
         </p:nvSpPr>
         <p:spPr>
           <a:xfrm>
-            <a:off x="125835" y="1116419"/>
-            <a:ext cx="11434194" cy="5554347"/>
+            <a:off x="125834" y="1116420"/>
+            <a:ext cx="11098635" cy="2683794"/>
           </a:xfrm>
         </p:spPr>
         <p:txBody>
@@ -8861,26 +8858,6 @@
             <a:normAutofit/>
           </a:bodyPr>
           <a:lstStyle/>
-          <a:p>
-            <a:pPr marL="0" indent="0">
-              <a:lnSpc>
-                <a:spcPct val="150000"/>
-              </a:lnSpc>
-              <a:buNone/>
-            </a:pPr>
-            <a:r>
-              <a:rPr lang="en-US" sz="2400" b="1" dirty="0"/>
-              <a:t>Implementing Decorator and </a:t>
-            </a:r>
-            <a:r>
-              <a:rPr lang="en-US" sz="2400" b="1" dirty="0" err="1"/>
-              <a:t>Singletone</a:t>
-            </a:r>
-            <a:r>
-              <a:rPr lang="en-US" sz="2400" b="1" dirty="0"/>
-              <a:t> design patterns using Aspects which improves code reusability and composability.</a:t>
-            </a:r>
-          </a:p>
           <a:p>
             <a:pPr>
               <a:lnSpc>
@@ -8888,14 +8865,179 @@
               </a:lnSpc>
             </a:pPr>
             <a:r>
+              <a:rPr lang="en-US" sz="2400" b="1" dirty="0"/>
+              <a:t>Normal OOP style of singleton will consist of writing this code in each of our Singleton instance. In our program – this can be relate to </a:t>
+            </a:r>
+            <a:r>
+              <a:rPr lang="en-US" sz="2400" b="1" dirty="0" err="1"/>
+              <a:t>SpaceShipFactory</a:t>
+            </a:r>
+            <a:r>
+              <a:rPr lang="en-US" sz="2400" b="1" dirty="0"/>
+              <a:t>. We can </a:t>
+            </a:r>
+            <a:r>
               <a:rPr lang="en-US" sz="2400" b="1" dirty="0">
                 <a:solidFill>
                   <a:srgbClr val="FF0000"/>
                 </a:solidFill>
               </a:rPr>
-              <a:t>Concern:</a:t>
-            </a:r>
-          </a:p>
+              <a:t>have many singletons </a:t>
+            </a:r>
+            <a:r>
+              <a:rPr lang="en-US" sz="2400" b="1" dirty="0"/>
+              <a:t>in our codebase! Adding this code each time is </a:t>
+            </a:r>
+            <a:r>
+              <a:rPr lang="en-US" sz="2400" b="1" dirty="0">
+                <a:solidFill>
+                  <a:srgbClr val="FF0000"/>
+                </a:solidFill>
+              </a:rPr>
+              <a:t>tangling</a:t>
+            </a:r>
+            <a:r>
+              <a:rPr lang="en-US" sz="2400" b="1" dirty="0"/>
+              <a:t> the class and will be </a:t>
+            </a:r>
+            <a:r>
+              <a:rPr lang="en-US" sz="2400" b="1" dirty="0">
+                <a:solidFill>
+                  <a:srgbClr val="FF0000"/>
+                </a:solidFill>
+              </a:rPr>
+              <a:t>scattered</a:t>
+            </a:r>
+            <a:r>
+              <a:rPr lang="en-US" sz="2400" b="1" dirty="0"/>
+              <a:t> all over our application.</a:t>
+            </a:r>
+            <a:endParaRPr lang="en-US" sz="2400" b="1" i="1" dirty="0"/>
+          </a:p>
+        </p:txBody>
+      </p:sp>
+      <p:pic>
+        <p:nvPicPr>
+          <p:cNvPr id="3" name="Picture 2">
+            <a:extLst>
+              <a:ext uri="{FF2B5EF4-FFF2-40B4-BE49-F238E27FC236}">
+                <a16:creationId xmlns:a16="http://schemas.microsoft.com/office/drawing/2014/main" id="{F7F4CB57-323A-42DB-ADC8-26A0F3E578EF}"/>
+              </a:ext>
+            </a:extLst>
+          </p:cNvPr>
+          <p:cNvPicPr>
+            <a:picLocks noChangeAspect="1"/>
+          </p:cNvPicPr>
+          <p:nvPr/>
+        </p:nvPicPr>
+        <p:blipFill>
+          <a:blip r:embed="rId2"/>
+          <a:stretch>
+            <a:fillRect/>
+          </a:stretch>
+        </p:blipFill>
+        <p:spPr>
+          <a:xfrm>
+            <a:off x="3077119" y="4017555"/>
+            <a:ext cx="5162550" cy="1724025"/>
+          </a:xfrm>
+          <a:prstGeom prst="rect">
+            <a:avLst/>
+          </a:prstGeom>
+        </p:spPr>
+      </p:pic>
+    </p:spTree>
+    <p:extLst>
+      <p:ext uri="{BB962C8B-B14F-4D97-AF65-F5344CB8AC3E}">
+        <p14:creationId xmlns:p14="http://schemas.microsoft.com/office/powerpoint/2010/main" val="3836049260"/>
+      </p:ext>
+    </p:extLst>
+  </p:cSld>
+  <p:clrMapOvr>
+    <a:masterClrMapping/>
+  </p:clrMapOvr>
+</p:sld>
+</file>
+
+<file path=ppt/slides/slide35.xml><?xml version="1.0" encoding="utf-8"?>
+<p:sld xmlns:a="http://schemas.openxmlformats.org/drawingml/2006/main" xmlns:r="http://schemas.openxmlformats.org/officeDocument/2006/relationships" xmlns:p="http://schemas.openxmlformats.org/presentationml/2006/main">
+  <p:cSld>
+    <p:spTree>
+      <p:nvGrpSpPr>
+        <p:cNvPr id="1" name=""/>
+        <p:cNvGrpSpPr/>
+        <p:nvPr/>
+      </p:nvGrpSpPr>
+      <p:grpSpPr>
+        <a:xfrm>
+          <a:off x="0" y="0"/>
+          <a:ext cx="0" cy="0"/>
+          <a:chOff x="0" y="0"/>
+          <a:chExt cx="0" cy="0"/>
+        </a:xfrm>
+      </p:grpSpPr>
+      <p:sp>
+        <p:nvSpPr>
+          <p:cNvPr id="4" name="Title 1">
+            <a:extLst>
+              <a:ext uri="{FF2B5EF4-FFF2-40B4-BE49-F238E27FC236}">
+                <a16:creationId xmlns:a16="http://schemas.microsoft.com/office/drawing/2014/main" id="{CAC17C8E-3677-4E33-AD1C-BB70137513FC}"/>
+              </a:ext>
+            </a:extLst>
+          </p:cNvPr>
+          <p:cNvSpPr>
+            <a:spLocks noGrp="1"/>
+          </p:cNvSpPr>
+          <p:nvPr>
+            <p:ph type="title"/>
+          </p:nvPr>
+        </p:nvSpPr>
+        <p:spPr>
+          <a:xfrm>
+            <a:off x="400594" y="86450"/>
+            <a:ext cx="10515600" cy="1325563"/>
+          </a:xfrm>
+        </p:spPr>
+        <p:txBody>
+          <a:bodyPr/>
+          <a:lstStyle/>
+          <a:p>
+            <a:r>
+              <a:rPr lang="en-US" b="1" dirty="0">
+                <a:latin typeface="+mn-lt"/>
+              </a:rPr>
+              <a:t>Design Pattern Aspect - Singleton</a:t>
+            </a:r>
+          </a:p>
+        </p:txBody>
+      </p:sp>
+      <p:sp>
+        <p:nvSpPr>
+          <p:cNvPr id="5" name="Content Placeholder 2">
+            <a:extLst>
+              <a:ext uri="{FF2B5EF4-FFF2-40B4-BE49-F238E27FC236}">
+                <a16:creationId xmlns:a16="http://schemas.microsoft.com/office/drawing/2014/main" id="{507F342C-C331-44DB-ACF0-C06FE2A5C3FB}"/>
+              </a:ext>
+            </a:extLst>
+          </p:cNvPr>
+          <p:cNvSpPr>
+            <a:spLocks noGrp="1"/>
+          </p:cNvSpPr>
+          <p:nvPr>
+            <p:ph idx="1"/>
+          </p:nvPr>
+        </p:nvSpPr>
+        <p:spPr>
+          <a:xfrm>
+            <a:off x="125835" y="1116419"/>
+            <a:ext cx="11434194" cy="3942142"/>
+          </a:xfrm>
+        </p:spPr>
+        <p:txBody>
+          <a:bodyPr>
+            <a:normAutofit/>
+          </a:bodyPr>
+          <a:lstStyle/>
           <a:p>
             <a:pPr>
               <a:lnSpc>
@@ -8903,25 +9045,22 @@
               </a:lnSpc>
             </a:pPr>
             <a:r>
-              <a:rPr lang="en-US" sz="2400" b="1" i="1" dirty="0">
+              <a:rPr lang="en-US" sz="2400" b="1" dirty="0">
                 <a:solidFill>
                   <a:srgbClr val="FF0000"/>
                 </a:solidFill>
               </a:rPr>
-              <a:t>Pointcut:</a:t>
-            </a:r>
-            <a:r>
-              <a:rPr lang="en-US" sz="2400" b="1" i="1" dirty="0"/>
-              <a:t> launch of the game (dependent on given </a:t>
-            </a:r>
-            <a:r>
-              <a:rPr lang="en-US" sz="2400" b="1" i="1" dirty="0" err="1"/>
-              <a:t>args</a:t>
-            </a:r>
-            <a:r>
-              <a:rPr lang="en-US" sz="2400" b="1" i="1" dirty="0"/>
-              <a:t>).</a:t>
-            </a:r>
+              <a:t>Concern: </a:t>
+            </a:r>
+            <a:r>
+              <a:rPr lang="en-US" sz="2400" b="1" dirty="0"/>
+              <a:t>adding singleton implementation to each singleton class.</a:t>
+            </a:r>
+            <a:endParaRPr lang="en-US" sz="2400" b="1" dirty="0">
+              <a:solidFill>
+                <a:srgbClr val="FF0000"/>
+              </a:solidFill>
+            </a:endParaRPr>
           </a:p>
           <a:p>
             <a:pPr>
@@ -8935,20 +9074,95 @@
                   <a:srgbClr val="FF0000"/>
                 </a:solidFill>
               </a:rPr>
+              <a:t>Pointcut:</a:t>
+            </a:r>
+            <a:r>
+              <a:rPr lang="en-US" sz="2400" b="1" i="1" dirty="0"/>
+              <a:t> creation of </a:t>
+            </a:r>
+            <a:r>
+              <a:rPr lang="en-US" sz="2400" b="1" i="1" dirty="0" err="1"/>
+              <a:t>SpaceWars</a:t>
+            </a:r>
+            <a:r>
+              <a:rPr lang="en-US" sz="2400" b="1" i="1" dirty="0"/>
+              <a:t> game instance (.new(..) (only 1x == </a:t>
+            </a:r>
+            <a:r>
+              <a:rPr lang="en-US" sz="2400" b="1" i="1" dirty="0">
+                <a:solidFill>
+                  <a:srgbClr val="FF0000"/>
+                </a:solidFill>
+              </a:rPr>
+              <a:t>singleton</a:t>
+            </a:r>
+            <a:r>
+              <a:rPr lang="en-US" sz="2400" b="1" i="1" dirty="0"/>
+              <a:t>))</a:t>
+            </a:r>
+          </a:p>
+          <a:p>
+            <a:pPr>
+              <a:lnSpc>
+                <a:spcPct val="150000"/>
+              </a:lnSpc>
+            </a:pPr>
+            <a:r>
+              <a:rPr lang="en-US" sz="2400" b="1" i="1" dirty="0">
+                <a:solidFill>
+                  <a:srgbClr val="FF0000"/>
+                </a:solidFill>
+              </a:rPr>
               <a:t>Advice: </a:t>
             </a:r>
             <a:r>
-              <a:rPr lang="en-US" sz="2400" b="1" i="1" dirty="0"/>
-              <a:t>creating spaceships (</a:t>
-            </a:r>
-            <a:r>
-              <a:rPr lang="en-US" sz="2400" b="1" i="1" dirty="0" err="1"/>
-              <a:t>SpaceShipFactory</a:t>
-            </a:r>
-            <a:r>
-              <a:rPr lang="en-US" sz="2400" b="1" i="1" dirty="0"/>
-              <a:t>) using an Aspect.</a:t>
-            </a:r>
+              <a:rPr lang="en-US" sz="2400" b="1" dirty="0"/>
+              <a:t>intercepts calls to </a:t>
+            </a:r>
+            <a:r>
+              <a:rPr lang="en-US" sz="2400" b="1" dirty="0">
+                <a:solidFill>
+                  <a:srgbClr val="FF0000"/>
+                </a:solidFill>
+              </a:rPr>
+              <a:t>the constructor of the singleton class</a:t>
+            </a:r>
+            <a:r>
+              <a:rPr lang="en-US" sz="2400" b="1" dirty="0"/>
+              <a:t> and instead of creating a new instance every time, return the instance that was created at the very fist call to the constructor.</a:t>
+            </a:r>
+          </a:p>
+          <a:p>
+            <a:pPr>
+              <a:lnSpc>
+                <a:spcPct val="150000"/>
+              </a:lnSpc>
+            </a:pPr>
+            <a:r>
+              <a:rPr lang="en-US" sz="2400" b="1" dirty="0">
+                <a:solidFill>
+                  <a:srgbClr val="FF0000"/>
+                </a:solidFill>
+              </a:rPr>
+              <a:t>Result: </a:t>
+            </a:r>
+            <a:r>
+              <a:rPr lang="en-US" sz="2400" b="1" dirty="0"/>
+              <a:t>much less code written, easy to handle and control from the 1x aspect!</a:t>
+            </a:r>
+            <a:endParaRPr lang="en-US" sz="2400" b="1" dirty="0">
+              <a:solidFill>
+                <a:srgbClr val="FF0000"/>
+              </a:solidFill>
+            </a:endParaRPr>
+          </a:p>
+          <a:p>
+            <a:pPr>
+              <a:lnSpc>
+                <a:spcPct val="150000"/>
+              </a:lnSpc>
+            </a:pPr>
+            <a:endParaRPr lang="en-US" sz="2400" b="1" i="1" dirty="0"/>
           </a:p>
         </p:txBody>
       </p:sp>
@@ -8965,7 +9179,227 @@
 </p:sld>
 </file>
 
-<file path=ppt/slides/slide35.xml><?xml version="1.0" encoding="utf-8"?>
+<file path=ppt/slides/slide36.xml><?xml version="1.0" encoding="utf-8"?>
+<p:sld xmlns:a="http://schemas.openxmlformats.org/drawingml/2006/main" xmlns:r="http://schemas.openxmlformats.org/officeDocument/2006/relationships" xmlns:p="http://schemas.openxmlformats.org/presentationml/2006/main">
+  <p:cSld>
+    <p:spTree>
+      <p:nvGrpSpPr>
+        <p:cNvPr id="1" name=""/>
+        <p:cNvGrpSpPr/>
+        <p:nvPr/>
+      </p:nvGrpSpPr>
+      <p:grpSpPr>
+        <a:xfrm>
+          <a:off x="0" y="0"/>
+          <a:ext cx="0" cy="0"/>
+          <a:chOff x="0" y="0"/>
+          <a:chExt cx="0" cy="0"/>
+        </a:xfrm>
+      </p:grpSpPr>
+      <p:sp>
+        <p:nvSpPr>
+          <p:cNvPr id="4" name="Title 1">
+            <a:extLst>
+              <a:ext uri="{FF2B5EF4-FFF2-40B4-BE49-F238E27FC236}">
+                <a16:creationId xmlns:a16="http://schemas.microsoft.com/office/drawing/2014/main" id="{CAC17C8E-3677-4E33-AD1C-BB70137513FC}"/>
+              </a:ext>
+            </a:extLst>
+          </p:cNvPr>
+          <p:cNvSpPr>
+            <a:spLocks noGrp="1"/>
+          </p:cNvSpPr>
+          <p:nvPr>
+            <p:ph type="title"/>
+          </p:nvPr>
+        </p:nvSpPr>
+        <p:spPr>
+          <a:xfrm>
+            <a:off x="400594" y="86450"/>
+            <a:ext cx="10515600" cy="1325563"/>
+          </a:xfrm>
+        </p:spPr>
+        <p:txBody>
+          <a:bodyPr/>
+          <a:lstStyle/>
+          <a:p>
+            <a:r>
+              <a:rPr lang="en-US" b="1" dirty="0">
+                <a:latin typeface="+mn-lt"/>
+              </a:rPr>
+              <a:t>Design Pattern Aspect - Singleton</a:t>
+            </a:r>
+          </a:p>
+        </p:txBody>
+      </p:sp>
+      <p:pic>
+        <p:nvPicPr>
+          <p:cNvPr id="8" name="Picture 7">
+            <a:extLst>
+              <a:ext uri="{FF2B5EF4-FFF2-40B4-BE49-F238E27FC236}">
+                <a16:creationId xmlns:a16="http://schemas.microsoft.com/office/drawing/2014/main" id="{D3DF31E1-CA4B-407B-932C-BA01467DB5F5}"/>
+              </a:ext>
+            </a:extLst>
+          </p:cNvPr>
+          <p:cNvPicPr>
+            <a:picLocks noChangeAspect="1"/>
+          </p:cNvPicPr>
+          <p:nvPr/>
+        </p:nvPicPr>
+        <p:blipFill>
+          <a:blip r:embed="rId2"/>
+          <a:stretch>
+            <a:fillRect/>
+          </a:stretch>
+        </p:blipFill>
+        <p:spPr>
+          <a:xfrm>
+            <a:off x="2710781" y="1568741"/>
+            <a:ext cx="6156844" cy="4551855"/>
+          </a:xfrm>
+          <a:prstGeom prst="rect">
+            <a:avLst/>
+          </a:prstGeom>
+        </p:spPr>
+      </p:pic>
+    </p:spTree>
+    <p:extLst>
+      <p:ext uri="{BB962C8B-B14F-4D97-AF65-F5344CB8AC3E}">
+        <p14:creationId xmlns:p14="http://schemas.microsoft.com/office/powerpoint/2010/main" val="814067681"/>
+      </p:ext>
+    </p:extLst>
+  </p:cSld>
+  <p:clrMapOvr>
+    <a:masterClrMapping/>
+  </p:clrMapOvr>
+</p:sld>
+</file>
+
+<file path=ppt/slides/slide37.xml><?xml version="1.0" encoding="utf-8"?>
+<p:sld xmlns:a="http://schemas.openxmlformats.org/drawingml/2006/main" xmlns:r="http://schemas.openxmlformats.org/officeDocument/2006/relationships" xmlns:p="http://schemas.openxmlformats.org/presentationml/2006/main">
+  <p:cSld>
+    <p:spTree>
+      <p:nvGrpSpPr>
+        <p:cNvPr id="1" name=""/>
+        <p:cNvGrpSpPr/>
+        <p:nvPr/>
+      </p:nvGrpSpPr>
+      <p:grpSpPr>
+        <a:xfrm>
+          <a:off x="0" y="0"/>
+          <a:ext cx="0" cy="0"/>
+          <a:chOff x="0" y="0"/>
+          <a:chExt cx="0" cy="0"/>
+        </a:xfrm>
+      </p:grpSpPr>
+      <p:sp>
+        <p:nvSpPr>
+          <p:cNvPr id="4" name="Title 1">
+            <a:extLst>
+              <a:ext uri="{FF2B5EF4-FFF2-40B4-BE49-F238E27FC236}">
+                <a16:creationId xmlns:a16="http://schemas.microsoft.com/office/drawing/2014/main" id="{CAC17C8E-3677-4E33-AD1C-BB70137513FC}"/>
+              </a:ext>
+            </a:extLst>
+          </p:cNvPr>
+          <p:cNvSpPr>
+            <a:spLocks noGrp="1"/>
+          </p:cNvSpPr>
+          <p:nvPr>
+            <p:ph type="title"/>
+          </p:nvPr>
+        </p:nvSpPr>
+        <p:spPr>
+          <a:xfrm>
+            <a:off x="400594" y="86450"/>
+            <a:ext cx="10515600" cy="1325563"/>
+          </a:xfrm>
+        </p:spPr>
+        <p:txBody>
+          <a:bodyPr/>
+          <a:lstStyle/>
+          <a:p>
+            <a:r>
+              <a:rPr lang="en-US" b="1" dirty="0">
+                <a:latin typeface="+mn-lt"/>
+              </a:rPr>
+              <a:t>Design Pattern Aspect - Singleton</a:t>
+            </a:r>
+          </a:p>
+        </p:txBody>
+      </p:sp>
+      <p:pic>
+        <p:nvPicPr>
+          <p:cNvPr id="6" name="Picture 5">
+            <a:extLst>
+              <a:ext uri="{FF2B5EF4-FFF2-40B4-BE49-F238E27FC236}">
+                <a16:creationId xmlns:a16="http://schemas.microsoft.com/office/drawing/2014/main" id="{03A43675-F7E2-4458-A8B0-5DC7F2F29B5B}"/>
+              </a:ext>
+            </a:extLst>
+          </p:cNvPr>
+          <p:cNvPicPr>
+            <a:picLocks noChangeAspect="1"/>
+          </p:cNvPicPr>
+          <p:nvPr/>
+        </p:nvPicPr>
+        <p:blipFill>
+          <a:blip r:embed="rId2"/>
+          <a:stretch>
+            <a:fillRect/>
+          </a:stretch>
+        </p:blipFill>
+        <p:spPr>
+          <a:xfrm>
+            <a:off x="3163741" y="1250353"/>
+            <a:ext cx="5210175" cy="3686175"/>
+          </a:xfrm>
+          <a:prstGeom prst="rect">
+            <a:avLst/>
+          </a:prstGeom>
+        </p:spPr>
+      </p:pic>
+      <p:pic>
+        <p:nvPicPr>
+          <p:cNvPr id="7" name="Picture 6">
+            <a:extLst>
+              <a:ext uri="{FF2B5EF4-FFF2-40B4-BE49-F238E27FC236}">
+                <a16:creationId xmlns:a16="http://schemas.microsoft.com/office/drawing/2014/main" id="{00F43CD5-CABD-43D4-AD85-B6866F9D355B}"/>
+              </a:ext>
+            </a:extLst>
+          </p:cNvPr>
+          <p:cNvPicPr>
+            <a:picLocks noChangeAspect="1"/>
+          </p:cNvPicPr>
+          <p:nvPr/>
+        </p:nvPicPr>
+        <p:blipFill>
+          <a:blip r:embed="rId3"/>
+          <a:stretch>
+            <a:fillRect/>
+          </a:stretch>
+        </p:blipFill>
+        <p:spPr>
+          <a:xfrm>
+            <a:off x="2501929" y="5143762"/>
+            <a:ext cx="6917260" cy="1395456"/>
+          </a:xfrm>
+          <a:prstGeom prst="rect">
+            <a:avLst/>
+          </a:prstGeom>
+        </p:spPr>
+      </p:pic>
+    </p:spTree>
+    <p:extLst>
+      <p:ext uri="{BB962C8B-B14F-4D97-AF65-F5344CB8AC3E}">
+        <p14:creationId xmlns:p14="http://schemas.microsoft.com/office/powerpoint/2010/main" val="2317555707"/>
+      </p:ext>
+    </p:extLst>
+  </p:cSld>
+  <p:clrMapOvr>
+    <a:masterClrMapping/>
+  </p:clrMapOvr>
+</p:sld>
+</file>
+
+<file path=ppt/slides/slide38.xml><?xml version="1.0" encoding="utf-8"?>
 <p:sld xmlns:a="http://schemas.openxmlformats.org/drawingml/2006/main" xmlns:r="http://schemas.openxmlformats.org/officeDocument/2006/relationships" xmlns:p="http://schemas.openxmlformats.org/presentationml/2006/main">
   <p:cSld>
     <p:spTree>
@@ -9817,6 +10251,21 @@
               </a:lnSpc>
             </a:pPr>
             <a:r>
+              <a:rPr lang="en-US" sz="1800" b="1" dirty="0">
+                <a:highlight>
+                  <a:srgbClr val="FFFF00"/>
+                </a:highlight>
+              </a:rPr>
+              <a:t>Lock aspect?</a:t>
+            </a:r>
+          </a:p>
+          <a:p>
+            <a:pPr lvl="1">
+              <a:lnSpc>
+                <a:spcPct val="150000"/>
+              </a:lnSpc>
+            </a:pPr>
+            <a:r>
               <a:rPr lang="en-US" sz="1800" b="1" dirty="0"/>
               <a:t>Validator Aspect – validates parameters passed to methods in the codebase.</a:t>
             </a:r>
@@ -9843,12 +10292,12 @@
               </a:lnSpc>
             </a:pPr>
             <a:r>
-              <a:rPr lang="en-US" sz="1800" b="1" dirty="0" err="1">
-                <a:highlight>
-                  <a:srgbClr val="FFFF00"/>
-                </a:highlight>
-              </a:rPr>
+              <a:rPr lang="en-US" sz="1800" b="1" dirty="0" err="1"/>
               <a:t>DesignPattern</a:t>
+            </a:r>
+            <a:r>
+              <a:rPr lang="en-US" sz="1800" b="1" dirty="0"/>
+              <a:t> Aspect – Singleton design pattern &amp;&amp; </a:t>
             </a:r>
             <a:r>
               <a:rPr lang="en-US" sz="1800" b="1" dirty="0">
@@ -9856,7 +10305,11 @@
                   <a:srgbClr val="FFFF00"/>
                 </a:highlight>
               </a:rPr>
-              <a:t> Aspect – implementation of design patterns using aspects.</a:t>
+              <a:t>*** design pattern </a:t>
+            </a:r>
+            <a:r>
+              <a:rPr lang="en-US" sz="1800" b="1" dirty="0"/>
+              <a:t>implementation using AOP.</a:t>
             </a:r>
           </a:p>
           <a:p>

</xml_diff>